<commit_message>
Add link to source code into tutorial presentation.
</commit_message>
<xml_diff>
--- a/docs/tutorial/Yii2RbacTutorial.pptx
+++ b/docs/tutorial/Yii2RbacTutorial.pptx
@@ -131,6 +131,9 @@
   <p:extLst>
     <p:ext uri="{EFAFB233-063F-42B5-8137-9DF3F51BA10A}">
       <p15:sldGuideLst xmlns:p15="http://schemas.microsoft.com/office/powerpoint/2012/main"/>
+    </p:ext>
+    <p:ext uri="{2D200454-40CA-4A62-9FC3-DE9A4176ACB9}">
+      <p15:notesGuideLst xmlns:p15="http://schemas.microsoft.com/office/powerpoint/2012/main"/>
     </p:ext>
   </p:extLst>
 </p:presentation>
@@ -7388,6 +7391,56 @@
           </a:p>
         </p:txBody>
       </p:sp>
+      <p:sp>
+        <p:nvSpPr>
+          <p:cNvPr id="3" name="テキスト ボックス 2">
+            <a:extLst>
+              <a:ext uri="{FF2B5EF4-FFF2-40B4-BE49-F238E27FC236}">
+                <a16:creationId xmlns:a16="http://schemas.microsoft.com/office/drawing/2014/main" id="{E51021C7-EB41-4F2B-9B32-B2357535C196}"/>
+              </a:ext>
+            </a:extLst>
+          </p:cNvPr>
+          <p:cNvSpPr txBox="1"/>
+          <p:nvPr/>
+        </p:nvSpPr>
+        <p:spPr>
+          <a:xfrm>
+            <a:off x="8442664" y="4980373"/>
+            <a:ext cx="1509204" cy="369332"/>
+          </a:xfrm>
+          <a:prstGeom prst="rect">
+            <a:avLst/>
+          </a:prstGeom>
+          <a:noFill/>
+        </p:spPr>
+        <p:txBody>
+          <a:bodyPr wrap="square" rtlCol="0">
+            <a:spAutoFit/>
+          </a:bodyPr>
+          <a:lstStyle/>
+          <a:p>
+            <a:r>
+              <a:rPr kumimoji="1" lang="en-US" altLang="ja-JP" dirty="0">
+                <a:hlinkClick r:id="rId3"/>
+              </a:rPr>
+              <a:t>Source</a:t>
+            </a:r>
+            <a:r>
+              <a:rPr kumimoji="1" lang="ja-JP" altLang="en-US" dirty="0">
+                <a:hlinkClick r:id="rId3"/>
+              </a:rPr>
+              <a:t> </a:t>
+            </a:r>
+            <a:r>
+              <a:rPr kumimoji="1" lang="en-US" altLang="ja-JP" dirty="0">
+                <a:hlinkClick r:id="rId3"/>
+              </a:rPr>
+              <a:t>Code</a:t>
+            </a:r>
+            <a:endParaRPr kumimoji="1" lang="ja-JP" altLang="en-US" dirty="0"/>
+          </a:p>
+        </p:txBody>
+      </p:sp>
     </p:spTree>
     <p:extLst>
       <p:ext uri="{BB962C8B-B14F-4D97-AF65-F5344CB8AC3E}">
@@ -8113,6 +8166,106 @@
           </a:p>
         </p:txBody>
       </p:sp>
+      <p:sp>
+        <p:nvSpPr>
+          <p:cNvPr id="7" name="テキスト ボックス 6">
+            <a:extLst>
+              <a:ext uri="{FF2B5EF4-FFF2-40B4-BE49-F238E27FC236}">
+                <a16:creationId xmlns:a16="http://schemas.microsoft.com/office/drawing/2014/main" id="{3F6546C0-2E06-433B-BA4C-AF19E1347677}"/>
+              </a:ext>
+            </a:extLst>
+          </p:cNvPr>
+          <p:cNvSpPr txBox="1"/>
+          <p:nvPr/>
+        </p:nvSpPr>
+        <p:spPr>
+          <a:xfrm>
+            <a:off x="949909" y="6082173"/>
+            <a:ext cx="1562471" cy="369332"/>
+          </a:xfrm>
+          <a:prstGeom prst="rect">
+            <a:avLst/>
+          </a:prstGeom>
+          <a:noFill/>
+        </p:spPr>
+        <p:txBody>
+          <a:bodyPr wrap="square" rtlCol="0">
+            <a:spAutoFit/>
+          </a:bodyPr>
+          <a:lstStyle/>
+          <a:p>
+            <a:r>
+              <a:rPr kumimoji="1" lang="en-US" altLang="ja-JP" dirty="0">
+                <a:hlinkClick r:id="rId2"/>
+              </a:rPr>
+              <a:t>Source</a:t>
+            </a:r>
+            <a:r>
+              <a:rPr kumimoji="1" lang="ja-JP" altLang="en-US" dirty="0">
+                <a:hlinkClick r:id="rId2"/>
+              </a:rPr>
+              <a:t> </a:t>
+            </a:r>
+            <a:r>
+              <a:rPr kumimoji="1" lang="en-US" altLang="ja-JP" dirty="0">
+                <a:hlinkClick r:id="rId2"/>
+              </a:rPr>
+              <a:t>Code</a:t>
+            </a:r>
+            <a:endParaRPr kumimoji="1" lang="ja-JP" altLang="en-US" dirty="0"/>
+          </a:p>
+        </p:txBody>
+      </p:sp>
+      <p:sp>
+        <p:nvSpPr>
+          <p:cNvPr id="8" name="テキスト ボックス 7">
+            <a:extLst>
+              <a:ext uri="{FF2B5EF4-FFF2-40B4-BE49-F238E27FC236}">
+                <a16:creationId xmlns:a16="http://schemas.microsoft.com/office/drawing/2014/main" id="{12D415FD-08F5-4AB8-A81E-39CC32F14C98}"/>
+              </a:ext>
+            </a:extLst>
+          </p:cNvPr>
+          <p:cNvSpPr txBox="1"/>
+          <p:nvPr/>
+        </p:nvSpPr>
+        <p:spPr>
+          <a:xfrm>
+            <a:off x="6096000" y="6102377"/>
+            <a:ext cx="1562471" cy="369332"/>
+          </a:xfrm>
+          <a:prstGeom prst="rect">
+            <a:avLst/>
+          </a:prstGeom>
+          <a:noFill/>
+        </p:spPr>
+        <p:txBody>
+          <a:bodyPr wrap="square" rtlCol="0">
+            <a:spAutoFit/>
+          </a:bodyPr>
+          <a:lstStyle/>
+          <a:p>
+            <a:r>
+              <a:rPr kumimoji="1" lang="en-US" altLang="ja-JP" dirty="0">
+                <a:hlinkClick r:id="rId3"/>
+              </a:rPr>
+              <a:t>Source</a:t>
+            </a:r>
+            <a:r>
+              <a:rPr kumimoji="1" lang="ja-JP" altLang="en-US" dirty="0">
+                <a:hlinkClick r:id="rId3"/>
+              </a:rPr>
+              <a:t> </a:t>
+            </a:r>
+            <a:r>
+              <a:rPr kumimoji="1" lang="en-US" altLang="ja-JP" dirty="0">
+                <a:hlinkClick r:id="rId3"/>
+              </a:rPr>
+              <a:t>Code</a:t>
+            </a:r>
+            <a:endParaRPr kumimoji="1" lang="ja-JP" altLang="en-US" dirty="0"/>
+          </a:p>
+        </p:txBody>
+      </p:sp>
     </p:spTree>
     <p:extLst>
       <p:ext uri="{BB962C8B-B14F-4D97-AF65-F5344CB8AC3E}">
@@ -9002,6 +9155,44 @@
           </a:p>
         </p:txBody>
       </p:sp>
+      <p:sp>
+        <p:nvSpPr>
+          <p:cNvPr id="3" name="テキスト ボックス 2">
+            <a:extLst>
+              <a:ext uri="{FF2B5EF4-FFF2-40B4-BE49-F238E27FC236}">
+                <a16:creationId xmlns:a16="http://schemas.microsoft.com/office/drawing/2014/main" id="{EB47B340-BE6A-4004-A9F8-A61FE3C08E0E}"/>
+              </a:ext>
+            </a:extLst>
+          </p:cNvPr>
+          <p:cNvSpPr txBox="1"/>
+          <p:nvPr/>
+        </p:nvSpPr>
+        <p:spPr>
+          <a:xfrm>
+            <a:off x="7901126" y="5903650"/>
+            <a:ext cx="1455938" cy="369332"/>
+          </a:xfrm>
+          <a:prstGeom prst="rect">
+            <a:avLst/>
+          </a:prstGeom>
+          <a:noFill/>
+        </p:spPr>
+        <p:txBody>
+          <a:bodyPr wrap="square" rtlCol="0">
+            <a:spAutoFit/>
+          </a:bodyPr>
+          <a:lstStyle/>
+          <a:p>
+            <a:r>
+              <a:rPr kumimoji="1" lang="en-US" altLang="ja-JP" dirty="0">
+                <a:hlinkClick r:id="rId2"/>
+              </a:rPr>
+              <a:t>Source Code</a:t>
+            </a:r>
+            <a:endParaRPr kumimoji="1" lang="ja-JP" altLang="en-US" dirty="0"/>
+          </a:p>
+        </p:txBody>
+      </p:sp>
     </p:spTree>
     <p:extLst>
       <p:ext uri="{BB962C8B-B14F-4D97-AF65-F5344CB8AC3E}">
@@ -9759,6 +9950,82 @@
               <a:t>20</a:t>
             </a:fld>
             <a:endParaRPr kumimoji="1" lang="ja-JP" altLang="en-US"/>
+          </a:p>
+        </p:txBody>
+      </p:sp>
+      <p:sp>
+        <p:nvSpPr>
+          <p:cNvPr id="5" name="テキスト ボックス 4">
+            <a:extLst>
+              <a:ext uri="{FF2B5EF4-FFF2-40B4-BE49-F238E27FC236}">
+                <a16:creationId xmlns:a16="http://schemas.microsoft.com/office/drawing/2014/main" id="{91DFAF3D-A40B-4A9E-90BA-2CD6FF4C5DA6}"/>
+              </a:ext>
+            </a:extLst>
+          </p:cNvPr>
+          <p:cNvSpPr txBox="1"/>
+          <p:nvPr/>
+        </p:nvSpPr>
+        <p:spPr>
+          <a:xfrm>
+            <a:off x="8318377" y="1506022"/>
+            <a:ext cx="1766656" cy="369332"/>
+          </a:xfrm>
+          <a:prstGeom prst="rect">
+            <a:avLst/>
+          </a:prstGeom>
+          <a:noFill/>
+        </p:spPr>
+        <p:txBody>
+          <a:bodyPr wrap="square" rtlCol="0">
+            <a:spAutoFit/>
+          </a:bodyPr>
+          <a:lstStyle/>
+          <a:p>
+            <a:r>
+              <a:rPr kumimoji="1" lang="en-US" altLang="ja-JP" dirty="0">
+                <a:hlinkClick r:id="rId2"/>
+              </a:rPr>
+              <a:t>Source Code</a:t>
+            </a:r>
+            <a:endParaRPr kumimoji="1" lang="ja-JP" altLang="en-US" dirty="0"/>
+          </a:p>
+        </p:txBody>
+      </p:sp>
+      <p:sp>
+        <p:nvSpPr>
+          <p:cNvPr id="6" name="テキスト ボックス 5">
+            <a:extLst>
+              <a:ext uri="{FF2B5EF4-FFF2-40B4-BE49-F238E27FC236}">
+                <a16:creationId xmlns:a16="http://schemas.microsoft.com/office/drawing/2014/main" id="{D2C721D5-B564-4DD6-98BE-4FB6EF42A782}"/>
+              </a:ext>
+            </a:extLst>
+          </p:cNvPr>
+          <p:cNvSpPr txBox="1"/>
+          <p:nvPr/>
+        </p:nvSpPr>
+        <p:spPr>
+          <a:xfrm>
+            <a:off x="8318377" y="3864751"/>
+            <a:ext cx="1464815" cy="369332"/>
+          </a:xfrm>
+          <a:prstGeom prst="rect">
+            <a:avLst/>
+          </a:prstGeom>
+          <a:noFill/>
+        </p:spPr>
+        <p:txBody>
+          <a:bodyPr wrap="square" rtlCol="0">
+            <a:spAutoFit/>
+          </a:bodyPr>
+          <a:lstStyle/>
+          <a:p>
+            <a:r>
+              <a:rPr kumimoji="1" lang="en-US" altLang="ja-JP" dirty="0">
+                <a:hlinkClick r:id="rId3"/>
+              </a:rPr>
+              <a:t>Source Code</a:t>
+            </a:r>
+            <a:endParaRPr kumimoji="1" lang="ja-JP" altLang="en-US" dirty="0"/>
           </a:p>
         </p:txBody>
       </p:sp>

</xml_diff>

<commit_message>
Control post update/delete button on index page.
</commit_message>
<xml_diff>
--- a/docs/tutorial/Yii2RbacTutorial.pptx
+++ b/docs/tutorial/Yii2RbacTutorial.pptx
@@ -5,7 +5,7 @@
     <p:sldMasterId id="2147483648" r:id="rId1"/>
   </p:sldMasterIdLst>
   <p:notesMasterIdLst>
-    <p:notesMasterId r:id="rId24"/>
+    <p:notesMasterId r:id="rId28"/>
   </p:notesMasterIdLst>
   <p:sldIdLst>
     <p:sldId id="256" r:id="rId2"/>
@@ -26,10 +26,14 @@
     <p:sldId id="272" r:id="rId17"/>
     <p:sldId id="275" r:id="rId18"/>
     <p:sldId id="267" r:id="rId19"/>
-    <p:sldId id="276" r:id="rId20"/>
-    <p:sldId id="277" r:id="rId21"/>
-    <p:sldId id="278" r:id="rId22"/>
-    <p:sldId id="279" r:id="rId23"/>
+    <p:sldId id="283" r:id="rId20"/>
+    <p:sldId id="276" r:id="rId21"/>
+    <p:sldId id="280" r:id="rId22"/>
+    <p:sldId id="277" r:id="rId23"/>
+    <p:sldId id="281" r:id="rId24"/>
+    <p:sldId id="282" r:id="rId25"/>
+    <p:sldId id="278" r:id="rId26"/>
+    <p:sldId id="279" r:id="rId27"/>
   </p:sldIdLst>
   <p:sldSz cx="12192000" cy="6858000"/>
   <p:notesSz cx="6858000" cy="9144000"/>
@@ -8585,7 +8589,7 @@
           <p:cNvPr id="2" name="タイトル 1">
             <a:extLst>
               <a:ext uri="{FF2B5EF4-FFF2-40B4-BE49-F238E27FC236}">
-                <a16:creationId xmlns:a16="http://schemas.microsoft.com/office/drawing/2014/main" id="{4B0A1C97-E14C-4B2E-9472-BC9F92C9DA0F}"/>
+                <a16:creationId xmlns:a16="http://schemas.microsoft.com/office/drawing/2014/main" id="{56DFA5E8-81ED-4AE4-845C-3A2CCBCACFF3}"/>
               </a:ext>
             </a:extLst>
           </p:cNvPr>
@@ -8603,15 +8607,7 @@
           <a:p>
             <a:r>
               <a:rPr lang="en-US" altLang="ja-JP" dirty="0"/>
-              <a:t>Access control on actions (using </a:t>
-            </a:r>
-            <a:r>
-              <a:rPr lang="en-US" altLang="ja-JP" dirty="0" err="1"/>
-              <a:t>ACF</a:t>
-            </a:r>
-            <a:r>
-              <a:rPr lang="en-US" altLang="ja-JP" dirty="0"/>
-              <a:t>)</a:t>
+              <a:t>Demo system</a:t>
             </a:r>
             <a:endParaRPr kumimoji="1" lang="ja-JP" altLang="en-US" dirty="0"/>
           </a:p>
@@ -8619,10 +8615,39 @@
       </p:sp>
       <p:sp>
         <p:nvSpPr>
-          <p:cNvPr id="4" name="テキスト ボックス 3">
+          <p:cNvPr id="4" name="スライド番号プレースホルダー 3">
             <a:extLst>
               <a:ext uri="{FF2B5EF4-FFF2-40B4-BE49-F238E27FC236}">
-                <a16:creationId xmlns:a16="http://schemas.microsoft.com/office/drawing/2014/main" id="{CCE6C103-BEDA-4E8D-9377-DBA84EE64931}"/>
+                <a16:creationId xmlns:a16="http://schemas.microsoft.com/office/drawing/2014/main" id="{73B880B9-BB04-4EEB-8706-506E6A79FB5F}"/>
+              </a:ext>
+            </a:extLst>
+          </p:cNvPr>
+          <p:cNvSpPr>
+            <a:spLocks noGrp="1"/>
+          </p:cNvSpPr>
+          <p:nvPr>
+            <p:ph type="sldNum" sz="quarter" idx="12"/>
+          </p:nvPr>
+        </p:nvSpPr>
+        <p:spPr/>
+        <p:txBody>
+          <a:bodyPr/>
+          <a:lstStyle/>
+          <a:p>
+            <a:fld id="{F8D8928E-AA9A-4D89-BC1F-A2C05AB4BD92}" type="slidenum">
+              <a:rPr kumimoji="1" lang="ja-JP" altLang="en-US" smtClean="0"/>
+              <a:t>19</a:t>
+            </a:fld>
+            <a:endParaRPr kumimoji="1" lang="ja-JP" altLang="en-US"/>
+          </a:p>
+        </p:txBody>
+      </p:sp>
+      <p:sp>
+        <p:nvSpPr>
+          <p:cNvPr id="5" name="テキスト ボックス 4">
+            <a:extLst>
+              <a:ext uri="{FF2B5EF4-FFF2-40B4-BE49-F238E27FC236}">
+                <a16:creationId xmlns:a16="http://schemas.microsoft.com/office/drawing/2014/main" id="{D6613F09-77B0-48E7-B6FA-31FF3A41DBE1}"/>
               </a:ext>
             </a:extLst>
           </p:cNvPr>
@@ -8631,13 +8656,18 @@
         </p:nvSpPr>
         <p:spPr>
           <a:xfrm>
-            <a:off x="838199" y="1690688"/>
-            <a:ext cx="10515599" cy="5324535"/>
+            <a:off x="902516" y="1513694"/>
+            <a:ext cx="5193484" cy="1631216"/>
           </a:xfrm>
           <a:prstGeom prst="rect">
             <a:avLst/>
           </a:prstGeom>
           <a:noFill/>
+          <a:ln>
+            <a:solidFill>
+              <a:schemeClr val="tx1"/>
+            </a:solidFill>
+          </a:ln>
         </p:spPr>
         <p:txBody>
           <a:bodyPr wrap="square" rtlCol="0">
@@ -8646,521 +8676,135 @@
           <a:lstStyle/>
           <a:p>
             <a:r>
-              <a:rPr lang="en-US" altLang="ja-JP" sz="1000" dirty="0">
-                <a:latin typeface="Courier New" panose="02070309020205020404" pitchFamily="49" charset="0"/>
-                <a:cs typeface="Courier New" panose="02070309020205020404" pitchFamily="49" charset="0"/>
-              </a:rPr>
-              <a:t>class </a:t>
-            </a:r>
-            <a:r>
-              <a:rPr lang="en-US" altLang="ja-JP" sz="1000" dirty="0" err="1">
-                <a:latin typeface="Courier New" panose="02070309020205020404" pitchFamily="49" charset="0"/>
-                <a:cs typeface="Courier New" panose="02070309020205020404" pitchFamily="49" charset="0"/>
-              </a:rPr>
-              <a:t>PostController</a:t>
-            </a:r>
-            <a:r>
-              <a:rPr lang="en-US" altLang="ja-JP" sz="1000" dirty="0">
-                <a:latin typeface="Courier New" panose="02070309020205020404" pitchFamily="49" charset="0"/>
-                <a:cs typeface="Courier New" panose="02070309020205020404" pitchFamily="49" charset="0"/>
-              </a:rPr>
-              <a:t> extends Controller</a:t>
-            </a:r>
-          </a:p>
-          <a:p>
-            <a:r>
-              <a:rPr lang="en-US" altLang="ja-JP" sz="1000" dirty="0">
-                <a:latin typeface="Courier New" panose="02070309020205020404" pitchFamily="49" charset="0"/>
-                <a:cs typeface="Courier New" panose="02070309020205020404" pitchFamily="49" charset="0"/>
-              </a:rPr>
-              <a:t>{</a:t>
-            </a:r>
-          </a:p>
-          <a:p>
-            <a:r>
-              <a:rPr lang="en-US" altLang="ja-JP" sz="1000" dirty="0">
-                <a:latin typeface="Courier New" panose="02070309020205020404" pitchFamily="49" charset="0"/>
-                <a:cs typeface="Courier New" panose="02070309020205020404" pitchFamily="49" charset="0"/>
-              </a:rPr>
-              <a:t>    public function behaviors()</a:t>
-            </a:r>
-          </a:p>
-          <a:p>
-            <a:r>
-              <a:rPr lang="en-US" altLang="ja-JP" sz="1000" dirty="0">
-                <a:latin typeface="Courier New" panose="02070309020205020404" pitchFamily="49" charset="0"/>
-                <a:cs typeface="Courier New" panose="02070309020205020404" pitchFamily="49" charset="0"/>
-              </a:rPr>
-              <a:t>    {</a:t>
-            </a:r>
-          </a:p>
-          <a:p>
-            <a:r>
-              <a:rPr lang="en-US" altLang="ja-JP" sz="1000" dirty="0">
-                <a:latin typeface="Courier New" panose="02070309020205020404" pitchFamily="49" charset="0"/>
-                <a:cs typeface="Courier New" panose="02070309020205020404" pitchFamily="49" charset="0"/>
-              </a:rPr>
-              <a:t>        return [</a:t>
-            </a:r>
-          </a:p>
-          <a:p>
-            <a:r>
-              <a:rPr lang="en-US" altLang="ja-JP" sz="1000" dirty="0">
-                <a:latin typeface="Courier New" panose="02070309020205020404" pitchFamily="49" charset="0"/>
-                <a:cs typeface="Courier New" panose="02070309020205020404" pitchFamily="49" charset="0"/>
-              </a:rPr>
-              <a:t>            'access' =&gt; [</a:t>
-            </a:r>
-          </a:p>
-          <a:p>
-            <a:r>
-              <a:rPr lang="en-US" altLang="ja-JP" sz="1000" dirty="0">
-                <a:latin typeface="Courier New" panose="02070309020205020404" pitchFamily="49" charset="0"/>
-                <a:cs typeface="Courier New" panose="02070309020205020404" pitchFamily="49" charset="0"/>
-              </a:rPr>
-              <a:t>                'class' =&gt; </a:t>
-            </a:r>
-            <a:r>
-              <a:rPr lang="en-US" altLang="ja-JP" sz="1000" dirty="0" err="1">
-                <a:latin typeface="Courier New" panose="02070309020205020404" pitchFamily="49" charset="0"/>
-                <a:cs typeface="Courier New" panose="02070309020205020404" pitchFamily="49" charset="0"/>
-              </a:rPr>
-              <a:t>AccessControl</a:t>
-            </a:r>
-            <a:r>
-              <a:rPr lang="en-US" altLang="ja-JP" sz="1000" dirty="0">
-                <a:latin typeface="Courier New" panose="02070309020205020404" pitchFamily="49" charset="0"/>
-                <a:cs typeface="Courier New" panose="02070309020205020404" pitchFamily="49" charset="0"/>
-              </a:rPr>
-              <a:t>::</a:t>
-            </a:r>
-            <a:r>
-              <a:rPr lang="en-US" altLang="ja-JP" sz="1000" dirty="0" err="1">
-                <a:latin typeface="Courier New" panose="02070309020205020404" pitchFamily="49" charset="0"/>
-                <a:cs typeface="Courier New" panose="02070309020205020404" pitchFamily="49" charset="0"/>
-              </a:rPr>
-              <a:t>className</a:t>
-            </a:r>
-            <a:r>
-              <a:rPr lang="en-US" altLang="ja-JP" sz="1000" dirty="0">
-                <a:latin typeface="Courier New" panose="02070309020205020404" pitchFamily="49" charset="0"/>
-                <a:cs typeface="Courier New" panose="02070309020205020404" pitchFamily="49" charset="0"/>
-              </a:rPr>
-              <a:t>(),</a:t>
-            </a:r>
-          </a:p>
-          <a:p>
-            <a:r>
-              <a:rPr lang="en-US" altLang="ja-JP" sz="1000" dirty="0">
-                <a:latin typeface="Courier New" panose="02070309020205020404" pitchFamily="49" charset="0"/>
-                <a:cs typeface="Courier New" panose="02070309020205020404" pitchFamily="49" charset="0"/>
-              </a:rPr>
-              <a:t>                'rules' =&gt; [</a:t>
-            </a:r>
-          </a:p>
-          <a:p>
-            <a:r>
-              <a:rPr lang="en-US" altLang="ja-JP" sz="1000" dirty="0">
-                <a:latin typeface="Courier New" panose="02070309020205020404" pitchFamily="49" charset="0"/>
-                <a:cs typeface="Courier New" panose="02070309020205020404" pitchFamily="49" charset="0"/>
-              </a:rPr>
-              <a:t>                    [</a:t>
-            </a:r>
-          </a:p>
-          <a:p>
-            <a:r>
-              <a:rPr lang="en-US" altLang="ja-JP" sz="1000" dirty="0">
-                <a:latin typeface="Courier New" panose="02070309020205020404" pitchFamily="49" charset="0"/>
-                <a:cs typeface="Courier New" panose="02070309020205020404" pitchFamily="49" charset="0"/>
-              </a:rPr>
-              <a:t>                        'allow' =&gt; true,</a:t>
-            </a:r>
-          </a:p>
-          <a:p>
-            <a:r>
-              <a:rPr lang="en-US" altLang="ja-JP" sz="1000" dirty="0">
-                <a:latin typeface="Courier New" panose="02070309020205020404" pitchFamily="49" charset="0"/>
-                <a:cs typeface="Courier New" panose="02070309020205020404" pitchFamily="49" charset="0"/>
-              </a:rPr>
-              <a:t>                        'actions' =&gt; ['index', 'view'],</a:t>
-            </a:r>
-          </a:p>
-          <a:p>
-            <a:r>
-              <a:rPr lang="en-US" altLang="ja-JP" sz="1000" dirty="0">
-                <a:latin typeface="Courier New" panose="02070309020205020404" pitchFamily="49" charset="0"/>
-                <a:cs typeface="Courier New" panose="02070309020205020404" pitchFamily="49" charset="0"/>
-              </a:rPr>
-              <a:t>                        'roles' =&gt; ['@'],</a:t>
-            </a:r>
-          </a:p>
-          <a:p>
-            <a:r>
-              <a:rPr lang="en-US" altLang="ja-JP" sz="1000" dirty="0">
-                <a:latin typeface="Courier New" panose="02070309020205020404" pitchFamily="49" charset="0"/>
-                <a:cs typeface="Courier New" panose="02070309020205020404" pitchFamily="49" charset="0"/>
-              </a:rPr>
-              <a:t>                    ],</a:t>
-            </a:r>
-          </a:p>
-          <a:p>
-            <a:r>
-              <a:rPr lang="en-US" altLang="ja-JP" sz="1000" dirty="0">
-                <a:latin typeface="Courier New" panose="02070309020205020404" pitchFamily="49" charset="0"/>
-                <a:cs typeface="Courier New" panose="02070309020205020404" pitchFamily="49" charset="0"/>
-              </a:rPr>
-              <a:t>                    [</a:t>
-            </a:r>
-          </a:p>
-          <a:p>
-            <a:r>
-              <a:rPr lang="en-US" altLang="ja-JP" sz="1000" dirty="0">
-                <a:latin typeface="Courier New" panose="02070309020205020404" pitchFamily="49" charset="0"/>
-                <a:cs typeface="Courier New" panose="02070309020205020404" pitchFamily="49" charset="0"/>
-              </a:rPr>
-              <a:t>                        // In fact, we don't need to define this rule here, but can defined it in roles = @ above.</a:t>
-            </a:r>
-          </a:p>
-          <a:p>
-            <a:r>
-              <a:rPr lang="en-US" altLang="ja-JP" sz="1000" dirty="0">
-                <a:latin typeface="Courier New" panose="02070309020205020404" pitchFamily="49" charset="0"/>
-                <a:cs typeface="Courier New" panose="02070309020205020404" pitchFamily="49" charset="0"/>
-              </a:rPr>
-              <a:t>                        // I put it here just for an example.</a:t>
-            </a:r>
-          </a:p>
-          <a:p>
-            <a:r>
               <a:rPr lang="en-US" altLang="ja-JP" sz="1000" b="1" dirty="0">
-                <a:solidFill>
-                  <a:srgbClr val="FF0000"/>
-                </a:solidFill>
-                <a:latin typeface="Courier New" panose="02070309020205020404" pitchFamily="49" charset="0"/>
-                <a:cs typeface="Courier New" panose="02070309020205020404" pitchFamily="49" charset="0"/>
-              </a:rPr>
-              <a:t>                        'allow' =&gt; 'true',</a:t>
-            </a:r>
-          </a:p>
-          <a:p>
-            <a:r>
-              <a:rPr lang="en-US" altLang="ja-JP" sz="1000" b="1" dirty="0">
-                <a:solidFill>
-                  <a:srgbClr val="FF0000"/>
-                </a:solidFill>
-                <a:latin typeface="Courier New" panose="02070309020205020404" pitchFamily="49" charset="0"/>
-                <a:cs typeface="Courier New" panose="02070309020205020404" pitchFamily="49" charset="0"/>
-              </a:rPr>
-              <a:t>                        'actions' =&gt; ['create'],</a:t>
-            </a:r>
-          </a:p>
-          <a:p>
-            <a:r>
-              <a:rPr lang="en-US" altLang="ja-JP" sz="1000" b="1" dirty="0">
-                <a:solidFill>
-                  <a:srgbClr val="FF0000"/>
-                </a:solidFill>
-                <a:latin typeface="Courier New" panose="02070309020205020404" pitchFamily="49" charset="0"/>
-                <a:cs typeface="Courier New" panose="02070309020205020404" pitchFamily="49" charset="0"/>
-              </a:rPr>
-              <a:t>                        'roles' =&gt; ['</a:t>
-            </a:r>
-            <a:r>
-              <a:rPr lang="en-US" altLang="ja-JP" sz="1000" b="1" dirty="0" err="1">
-                <a:solidFill>
-                  <a:srgbClr val="FF0000"/>
-                </a:solidFill>
-                <a:latin typeface="Courier New" panose="02070309020205020404" pitchFamily="49" charset="0"/>
-                <a:cs typeface="Courier New" panose="02070309020205020404" pitchFamily="49" charset="0"/>
-              </a:rPr>
-              <a:t>createPost</a:t>
-            </a:r>
-            <a:r>
-              <a:rPr lang="en-US" altLang="ja-JP" sz="1000" b="1" dirty="0">
-                <a:solidFill>
-                  <a:srgbClr val="FF0000"/>
-                </a:solidFill>
-                <a:latin typeface="Courier New" panose="02070309020205020404" pitchFamily="49" charset="0"/>
-                <a:cs typeface="Courier New" panose="02070309020205020404" pitchFamily="49" charset="0"/>
-              </a:rPr>
-              <a:t>'],</a:t>
-            </a:r>
-          </a:p>
-          <a:p>
-            <a:r>
-              <a:rPr lang="en-US" altLang="ja-JP" sz="1000" dirty="0">
-                <a:latin typeface="Courier New" panose="02070309020205020404" pitchFamily="49" charset="0"/>
-                <a:cs typeface="Courier New" panose="02070309020205020404" pitchFamily="49" charset="0"/>
-              </a:rPr>
-              <a:t>                    ],</a:t>
-            </a:r>
-          </a:p>
-          <a:p>
-            <a:r>
-              <a:rPr lang="en-US" altLang="ja-JP" sz="1000" dirty="0">
-                <a:latin typeface="Courier New" panose="02070309020205020404" pitchFamily="49" charset="0"/>
-                <a:cs typeface="Courier New" panose="02070309020205020404" pitchFamily="49" charset="0"/>
-              </a:rPr>
-              <a:t>                    [</a:t>
-            </a:r>
-          </a:p>
-          <a:p>
-            <a:r>
-              <a:rPr lang="en-US" altLang="ja-JP" sz="1000" dirty="0">
-                <a:latin typeface="Courier New" panose="02070309020205020404" pitchFamily="49" charset="0"/>
-                <a:cs typeface="Courier New" panose="02070309020205020404" pitchFamily="49" charset="0"/>
-              </a:rPr>
-              <a:t>                        'allow' =&gt; true,</a:t>
-            </a:r>
-          </a:p>
-          <a:p>
-            <a:r>
-              <a:rPr lang="en-US" altLang="ja-JP" sz="1000" dirty="0">
-                <a:latin typeface="Courier New" panose="02070309020205020404" pitchFamily="49" charset="0"/>
-                <a:cs typeface="Courier New" panose="02070309020205020404" pitchFamily="49" charset="0"/>
-              </a:rPr>
-              <a:t>                        'actions' =&gt; ['update', 'delete'],</a:t>
-            </a:r>
-          </a:p>
-          <a:p>
-            <a:r>
-              <a:rPr lang="en-US" altLang="ja-JP" sz="1000" dirty="0">
-                <a:latin typeface="Courier New" panose="02070309020205020404" pitchFamily="49" charset="0"/>
-                <a:cs typeface="Courier New" panose="02070309020205020404" pitchFamily="49" charset="0"/>
-              </a:rPr>
-              <a:t>                        </a:t>
-            </a:r>
-            <a:r>
-              <a:rPr lang="en-US" altLang="ja-JP" sz="1000" b="1" dirty="0">
-                <a:solidFill>
-                  <a:srgbClr val="FF0000"/>
-                </a:solidFill>
-                <a:latin typeface="Courier New" panose="02070309020205020404" pitchFamily="49" charset="0"/>
-                <a:cs typeface="Courier New" panose="02070309020205020404" pitchFamily="49" charset="0"/>
-              </a:rPr>
-              <a:t>'roles' =&gt; ['</a:t>
-            </a:r>
-            <a:r>
-              <a:rPr lang="en-US" altLang="ja-JP" sz="1000" b="1" dirty="0" err="1">
-                <a:solidFill>
-                  <a:srgbClr val="FF0000"/>
-                </a:solidFill>
-                <a:latin typeface="Courier New" panose="02070309020205020404" pitchFamily="49" charset="0"/>
-                <a:cs typeface="Courier New" panose="02070309020205020404" pitchFamily="49" charset="0"/>
-              </a:rPr>
-              <a:t>updatePost</a:t>
-            </a:r>
-            <a:r>
-              <a:rPr lang="en-US" altLang="ja-JP" sz="1000" b="1" dirty="0">
-                <a:solidFill>
-                  <a:srgbClr val="FF0000"/>
-                </a:solidFill>
-                <a:latin typeface="Courier New" panose="02070309020205020404" pitchFamily="49" charset="0"/>
-                <a:cs typeface="Courier New" panose="02070309020205020404" pitchFamily="49" charset="0"/>
-              </a:rPr>
-              <a:t>'],</a:t>
-            </a:r>
-          </a:p>
-          <a:p>
-            <a:r>
-              <a:rPr lang="en-US" altLang="ja-JP" sz="1000" b="1" dirty="0">
-                <a:solidFill>
-                  <a:srgbClr val="FF0000"/>
-                </a:solidFill>
-                <a:latin typeface="Courier New" panose="02070309020205020404" pitchFamily="49" charset="0"/>
-                <a:cs typeface="Courier New" panose="02070309020205020404" pitchFamily="49" charset="0"/>
-              </a:rPr>
-              <a:t>                        '</a:t>
-            </a:r>
-            <a:r>
-              <a:rPr lang="en-US" altLang="ja-JP" sz="1000" b="1" dirty="0" err="1">
-                <a:solidFill>
-                  <a:srgbClr val="FF0000"/>
-                </a:solidFill>
-                <a:latin typeface="Courier New" panose="02070309020205020404" pitchFamily="49" charset="0"/>
-                <a:cs typeface="Courier New" panose="02070309020205020404" pitchFamily="49" charset="0"/>
-              </a:rPr>
-              <a:t>roleParams</a:t>
-            </a:r>
-            <a:r>
-              <a:rPr lang="en-US" altLang="ja-JP" sz="1000" b="1" dirty="0">
-                <a:solidFill>
-                  <a:srgbClr val="FF0000"/>
-                </a:solidFill>
-                <a:latin typeface="Courier New" panose="02070309020205020404" pitchFamily="49" charset="0"/>
-                <a:cs typeface="Courier New" panose="02070309020205020404" pitchFamily="49" charset="0"/>
-              </a:rPr>
-              <a:t>' =&gt; function() {</a:t>
-            </a:r>
-          </a:p>
-          <a:p>
-            <a:r>
-              <a:rPr lang="en-US" altLang="ja-JP" sz="1000" b="1" dirty="0">
-                <a:solidFill>
-                  <a:srgbClr val="FF0000"/>
-                </a:solidFill>
-                <a:latin typeface="Courier New" panose="02070309020205020404" pitchFamily="49" charset="0"/>
-                <a:cs typeface="Courier New" panose="02070309020205020404" pitchFamily="49" charset="0"/>
-              </a:rPr>
-              <a:t>                            return ['post' =&gt; Post::</a:t>
-            </a:r>
-            <a:r>
-              <a:rPr lang="en-US" altLang="ja-JP" sz="1000" b="1" dirty="0" err="1">
-                <a:solidFill>
-                  <a:srgbClr val="FF0000"/>
-                </a:solidFill>
-                <a:latin typeface="Courier New" panose="02070309020205020404" pitchFamily="49" charset="0"/>
-                <a:cs typeface="Courier New" panose="02070309020205020404" pitchFamily="49" charset="0"/>
-              </a:rPr>
-              <a:t>findOne</a:t>
-            </a:r>
-            <a:r>
-              <a:rPr lang="en-US" altLang="ja-JP" sz="1000" b="1" dirty="0">
-                <a:solidFill>
-                  <a:srgbClr val="FF0000"/>
-                </a:solidFill>
-                <a:latin typeface="Courier New" panose="02070309020205020404" pitchFamily="49" charset="0"/>
-                <a:cs typeface="Courier New" panose="02070309020205020404" pitchFamily="49" charset="0"/>
-              </a:rPr>
-              <a:t>(['id' =&gt; </a:t>
-            </a:r>
-            <a:r>
-              <a:rPr lang="en-US" altLang="ja-JP" sz="1000" b="1" dirty="0" err="1">
-                <a:solidFill>
-                  <a:srgbClr val="FF0000"/>
-                </a:solidFill>
-                <a:latin typeface="Courier New" panose="02070309020205020404" pitchFamily="49" charset="0"/>
-                <a:cs typeface="Courier New" panose="02070309020205020404" pitchFamily="49" charset="0"/>
-              </a:rPr>
-              <a:t>Yii</a:t>
-            </a:r>
-            <a:r>
-              <a:rPr lang="en-US" altLang="ja-JP" sz="1000" b="1" dirty="0">
-                <a:solidFill>
-                  <a:srgbClr val="FF0000"/>
-                </a:solidFill>
-                <a:latin typeface="Courier New" panose="02070309020205020404" pitchFamily="49" charset="0"/>
-                <a:cs typeface="Courier New" panose="02070309020205020404" pitchFamily="49" charset="0"/>
-              </a:rPr>
-              <a:t>::$app-&gt;request-&gt;get('id')])];</a:t>
-            </a:r>
-          </a:p>
-          <a:p>
-            <a:r>
-              <a:rPr lang="en-US" altLang="ja-JP" sz="1000" b="1" dirty="0">
-                <a:solidFill>
-                  <a:srgbClr val="FF0000"/>
-                </a:solidFill>
-                <a:latin typeface="Courier New" panose="02070309020205020404" pitchFamily="49" charset="0"/>
-                <a:cs typeface="Courier New" panose="02070309020205020404" pitchFamily="49" charset="0"/>
-              </a:rPr>
-              <a:t>                        },     </a:t>
-            </a:r>
-            <a:r>
-              <a:rPr lang="en-US" altLang="ja-JP" sz="1000" dirty="0">
-                <a:latin typeface="Courier New" panose="02070309020205020404" pitchFamily="49" charset="0"/>
-                <a:cs typeface="Courier New" panose="02070309020205020404" pitchFamily="49" charset="0"/>
-              </a:rPr>
-              <a:t>               </a:t>
-            </a:r>
-          </a:p>
-          <a:p>
-            <a:r>
-              <a:rPr lang="en-US" altLang="ja-JP" sz="1000" dirty="0">
-                <a:latin typeface="Courier New" panose="02070309020205020404" pitchFamily="49" charset="0"/>
-                <a:cs typeface="Courier New" panose="02070309020205020404" pitchFamily="49" charset="0"/>
-              </a:rPr>
-              <a:t>                    ],</a:t>
-            </a:r>
-          </a:p>
-          <a:p>
-            <a:r>
-              <a:rPr lang="en-US" altLang="ja-JP" sz="1000" dirty="0">
-                <a:latin typeface="Courier New" panose="02070309020205020404" pitchFamily="49" charset="0"/>
-                <a:cs typeface="Courier New" panose="02070309020205020404" pitchFamily="49" charset="0"/>
-              </a:rPr>
-              <a:t>                ],</a:t>
-            </a:r>
-          </a:p>
-          <a:p>
-            <a:r>
-              <a:rPr lang="en-US" altLang="ja-JP" sz="1000" dirty="0">
-                <a:latin typeface="Courier New" panose="02070309020205020404" pitchFamily="49" charset="0"/>
-                <a:cs typeface="Courier New" panose="02070309020205020404" pitchFamily="49" charset="0"/>
-              </a:rPr>
-              <a:t>            ],</a:t>
-            </a:r>
-          </a:p>
-          <a:p>
-            <a:r>
-              <a:rPr lang="en-US" altLang="ja-JP" sz="1000" dirty="0">
-                <a:latin typeface="Courier New" panose="02070309020205020404" pitchFamily="49" charset="0"/>
-                <a:cs typeface="Courier New" panose="02070309020205020404" pitchFamily="49" charset="0"/>
-              </a:rPr>
-              <a:t>        ];</a:t>
-            </a:r>
-          </a:p>
-          <a:p>
-            <a:r>
-              <a:rPr lang="en-US" altLang="ja-JP" sz="1000" dirty="0">
-                <a:latin typeface="Courier New" panose="02070309020205020404" pitchFamily="49" charset="0"/>
-                <a:cs typeface="Courier New" panose="02070309020205020404" pitchFamily="49" charset="0"/>
-              </a:rPr>
-              <a:t>    }</a:t>
-            </a:r>
-          </a:p>
-          <a:p>
-            <a:r>
-              <a:rPr lang="en-US" altLang="ja-JP" sz="1000" dirty="0">
-                <a:latin typeface="Courier New" panose="02070309020205020404" pitchFamily="49" charset="0"/>
-                <a:cs typeface="Courier New" panose="02070309020205020404" pitchFamily="49" charset="0"/>
-              </a:rPr>
-              <a:t>}</a:t>
-            </a:r>
-          </a:p>
-          <a:p>
-            <a:endParaRPr kumimoji="1" lang="ja-JP" altLang="en-US" sz="1000" dirty="0">
+                <a:latin typeface="Courier New" panose="02070309020205020404" pitchFamily="49" charset="0"/>
+                <a:cs typeface="Courier New" panose="02070309020205020404" pitchFamily="49" charset="0"/>
+              </a:rPr>
+              <a:t>System setup</a:t>
+            </a:r>
+          </a:p>
+          <a:p>
+            <a:endParaRPr lang="en-US" altLang="ja-JP" sz="1000" dirty="0">
               <a:latin typeface="Courier New" panose="02070309020205020404" pitchFamily="49" charset="0"/>
               <a:cs typeface="Courier New" panose="02070309020205020404" pitchFamily="49" charset="0"/>
             </a:endParaRPr>
           </a:p>
-        </p:txBody>
-      </p:sp>
-      <p:sp>
-        <p:nvSpPr>
-          <p:cNvPr id="5" name="スライド番号プレースホルダー 4">
+          <a:p>
+            <a:r>
+              <a:rPr lang="en-US" altLang="ja-JP" sz="1000" dirty="0">
+                <a:latin typeface="Courier New" panose="02070309020205020404" pitchFamily="49" charset="0"/>
+                <a:cs typeface="Courier New" panose="02070309020205020404" pitchFamily="49" charset="0"/>
+              </a:rPr>
+              <a:t># Install </a:t>
+            </a:r>
+            <a:r>
+              <a:rPr lang="en-US" altLang="ja-JP" sz="1000" dirty="0" err="1">
+                <a:latin typeface="Courier New" panose="02070309020205020404" pitchFamily="49" charset="0"/>
+                <a:cs typeface="Courier New" panose="02070309020205020404" pitchFamily="49" charset="0"/>
+              </a:rPr>
+              <a:t>depencencies</a:t>
+            </a:r>
+            <a:r>
+              <a:rPr lang="en-US" altLang="ja-JP" sz="1000" dirty="0">
+                <a:latin typeface="Courier New" panose="02070309020205020404" pitchFamily="49" charset="0"/>
+                <a:cs typeface="Courier New" panose="02070309020205020404" pitchFamily="49" charset="0"/>
+              </a:rPr>
+              <a:t>.</a:t>
+            </a:r>
+          </a:p>
+          <a:p>
+            <a:r>
+              <a:rPr lang="en-US" altLang="ja-JP" sz="1000" dirty="0">
+                <a:latin typeface="Courier New" panose="02070309020205020404" pitchFamily="49" charset="0"/>
+                <a:cs typeface="Courier New" panose="02070309020205020404" pitchFamily="49" charset="0"/>
+              </a:rPr>
+              <a:t>composer install</a:t>
+            </a:r>
+          </a:p>
+          <a:p>
+            <a:br>
+              <a:rPr lang="en-US" altLang="ja-JP" sz="1000" dirty="0">
+                <a:latin typeface="Courier New" panose="02070309020205020404" pitchFamily="49" charset="0"/>
+                <a:cs typeface="Courier New" panose="02070309020205020404" pitchFamily="49" charset="0"/>
+              </a:rPr>
+            </a:br>
+            <a:r>
+              <a:rPr lang="en-US" altLang="ja-JP" sz="1000" dirty="0">
+                <a:latin typeface="Courier New" panose="02070309020205020404" pitchFamily="49" charset="0"/>
+                <a:cs typeface="Courier New" panose="02070309020205020404" pitchFamily="49" charset="0"/>
+              </a:rPr>
+              <a:t># Create database</a:t>
+            </a:r>
+          </a:p>
+          <a:p>
+            <a:r>
+              <a:rPr lang="en-US" altLang="ja-JP" sz="1000" dirty="0">
+                <a:latin typeface="Courier New" panose="02070309020205020404" pitchFamily="49" charset="0"/>
+                <a:cs typeface="Courier New" panose="02070309020205020404" pitchFamily="49" charset="0"/>
+              </a:rPr>
+              <a:t>./</a:t>
+            </a:r>
+            <a:r>
+              <a:rPr lang="en-US" altLang="ja-JP" sz="1000" dirty="0" err="1">
+                <a:latin typeface="Courier New" panose="02070309020205020404" pitchFamily="49" charset="0"/>
+                <a:cs typeface="Courier New" panose="02070309020205020404" pitchFamily="49" charset="0"/>
+              </a:rPr>
+              <a:t>yii</a:t>
+            </a:r>
+            <a:r>
+              <a:rPr lang="en-US" altLang="ja-JP" sz="1000" dirty="0">
+                <a:latin typeface="Courier New" panose="02070309020205020404" pitchFamily="49" charset="0"/>
+                <a:cs typeface="Courier New" panose="02070309020205020404" pitchFamily="49" charset="0"/>
+              </a:rPr>
+              <a:t> migrate</a:t>
+            </a:r>
+          </a:p>
+          <a:p>
+            <a:br>
+              <a:rPr lang="en-US" altLang="ja-JP" sz="1000" dirty="0">
+                <a:latin typeface="Courier New" panose="02070309020205020404" pitchFamily="49" charset="0"/>
+                <a:cs typeface="Courier New" panose="02070309020205020404" pitchFamily="49" charset="0"/>
+              </a:rPr>
+            </a:br>
+            <a:r>
+              <a:rPr lang="en-US" altLang="ja-JP" sz="1000" dirty="0">
+                <a:latin typeface="Courier New" panose="02070309020205020404" pitchFamily="49" charset="0"/>
+                <a:cs typeface="Courier New" panose="02070309020205020404" pitchFamily="49" charset="0"/>
+              </a:rPr>
+              <a:t># Create sample data for user and post</a:t>
+            </a:r>
+          </a:p>
+          <a:p>
+            <a:r>
+              <a:rPr lang="en-US" altLang="ja-JP" sz="1000" dirty="0">
+                <a:latin typeface="Courier New" panose="02070309020205020404" pitchFamily="49" charset="0"/>
+                <a:cs typeface="Courier New" panose="02070309020205020404" pitchFamily="49" charset="0"/>
+              </a:rPr>
+              <a:t>./</a:t>
+            </a:r>
+            <a:r>
+              <a:rPr lang="en-US" altLang="ja-JP" sz="1000" dirty="0" err="1">
+                <a:latin typeface="Courier New" panose="02070309020205020404" pitchFamily="49" charset="0"/>
+                <a:cs typeface="Courier New" panose="02070309020205020404" pitchFamily="49" charset="0"/>
+              </a:rPr>
+              <a:t>yii</a:t>
+            </a:r>
+            <a:r>
+              <a:rPr lang="en-US" altLang="ja-JP" sz="1000" dirty="0">
+                <a:latin typeface="Courier New" panose="02070309020205020404" pitchFamily="49" charset="0"/>
+                <a:cs typeface="Courier New" panose="02070309020205020404" pitchFamily="49" charset="0"/>
+              </a:rPr>
+              <a:t> initial-data</a:t>
+            </a:r>
+          </a:p>
+        </p:txBody>
+      </p:sp>
+      <p:sp>
+        <p:nvSpPr>
+          <p:cNvPr id="6" name="テキスト ボックス 5">
             <a:extLst>
               <a:ext uri="{FF2B5EF4-FFF2-40B4-BE49-F238E27FC236}">
-                <a16:creationId xmlns:a16="http://schemas.microsoft.com/office/drawing/2014/main" id="{5EB489E8-CDDC-4D69-A4EB-3ACA16D1D606}"/>
-              </a:ext>
-            </a:extLst>
-          </p:cNvPr>
-          <p:cNvSpPr>
-            <a:spLocks noGrp="1"/>
-          </p:cNvSpPr>
-          <p:nvPr>
-            <p:ph type="sldNum" sz="quarter" idx="12"/>
-          </p:nvPr>
-        </p:nvSpPr>
-        <p:spPr/>
-        <p:txBody>
-          <a:bodyPr/>
-          <a:lstStyle/>
-          <a:p>
-            <a:fld id="{F8D8928E-AA9A-4D89-BC1F-A2C05AB4BD92}" type="slidenum">
-              <a:rPr kumimoji="1" lang="ja-JP" altLang="en-US" smtClean="0"/>
-              <a:t>19</a:t>
-            </a:fld>
-            <a:endParaRPr kumimoji="1" lang="ja-JP" altLang="en-US"/>
-          </a:p>
-        </p:txBody>
-      </p:sp>
-      <p:sp>
-        <p:nvSpPr>
-          <p:cNvPr id="3" name="テキスト ボックス 2">
-            <a:extLst>
-              <a:ext uri="{FF2B5EF4-FFF2-40B4-BE49-F238E27FC236}">
-                <a16:creationId xmlns:a16="http://schemas.microsoft.com/office/drawing/2014/main" id="{EB47B340-BE6A-4004-A9F8-A61FE3C08E0E}"/>
+                <a16:creationId xmlns:a16="http://schemas.microsoft.com/office/drawing/2014/main" id="{64551094-E5B7-41F7-8EEB-3DB2CA256E47}"/>
               </a:ext>
             </a:extLst>
           </p:cNvPr>
@@ -9169,13 +8813,18 @@
         </p:nvSpPr>
         <p:spPr>
           <a:xfrm>
-            <a:off x="7901126" y="5903650"/>
-            <a:ext cx="1455938" cy="369332"/>
+            <a:off x="902516" y="3324296"/>
+            <a:ext cx="5193484" cy="1169551"/>
           </a:xfrm>
           <a:prstGeom prst="rect">
             <a:avLst/>
           </a:prstGeom>
           <a:noFill/>
+          <a:ln>
+            <a:solidFill>
+              <a:schemeClr val="tx1"/>
+            </a:solidFill>
+          </a:ln>
         </p:spPr>
         <p:txBody>
           <a:bodyPr wrap="square" rtlCol="0">
@@ -9184,19 +8833,117 @@
           <a:lstStyle/>
           <a:p>
             <a:r>
-              <a:rPr kumimoji="1" lang="en-US" altLang="ja-JP" dirty="0">
-                <a:hlinkClick r:id="rId2"/>
-              </a:rPr>
-              <a:t>Source Code</a:t>
-            </a:r>
-            <a:endParaRPr kumimoji="1" lang="ja-JP" altLang="en-US" dirty="0"/>
+              <a:rPr lang="en-US" altLang="ja-JP" sz="1000" b="1" dirty="0">
+                <a:latin typeface="Courier New" panose="02070309020205020404" pitchFamily="49" charset="0"/>
+                <a:cs typeface="Courier New" panose="02070309020205020404" pitchFamily="49" charset="0"/>
+              </a:rPr>
+              <a:t>This system has two users</a:t>
+            </a:r>
+          </a:p>
+          <a:p>
+            <a:endParaRPr lang="en-US" altLang="ja-JP" sz="1000" dirty="0">
+              <a:latin typeface="Courier New" panose="02070309020205020404" pitchFamily="49" charset="0"/>
+              <a:cs typeface="Courier New" panose="02070309020205020404" pitchFamily="49" charset="0"/>
+            </a:endParaRPr>
+          </a:p>
+          <a:p>
+            <a:r>
+              <a:rPr lang="en-US" altLang="ja-JP" sz="1000" dirty="0">
+                <a:latin typeface="Courier New" panose="02070309020205020404" pitchFamily="49" charset="0"/>
+                <a:cs typeface="Courier New" panose="02070309020205020404" pitchFamily="49" charset="0"/>
+              </a:rPr>
+              <a:t>Admin</a:t>
+            </a:r>
+          </a:p>
+          <a:p>
+            <a:r>
+              <a:rPr lang="en-US" altLang="ja-JP" sz="1000" dirty="0">
+                <a:latin typeface="Courier New" panose="02070309020205020404" pitchFamily="49" charset="0"/>
+                <a:cs typeface="Courier New" panose="02070309020205020404" pitchFamily="49" charset="0"/>
+              </a:rPr>
+              <a:t>Account: </a:t>
+            </a:r>
+            <a:r>
+              <a:rPr lang="en-US" altLang="ja-JP" sz="1000" dirty="0" err="1">
+                <a:latin typeface="Courier New" panose="02070309020205020404" pitchFamily="49" charset="0"/>
+                <a:cs typeface="Courier New" panose="02070309020205020404" pitchFamily="49" charset="0"/>
+              </a:rPr>
+              <a:t>user1</a:t>
+            </a:r>
+            <a:r>
+              <a:rPr lang="en-US" altLang="ja-JP" sz="1000" dirty="0">
+                <a:latin typeface="Courier New" panose="02070309020205020404" pitchFamily="49" charset="0"/>
+                <a:cs typeface="Courier New" panose="02070309020205020404" pitchFamily="49" charset="0"/>
+              </a:rPr>
+              <a:t>, Password: </a:t>
+            </a:r>
+            <a:r>
+              <a:rPr lang="en-US" altLang="ja-JP" sz="1000" dirty="0" err="1">
+                <a:latin typeface="Courier New" panose="02070309020205020404" pitchFamily="49" charset="0"/>
+                <a:cs typeface="Courier New" panose="02070309020205020404" pitchFamily="49" charset="0"/>
+              </a:rPr>
+              <a:t>password1</a:t>
+            </a:r>
+            <a:endParaRPr lang="en-US" altLang="ja-JP" sz="1000" dirty="0">
+              <a:latin typeface="Courier New" panose="02070309020205020404" pitchFamily="49" charset="0"/>
+              <a:cs typeface="Courier New" panose="02070309020205020404" pitchFamily="49" charset="0"/>
+            </a:endParaRPr>
+          </a:p>
+          <a:p>
+            <a:endParaRPr lang="en-US" altLang="ja-JP" sz="1000" dirty="0">
+              <a:latin typeface="Courier New" panose="02070309020205020404" pitchFamily="49" charset="0"/>
+              <a:cs typeface="Courier New" panose="02070309020205020404" pitchFamily="49" charset="0"/>
+            </a:endParaRPr>
+          </a:p>
+          <a:p>
+            <a:r>
+              <a:rPr lang="en-US" altLang="ja-JP" sz="1000" dirty="0">
+                <a:latin typeface="Courier New" panose="02070309020205020404" pitchFamily="49" charset="0"/>
+                <a:cs typeface="Courier New" panose="02070309020205020404" pitchFamily="49" charset="0"/>
+              </a:rPr>
+              <a:t>Normal user</a:t>
+            </a:r>
+          </a:p>
+          <a:p>
+            <a:r>
+              <a:rPr lang="en-US" altLang="ja-JP" sz="1000" dirty="0">
+                <a:latin typeface="Courier New" panose="02070309020205020404" pitchFamily="49" charset="0"/>
+                <a:cs typeface="Courier New" panose="02070309020205020404" pitchFamily="49" charset="0"/>
+              </a:rPr>
+              <a:t>Account: </a:t>
+            </a:r>
+            <a:r>
+              <a:rPr lang="en-US" altLang="ja-JP" sz="1000" dirty="0" err="1">
+                <a:latin typeface="Courier New" panose="02070309020205020404" pitchFamily="49" charset="0"/>
+                <a:cs typeface="Courier New" panose="02070309020205020404" pitchFamily="49" charset="0"/>
+              </a:rPr>
+              <a:t>user2</a:t>
+            </a:r>
+            <a:r>
+              <a:rPr lang="en-US" altLang="ja-JP" sz="1000" dirty="0">
+                <a:latin typeface="Courier New" panose="02070309020205020404" pitchFamily="49" charset="0"/>
+                <a:cs typeface="Courier New" panose="02070309020205020404" pitchFamily="49" charset="0"/>
+              </a:rPr>
+              <a:t>, Password: </a:t>
+            </a:r>
+            <a:r>
+              <a:rPr lang="en-US" altLang="ja-JP" sz="1000" dirty="0" err="1">
+                <a:latin typeface="Courier New" panose="02070309020205020404" pitchFamily="49" charset="0"/>
+                <a:cs typeface="Courier New" panose="02070309020205020404" pitchFamily="49" charset="0"/>
+              </a:rPr>
+              <a:t>password2</a:t>
+            </a:r>
+            <a:endParaRPr lang="en-US" altLang="ja-JP" sz="1000" dirty="0">
+              <a:latin typeface="Courier New" panose="02070309020205020404" pitchFamily="49" charset="0"/>
+              <a:cs typeface="Courier New" panose="02070309020205020404" pitchFamily="49" charset="0"/>
+            </a:endParaRPr>
           </a:p>
         </p:txBody>
       </p:sp>
     </p:spTree>
     <p:extLst>
       <p:ext uri="{BB962C8B-B14F-4D97-AF65-F5344CB8AC3E}">
-        <p14:creationId xmlns:p14="http://schemas.microsoft.com/office/powerpoint/2010/main" val="4135592093"/>
+        <p14:creationId xmlns:p14="http://schemas.microsoft.com/office/powerpoint/2010/main" val="1022080372"/>
       </p:ext>
     </p:extLst>
   </p:cSld>
@@ -9452,8 +9199,17 @@
           <a:p>
             <a:r>
               <a:rPr lang="en-US" altLang="ja-JP" dirty="0"/>
-              <a:t>Access control applied on UI</a:t>
-            </a:r>
+              <a:t>Access control on actions (using </a:t>
+            </a:r>
+            <a:r>
+              <a:rPr lang="en-US" altLang="ja-JP" dirty="0" err="1"/>
+              <a:t>ACF</a:t>
+            </a:r>
+            <a:r>
+              <a:rPr lang="en-US" altLang="ja-JP" dirty="0"/>
+              <a:t>)</a:t>
+            </a:r>
+            <a:endParaRPr kumimoji="1" lang="ja-JP" altLang="en-US" dirty="0"/>
           </a:p>
         </p:txBody>
       </p:sp>
@@ -9472,7 +9228,7 @@
         <p:spPr>
           <a:xfrm>
             <a:off x="838199" y="1690688"/>
-            <a:ext cx="10515599" cy="4339650"/>
+            <a:ext cx="10515599" cy="5324535"/>
           </a:xfrm>
           <a:prstGeom prst="rect">
             <a:avLst/>
@@ -9486,196 +9242,463 @@
           <a:lstStyle/>
           <a:p>
             <a:r>
-              <a:rPr lang="en-US" altLang="ja-JP" sz="1200" b="1" dirty="0">
-                <a:latin typeface="Courier New" panose="02070309020205020404" pitchFamily="49" charset="0"/>
-                <a:cs typeface="Courier New" panose="02070309020205020404" pitchFamily="49" charset="0"/>
-              </a:rPr>
-              <a:t>For menu bar</a:t>
-            </a:r>
-          </a:p>
-          <a:p>
-            <a:r>
-              <a:rPr lang="en-US" altLang="ja-JP" sz="1200" dirty="0">
-                <a:latin typeface="Courier New" panose="02070309020205020404" pitchFamily="49" charset="0"/>
-                <a:cs typeface="Courier New" panose="02070309020205020404" pitchFamily="49" charset="0"/>
-              </a:rPr>
-              <a:t>$items = [];</a:t>
-            </a:r>
-          </a:p>
-          <a:p>
-            <a:r>
-              <a:rPr lang="en-US" altLang="ja-JP" sz="1200" dirty="0">
-                <a:latin typeface="Courier New" panose="02070309020205020404" pitchFamily="49" charset="0"/>
-                <a:cs typeface="Courier New" panose="02070309020205020404" pitchFamily="49" charset="0"/>
-              </a:rPr>
-              <a:t>if (</a:t>
-            </a:r>
-            <a:r>
-              <a:rPr lang="en-US" altLang="ja-JP" sz="1200" dirty="0" err="1">
+              <a:rPr lang="en-US" altLang="ja-JP" sz="1000" dirty="0">
+                <a:latin typeface="Courier New" panose="02070309020205020404" pitchFamily="49" charset="0"/>
+                <a:cs typeface="Courier New" panose="02070309020205020404" pitchFamily="49" charset="0"/>
+              </a:rPr>
+              <a:t>class </a:t>
+            </a:r>
+            <a:r>
+              <a:rPr lang="en-US" altLang="ja-JP" sz="1000" dirty="0" err="1">
+                <a:latin typeface="Courier New" panose="02070309020205020404" pitchFamily="49" charset="0"/>
+                <a:cs typeface="Courier New" panose="02070309020205020404" pitchFamily="49" charset="0"/>
+              </a:rPr>
+              <a:t>PostController</a:t>
+            </a:r>
+            <a:r>
+              <a:rPr lang="en-US" altLang="ja-JP" sz="1000" dirty="0">
+                <a:latin typeface="Courier New" panose="02070309020205020404" pitchFamily="49" charset="0"/>
+                <a:cs typeface="Courier New" panose="02070309020205020404" pitchFamily="49" charset="0"/>
+              </a:rPr>
+              <a:t> extends Controller</a:t>
+            </a:r>
+          </a:p>
+          <a:p>
+            <a:r>
+              <a:rPr lang="en-US" altLang="ja-JP" sz="1000" dirty="0">
+                <a:latin typeface="Courier New" panose="02070309020205020404" pitchFamily="49" charset="0"/>
+                <a:cs typeface="Courier New" panose="02070309020205020404" pitchFamily="49" charset="0"/>
+              </a:rPr>
+              <a:t>{</a:t>
+            </a:r>
+          </a:p>
+          <a:p>
+            <a:r>
+              <a:rPr lang="en-US" altLang="ja-JP" sz="1000" dirty="0">
+                <a:latin typeface="Courier New" panose="02070309020205020404" pitchFamily="49" charset="0"/>
+                <a:cs typeface="Courier New" panose="02070309020205020404" pitchFamily="49" charset="0"/>
+              </a:rPr>
+              <a:t>    public function behaviors()</a:t>
+            </a:r>
+          </a:p>
+          <a:p>
+            <a:r>
+              <a:rPr lang="en-US" altLang="ja-JP" sz="1000" dirty="0">
+                <a:latin typeface="Courier New" panose="02070309020205020404" pitchFamily="49" charset="0"/>
+                <a:cs typeface="Courier New" panose="02070309020205020404" pitchFamily="49" charset="0"/>
+              </a:rPr>
+              <a:t>    {</a:t>
+            </a:r>
+          </a:p>
+          <a:p>
+            <a:r>
+              <a:rPr lang="en-US" altLang="ja-JP" sz="1000" dirty="0">
+                <a:latin typeface="Courier New" panose="02070309020205020404" pitchFamily="49" charset="0"/>
+                <a:cs typeface="Courier New" panose="02070309020205020404" pitchFamily="49" charset="0"/>
+              </a:rPr>
+              <a:t>        return [</a:t>
+            </a:r>
+          </a:p>
+          <a:p>
+            <a:r>
+              <a:rPr lang="en-US" altLang="ja-JP" sz="1000" dirty="0">
+                <a:latin typeface="Courier New" panose="02070309020205020404" pitchFamily="49" charset="0"/>
+                <a:cs typeface="Courier New" panose="02070309020205020404" pitchFamily="49" charset="0"/>
+              </a:rPr>
+              <a:t>            'access' =&gt; [</a:t>
+            </a:r>
+          </a:p>
+          <a:p>
+            <a:r>
+              <a:rPr lang="en-US" altLang="ja-JP" sz="1000" dirty="0">
+                <a:latin typeface="Courier New" panose="02070309020205020404" pitchFamily="49" charset="0"/>
+                <a:cs typeface="Courier New" panose="02070309020205020404" pitchFamily="49" charset="0"/>
+              </a:rPr>
+              <a:t>                'class' =&gt; </a:t>
+            </a:r>
+            <a:r>
+              <a:rPr lang="en-US" altLang="ja-JP" sz="1000" dirty="0" err="1">
+                <a:latin typeface="Courier New" panose="02070309020205020404" pitchFamily="49" charset="0"/>
+                <a:cs typeface="Courier New" panose="02070309020205020404" pitchFamily="49" charset="0"/>
+              </a:rPr>
+              <a:t>AccessControl</a:t>
+            </a:r>
+            <a:r>
+              <a:rPr lang="en-US" altLang="ja-JP" sz="1000" dirty="0">
+                <a:latin typeface="Courier New" panose="02070309020205020404" pitchFamily="49" charset="0"/>
+                <a:cs typeface="Courier New" panose="02070309020205020404" pitchFamily="49" charset="0"/>
+              </a:rPr>
+              <a:t>::</a:t>
+            </a:r>
+            <a:r>
+              <a:rPr lang="en-US" altLang="ja-JP" sz="1000" dirty="0" err="1">
+                <a:latin typeface="Courier New" panose="02070309020205020404" pitchFamily="49" charset="0"/>
+                <a:cs typeface="Courier New" panose="02070309020205020404" pitchFamily="49" charset="0"/>
+              </a:rPr>
+              <a:t>className</a:t>
+            </a:r>
+            <a:r>
+              <a:rPr lang="en-US" altLang="ja-JP" sz="1000" dirty="0">
+                <a:latin typeface="Courier New" panose="02070309020205020404" pitchFamily="49" charset="0"/>
+                <a:cs typeface="Courier New" panose="02070309020205020404" pitchFamily="49" charset="0"/>
+              </a:rPr>
+              <a:t>(),</a:t>
+            </a:r>
+          </a:p>
+          <a:p>
+            <a:r>
+              <a:rPr lang="en-US" altLang="ja-JP" sz="1000" dirty="0">
+                <a:latin typeface="Courier New" panose="02070309020205020404" pitchFamily="49" charset="0"/>
+                <a:cs typeface="Courier New" panose="02070309020205020404" pitchFamily="49" charset="0"/>
+              </a:rPr>
+              <a:t>                'rules' =&gt; [</a:t>
+            </a:r>
+          </a:p>
+          <a:p>
+            <a:r>
+              <a:rPr lang="en-US" altLang="ja-JP" sz="1000" dirty="0">
+                <a:latin typeface="Courier New" panose="02070309020205020404" pitchFamily="49" charset="0"/>
+                <a:cs typeface="Courier New" panose="02070309020205020404" pitchFamily="49" charset="0"/>
+              </a:rPr>
+              <a:t>                    [</a:t>
+            </a:r>
+          </a:p>
+          <a:p>
+            <a:r>
+              <a:rPr lang="en-US" altLang="ja-JP" sz="1000" dirty="0">
+                <a:latin typeface="Courier New" panose="02070309020205020404" pitchFamily="49" charset="0"/>
+                <a:cs typeface="Courier New" panose="02070309020205020404" pitchFamily="49" charset="0"/>
+              </a:rPr>
+              <a:t>                        'allow' =&gt; true,</a:t>
+            </a:r>
+          </a:p>
+          <a:p>
+            <a:r>
+              <a:rPr lang="en-US" altLang="ja-JP" sz="1000" dirty="0">
+                <a:latin typeface="Courier New" panose="02070309020205020404" pitchFamily="49" charset="0"/>
+                <a:cs typeface="Courier New" panose="02070309020205020404" pitchFamily="49" charset="0"/>
+              </a:rPr>
+              <a:t>                        'actions' =&gt; ['index', 'view'],</a:t>
+            </a:r>
+          </a:p>
+          <a:p>
+            <a:r>
+              <a:rPr lang="en-US" altLang="ja-JP" sz="1000" dirty="0">
+                <a:latin typeface="Courier New" panose="02070309020205020404" pitchFamily="49" charset="0"/>
+                <a:cs typeface="Courier New" panose="02070309020205020404" pitchFamily="49" charset="0"/>
+              </a:rPr>
+              <a:t>                        'roles' =&gt; ['@'],</a:t>
+            </a:r>
+          </a:p>
+          <a:p>
+            <a:r>
+              <a:rPr lang="en-US" altLang="ja-JP" sz="1000" dirty="0">
+                <a:latin typeface="Courier New" panose="02070309020205020404" pitchFamily="49" charset="0"/>
+                <a:cs typeface="Courier New" panose="02070309020205020404" pitchFamily="49" charset="0"/>
+              </a:rPr>
+              <a:t>                    ],</a:t>
+            </a:r>
+          </a:p>
+          <a:p>
+            <a:r>
+              <a:rPr lang="en-US" altLang="ja-JP" sz="1000" dirty="0">
+                <a:latin typeface="Courier New" panose="02070309020205020404" pitchFamily="49" charset="0"/>
+                <a:cs typeface="Courier New" panose="02070309020205020404" pitchFamily="49" charset="0"/>
+              </a:rPr>
+              <a:t>                    [</a:t>
+            </a:r>
+          </a:p>
+          <a:p>
+            <a:r>
+              <a:rPr lang="en-US" altLang="ja-JP" sz="1000" dirty="0">
+                <a:latin typeface="Courier New" panose="02070309020205020404" pitchFamily="49" charset="0"/>
+                <a:cs typeface="Courier New" panose="02070309020205020404" pitchFamily="49" charset="0"/>
+              </a:rPr>
+              <a:t>                        // In fact, we don't need to define this rule here, but can defined it in roles = @ above.</a:t>
+            </a:r>
+          </a:p>
+          <a:p>
+            <a:r>
+              <a:rPr lang="en-US" altLang="ja-JP" sz="1000" dirty="0">
+                <a:latin typeface="Courier New" panose="02070309020205020404" pitchFamily="49" charset="0"/>
+                <a:cs typeface="Courier New" panose="02070309020205020404" pitchFamily="49" charset="0"/>
+              </a:rPr>
+              <a:t>                        // I put it here just for an example.</a:t>
+            </a:r>
+          </a:p>
+          <a:p>
+            <a:r>
+              <a:rPr lang="en-US" altLang="ja-JP" sz="1000" b="1" dirty="0">
+                <a:solidFill>
+                  <a:srgbClr val="FF0000"/>
+                </a:solidFill>
+                <a:latin typeface="Courier New" panose="02070309020205020404" pitchFamily="49" charset="0"/>
+                <a:cs typeface="Courier New" panose="02070309020205020404" pitchFamily="49" charset="0"/>
+              </a:rPr>
+              <a:t>                        'allow' =&gt; 'true',</a:t>
+            </a:r>
+          </a:p>
+          <a:p>
+            <a:r>
+              <a:rPr lang="en-US" altLang="ja-JP" sz="1000" b="1" dirty="0">
+                <a:solidFill>
+                  <a:srgbClr val="FF0000"/>
+                </a:solidFill>
+                <a:latin typeface="Courier New" panose="02070309020205020404" pitchFamily="49" charset="0"/>
+                <a:cs typeface="Courier New" panose="02070309020205020404" pitchFamily="49" charset="0"/>
+              </a:rPr>
+              <a:t>                        'actions' =&gt; ['create'],</a:t>
+            </a:r>
+          </a:p>
+          <a:p>
+            <a:r>
+              <a:rPr lang="en-US" altLang="ja-JP" sz="1000" b="1" dirty="0">
+                <a:solidFill>
+                  <a:srgbClr val="FF0000"/>
+                </a:solidFill>
+                <a:latin typeface="Courier New" panose="02070309020205020404" pitchFamily="49" charset="0"/>
+                <a:cs typeface="Courier New" panose="02070309020205020404" pitchFamily="49" charset="0"/>
+              </a:rPr>
+              <a:t>                        'roles' =&gt; ['</a:t>
+            </a:r>
+            <a:r>
+              <a:rPr lang="en-US" altLang="ja-JP" sz="1000" b="1" dirty="0" err="1">
+                <a:solidFill>
+                  <a:srgbClr val="FF0000"/>
+                </a:solidFill>
+                <a:latin typeface="Courier New" panose="02070309020205020404" pitchFamily="49" charset="0"/>
+                <a:cs typeface="Courier New" panose="02070309020205020404" pitchFamily="49" charset="0"/>
+              </a:rPr>
+              <a:t>createPost</a:t>
+            </a:r>
+            <a:r>
+              <a:rPr lang="en-US" altLang="ja-JP" sz="1000" b="1" dirty="0">
+                <a:solidFill>
+                  <a:srgbClr val="FF0000"/>
+                </a:solidFill>
+                <a:latin typeface="Courier New" panose="02070309020205020404" pitchFamily="49" charset="0"/>
+                <a:cs typeface="Courier New" panose="02070309020205020404" pitchFamily="49" charset="0"/>
+              </a:rPr>
+              <a:t>'],</a:t>
+            </a:r>
+          </a:p>
+          <a:p>
+            <a:r>
+              <a:rPr lang="en-US" altLang="ja-JP" sz="1000" dirty="0">
+                <a:latin typeface="Courier New" panose="02070309020205020404" pitchFamily="49" charset="0"/>
+                <a:cs typeface="Courier New" panose="02070309020205020404" pitchFamily="49" charset="0"/>
+              </a:rPr>
+              <a:t>                    ],</a:t>
+            </a:r>
+          </a:p>
+          <a:p>
+            <a:r>
+              <a:rPr lang="en-US" altLang="ja-JP" sz="1000" dirty="0">
+                <a:latin typeface="Courier New" panose="02070309020205020404" pitchFamily="49" charset="0"/>
+                <a:cs typeface="Courier New" panose="02070309020205020404" pitchFamily="49" charset="0"/>
+              </a:rPr>
+              <a:t>                    [</a:t>
+            </a:r>
+          </a:p>
+          <a:p>
+            <a:r>
+              <a:rPr lang="en-US" altLang="ja-JP" sz="1000" dirty="0">
+                <a:latin typeface="Courier New" panose="02070309020205020404" pitchFamily="49" charset="0"/>
+                <a:cs typeface="Courier New" panose="02070309020205020404" pitchFamily="49" charset="0"/>
+              </a:rPr>
+              <a:t>                        'allow' =&gt; true,</a:t>
+            </a:r>
+          </a:p>
+          <a:p>
+            <a:r>
+              <a:rPr lang="en-US" altLang="ja-JP" sz="1000" dirty="0">
+                <a:latin typeface="Courier New" panose="02070309020205020404" pitchFamily="49" charset="0"/>
+                <a:cs typeface="Courier New" panose="02070309020205020404" pitchFamily="49" charset="0"/>
+              </a:rPr>
+              <a:t>                        'actions' =&gt; ['update', 'delete'],</a:t>
+            </a:r>
+          </a:p>
+          <a:p>
+            <a:r>
+              <a:rPr lang="en-US" altLang="ja-JP" sz="1000" dirty="0">
+                <a:latin typeface="Courier New" panose="02070309020205020404" pitchFamily="49" charset="0"/>
+                <a:cs typeface="Courier New" panose="02070309020205020404" pitchFamily="49" charset="0"/>
+              </a:rPr>
+              <a:t>                        </a:t>
+            </a:r>
+            <a:r>
+              <a:rPr lang="en-US" altLang="ja-JP" sz="1000" b="1" dirty="0">
+                <a:solidFill>
+                  <a:srgbClr val="FF0000"/>
+                </a:solidFill>
+                <a:latin typeface="Courier New" panose="02070309020205020404" pitchFamily="49" charset="0"/>
+                <a:cs typeface="Courier New" panose="02070309020205020404" pitchFamily="49" charset="0"/>
+              </a:rPr>
+              <a:t>'roles' =&gt; ['</a:t>
+            </a:r>
+            <a:r>
+              <a:rPr lang="en-US" altLang="ja-JP" sz="1000" b="1" dirty="0" err="1">
+                <a:solidFill>
+                  <a:srgbClr val="FF0000"/>
+                </a:solidFill>
+                <a:latin typeface="Courier New" panose="02070309020205020404" pitchFamily="49" charset="0"/>
+                <a:cs typeface="Courier New" panose="02070309020205020404" pitchFamily="49" charset="0"/>
+              </a:rPr>
+              <a:t>updatePost</a:t>
+            </a:r>
+            <a:r>
+              <a:rPr lang="en-US" altLang="ja-JP" sz="1000" b="1" dirty="0">
+                <a:solidFill>
+                  <a:srgbClr val="FF0000"/>
+                </a:solidFill>
+                <a:latin typeface="Courier New" panose="02070309020205020404" pitchFamily="49" charset="0"/>
+                <a:cs typeface="Courier New" panose="02070309020205020404" pitchFamily="49" charset="0"/>
+              </a:rPr>
+              <a:t>'],</a:t>
+            </a:r>
+          </a:p>
+          <a:p>
+            <a:r>
+              <a:rPr lang="en-US" altLang="ja-JP" sz="1000" b="1" dirty="0">
+                <a:solidFill>
+                  <a:srgbClr val="FF0000"/>
+                </a:solidFill>
+                <a:latin typeface="Courier New" panose="02070309020205020404" pitchFamily="49" charset="0"/>
+                <a:cs typeface="Courier New" panose="02070309020205020404" pitchFamily="49" charset="0"/>
+              </a:rPr>
+              <a:t>                        '</a:t>
+            </a:r>
+            <a:r>
+              <a:rPr lang="en-US" altLang="ja-JP" sz="1000" b="1" dirty="0" err="1">
+                <a:solidFill>
+                  <a:srgbClr val="FF0000"/>
+                </a:solidFill>
+                <a:latin typeface="Courier New" panose="02070309020205020404" pitchFamily="49" charset="0"/>
+                <a:cs typeface="Courier New" panose="02070309020205020404" pitchFamily="49" charset="0"/>
+              </a:rPr>
+              <a:t>roleParams</a:t>
+            </a:r>
+            <a:r>
+              <a:rPr lang="en-US" altLang="ja-JP" sz="1000" b="1" dirty="0">
+                <a:solidFill>
+                  <a:srgbClr val="FF0000"/>
+                </a:solidFill>
+                <a:latin typeface="Courier New" panose="02070309020205020404" pitchFamily="49" charset="0"/>
+                <a:cs typeface="Courier New" panose="02070309020205020404" pitchFamily="49" charset="0"/>
+              </a:rPr>
+              <a:t>' =&gt; function() {</a:t>
+            </a:r>
+          </a:p>
+          <a:p>
+            <a:r>
+              <a:rPr lang="en-US" altLang="ja-JP" sz="1000" b="1" dirty="0">
+                <a:solidFill>
+                  <a:srgbClr val="FF0000"/>
+                </a:solidFill>
+                <a:latin typeface="Courier New" panose="02070309020205020404" pitchFamily="49" charset="0"/>
+                <a:cs typeface="Courier New" panose="02070309020205020404" pitchFamily="49" charset="0"/>
+              </a:rPr>
+              <a:t>                            return ['post' =&gt; Post::</a:t>
+            </a:r>
+            <a:r>
+              <a:rPr lang="en-US" altLang="ja-JP" sz="1000" b="1" dirty="0" err="1">
+                <a:solidFill>
+                  <a:srgbClr val="FF0000"/>
+                </a:solidFill>
+                <a:latin typeface="Courier New" panose="02070309020205020404" pitchFamily="49" charset="0"/>
+                <a:cs typeface="Courier New" panose="02070309020205020404" pitchFamily="49" charset="0"/>
+              </a:rPr>
+              <a:t>findOne</a:t>
+            </a:r>
+            <a:r>
+              <a:rPr lang="en-US" altLang="ja-JP" sz="1000" b="1" dirty="0">
+                <a:solidFill>
+                  <a:srgbClr val="FF0000"/>
+                </a:solidFill>
+                <a:latin typeface="Courier New" panose="02070309020205020404" pitchFamily="49" charset="0"/>
+                <a:cs typeface="Courier New" panose="02070309020205020404" pitchFamily="49" charset="0"/>
+              </a:rPr>
+              <a:t>(['id' =&gt; </a:t>
+            </a:r>
+            <a:r>
+              <a:rPr lang="en-US" altLang="ja-JP" sz="1000" b="1" dirty="0" err="1">
+                <a:solidFill>
+                  <a:srgbClr val="FF0000"/>
+                </a:solidFill>
                 <a:latin typeface="Courier New" panose="02070309020205020404" pitchFamily="49" charset="0"/>
                 <a:cs typeface="Courier New" panose="02070309020205020404" pitchFamily="49" charset="0"/>
               </a:rPr>
               <a:t>Yii</a:t>
             </a:r>
             <a:r>
-              <a:rPr lang="en-US" altLang="ja-JP" sz="1200" dirty="0">
-                <a:latin typeface="Courier New" panose="02070309020205020404" pitchFamily="49" charset="0"/>
-                <a:cs typeface="Courier New" panose="02070309020205020404" pitchFamily="49" charset="0"/>
-              </a:rPr>
-              <a:t>::$app-&gt;user-&gt;</a:t>
-            </a:r>
-            <a:r>
-              <a:rPr lang="en-US" altLang="ja-JP" sz="1200" dirty="0" err="1">
-                <a:latin typeface="Courier New" panose="02070309020205020404" pitchFamily="49" charset="0"/>
-                <a:cs typeface="Courier New" panose="02070309020205020404" pitchFamily="49" charset="0"/>
-              </a:rPr>
-              <a:t>isGuest</a:t>
-            </a:r>
-            <a:r>
-              <a:rPr lang="en-US" altLang="ja-JP" sz="1200" dirty="0">
-                <a:latin typeface="Courier New" panose="02070309020205020404" pitchFamily="49" charset="0"/>
-                <a:cs typeface="Courier New" panose="02070309020205020404" pitchFamily="49" charset="0"/>
-              </a:rPr>
-              <a:t>) {</a:t>
-            </a:r>
-          </a:p>
-          <a:p>
-            <a:r>
-              <a:rPr lang="en-US" altLang="ja-JP" sz="1200" dirty="0">
-                <a:latin typeface="Courier New" panose="02070309020205020404" pitchFamily="49" charset="0"/>
-                <a:cs typeface="Courier New" panose="02070309020205020404" pitchFamily="49" charset="0"/>
-              </a:rPr>
-              <a:t>    $items[] = ['label' =&gt; 'Login', '</a:t>
-            </a:r>
-            <a:r>
-              <a:rPr lang="en-US" altLang="ja-JP" sz="1200" dirty="0" err="1">
-                <a:latin typeface="Courier New" panose="02070309020205020404" pitchFamily="49" charset="0"/>
-                <a:cs typeface="Courier New" panose="02070309020205020404" pitchFamily="49" charset="0"/>
-              </a:rPr>
-              <a:t>url</a:t>
-            </a:r>
-            <a:r>
-              <a:rPr lang="en-US" altLang="ja-JP" sz="1200" dirty="0">
-                <a:latin typeface="Courier New" panose="02070309020205020404" pitchFamily="49" charset="0"/>
-                <a:cs typeface="Courier New" panose="02070309020205020404" pitchFamily="49" charset="0"/>
-              </a:rPr>
-              <a:t>' =&gt; ['/site/login']];</a:t>
-            </a:r>
-          </a:p>
-          <a:p>
-            <a:r>
-              <a:rPr lang="en-US" altLang="ja-JP" sz="1200" dirty="0">
-                <a:latin typeface="Courier New" panose="02070309020205020404" pitchFamily="49" charset="0"/>
-                <a:cs typeface="Courier New" panose="02070309020205020404" pitchFamily="49" charset="0"/>
-              </a:rPr>
-              <a:t>} else {</a:t>
-            </a:r>
-          </a:p>
-          <a:p>
-            <a:r>
-              <a:rPr lang="en-US" altLang="ja-JP" sz="1200" dirty="0">
-                <a:latin typeface="Courier New" panose="02070309020205020404" pitchFamily="49" charset="0"/>
-                <a:cs typeface="Courier New" panose="02070309020205020404" pitchFamily="49" charset="0"/>
-              </a:rPr>
-              <a:t>    $items[] = ['label' =&gt; 'Post', '</a:t>
-            </a:r>
-            <a:r>
-              <a:rPr lang="en-US" altLang="ja-JP" sz="1200" dirty="0" err="1">
-                <a:latin typeface="Courier New" panose="02070309020205020404" pitchFamily="49" charset="0"/>
-                <a:cs typeface="Courier New" panose="02070309020205020404" pitchFamily="49" charset="0"/>
-              </a:rPr>
-              <a:t>url</a:t>
-            </a:r>
-            <a:r>
-              <a:rPr lang="en-US" altLang="ja-JP" sz="1200" dirty="0">
-                <a:latin typeface="Courier New" panose="02070309020205020404" pitchFamily="49" charset="0"/>
-                <a:cs typeface="Courier New" panose="02070309020205020404" pitchFamily="49" charset="0"/>
-              </a:rPr>
-              <a:t>' =&gt; ['/post/index']];</a:t>
-            </a:r>
-          </a:p>
-          <a:p>
-            <a:r>
-              <a:rPr lang="en-US" altLang="ja-JP" sz="1200" dirty="0">
-                <a:latin typeface="Courier New" panose="02070309020205020404" pitchFamily="49" charset="0"/>
-                <a:cs typeface="Courier New" panose="02070309020205020404" pitchFamily="49" charset="0"/>
-              </a:rPr>
-              <a:t>    if (</a:t>
-            </a:r>
-            <a:r>
-              <a:rPr lang="en-US" altLang="ja-JP" sz="1200" b="1" dirty="0" err="1">
-                <a:solidFill>
-                  <a:srgbClr val="FF0000"/>
-                </a:solidFill>
-                <a:latin typeface="Courier New" panose="02070309020205020404" pitchFamily="49" charset="0"/>
-                <a:cs typeface="Courier New" panose="02070309020205020404" pitchFamily="49" charset="0"/>
-              </a:rPr>
-              <a:t>Yii</a:t>
-            </a:r>
-            <a:r>
-              <a:rPr lang="en-US" altLang="ja-JP" sz="1200" b="1" dirty="0">
-                <a:solidFill>
-                  <a:srgbClr val="FF0000"/>
-                </a:solidFill>
-                <a:latin typeface="Courier New" panose="02070309020205020404" pitchFamily="49" charset="0"/>
-                <a:cs typeface="Courier New" panose="02070309020205020404" pitchFamily="49" charset="0"/>
-              </a:rPr>
-              <a:t>::$app-&gt;user-&gt;can('</a:t>
-            </a:r>
-            <a:r>
-              <a:rPr lang="en-US" altLang="ja-JP" sz="1200" b="1" dirty="0" err="1">
-                <a:solidFill>
-                  <a:srgbClr val="FF0000"/>
-                </a:solidFill>
-                <a:latin typeface="Courier New" panose="02070309020205020404" pitchFamily="49" charset="0"/>
-                <a:cs typeface="Courier New" panose="02070309020205020404" pitchFamily="49" charset="0"/>
-              </a:rPr>
-              <a:t>manageUser</a:t>
-            </a:r>
-            <a:r>
-              <a:rPr lang="en-US" altLang="ja-JP" sz="1200" b="1" dirty="0">
-                <a:solidFill>
-                  <a:srgbClr val="FF0000"/>
-                </a:solidFill>
-                <a:latin typeface="Courier New" panose="02070309020205020404" pitchFamily="49" charset="0"/>
-                <a:cs typeface="Courier New" panose="02070309020205020404" pitchFamily="49" charset="0"/>
-              </a:rPr>
-              <a:t>')) </a:t>
-            </a:r>
-            <a:r>
-              <a:rPr lang="en-US" altLang="ja-JP" sz="1200" dirty="0">
-                <a:latin typeface="Courier New" panose="02070309020205020404" pitchFamily="49" charset="0"/>
-                <a:cs typeface="Courier New" panose="02070309020205020404" pitchFamily="49" charset="0"/>
-              </a:rPr>
-              <a:t>{</a:t>
-            </a:r>
-          </a:p>
-          <a:p>
-            <a:r>
-              <a:rPr lang="en-US" altLang="ja-JP" sz="1200" dirty="0">
-                <a:latin typeface="Courier New" panose="02070309020205020404" pitchFamily="49" charset="0"/>
-                <a:cs typeface="Courier New" panose="02070309020205020404" pitchFamily="49" charset="0"/>
-              </a:rPr>
-              <a:t>        $items[] = ['label' =&gt; 'User', '</a:t>
-            </a:r>
-            <a:r>
-              <a:rPr lang="en-US" altLang="ja-JP" sz="1200" dirty="0" err="1">
-                <a:latin typeface="Courier New" panose="02070309020205020404" pitchFamily="49" charset="0"/>
-                <a:cs typeface="Courier New" panose="02070309020205020404" pitchFamily="49" charset="0"/>
-              </a:rPr>
-              <a:t>url</a:t>
-            </a:r>
-            <a:r>
-              <a:rPr lang="en-US" altLang="ja-JP" sz="1200" dirty="0">
-                <a:latin typeface="Courier New" panose="02070309020205020404" pitchFamily="49" charset="0"/>
-                <a:cs typeface="Courier New" panose="02070309020205020404" pitchFamily="49" charset="0"/>
-              </a:rPr>
-              <a:t>' =&gt; ['/user/index']];</a:t>
-            </a:r>
-          </a:p>
-          <a:p>
-            <a:r>
-              <a:rPr lang="en-US" altLang="ja-JP" sz="1200" dirty="0">
+              <a:rPr lang="en-US" altLang="ja-JP" sz="1000" b="1" dirty="0">
+                <a:solidFill>
+                  <a:srgbClr val="FF0000"/>
+                </a:solidFill>
+                <a:latin typeface="Courier New" panose="02070309020205020404" pitchFamily="49" charset="0"/>
+                <a:cs typeface="Courier New" panose="02070309020205020404" pitchFamily="49" charset="0"/>
+              </a:rPr>
+              <a:t>::$app-&gt;request-&gt;get('id')])];</a:t>
+            </a:r>
+          </a:p>
+          <a:p>
+            <a:r>
+              <a:rPr lang="en-US" altLang="ja-JP" sz="1000" b="1" dirty="0">
+                <a:solidFill>
+                  <a:srgbClr val="FF0000"/>
+                </a:solidFill>
+                <a:latin typeface="Courier New" panose="02070309020205020404" pitchFamily="49" charset="0"/>
+                <a:cs typeface="Courier New" panose="02070309020205020404" pitchFamily="49" charset="0"/>
+              </a:rPr>
+              <a:t>                        },     </a:t>
+            </a:r>
+            <a:r>
+              <a:rPr lang="en-US" altLang="ja-JP" sz="1000" dirty="0">
+                <a:latin typeface="Courier New" panose="02070309020205020404" pitchFamily="49" charset="0"/>
+                <a:cs typeface="Courier New" panose="02070309020205020404" pitchFamily="49" charset="0"/>
+              </a:rPr>
+              <a:t>               </a:t>
+            </a:r>
+          </a:p>
+          <a:p>
+            <a:r>
+              <a:rPr lang="en-US" altLang="ja-JP" sz="1000" dirty="0">
+                <a:latin typeface="Courier New" panose="02070309020205020404" pitchFamily="49" charset="0"/>
+                <a:cs typeface="Courier New" panose="02070309020205020404" pitchFamily="49" charset="0"/>
+              </a:rPr>
+              <a:t>                    ],</a:t>
+            </a:r>
+          </a:p>
+          <a:p>
+            <a:r>
+              <a:rPr lang="en-US" altLang="ja-JP" sz="1000" dirty="0">
+                <a:latin typeface="Courier New" panose="02070309020205020404" pitchFamily="49" charset="0"/>
+                <a:cs typeface="Courier New" panose="02070309020205020404" pitchFamily="49" charset="0"/>
+              </a:rPr>
+              <a:t>                ],</a:t>
+            </a:r>
+          </a:p>
+          <a:p>
+            <a:r>
+              <a:rPr lang="en-US" altLang="ja-JP" sz="1000" dirty="0">
+                <a:latin typeface="Courier New" panose="02070309020205020404" pitchFamily="49" charset="0"/>
+                <a:cs typeface="Courier New" panose="02070309020205020404" pitchFamily="49" charset="0"/>
+              </a:rPr>
+              <a:t>            ],</a:t>
+            </a:r>
+          </a:p>
+          <a:p>
+            <a:r>
+              <a:rPr lang="en-US" altLang="ja-JP" sz="1000" dirty="0">
+                <a:latin typeface="Courier New" panose="02070309020205020404" pitchFamily="49" charset="0"/>
+                <a:cs typeface="Courier New" panose="02070309020205020404" pitchFamily="49" charset="0"/>
+              </a:rPr>
+              <a:t>        ];</a:t>
+            </a:r>
+          </a:p>
+          <a:p>
+            <a:r>
+              <a:rPr lang="en-US" altLang="ja-JP" sz="1000" dirty="0">
                 <a:latin typeface="Courier New" panose="02070309020205020404" pitchFamily="49" charset="0"/>
                 <a:cs typeface="Courier New" panose="02070309020205020404" pitchFamily="49" charset="0"/>
               </a:rPr>
@@ -9684,30 +9707,7 @@
           </a:p>
           <a:p>
             <a:r>
-              <a:rPr lang="en-US" altLang="ja-JP" sz="1200" dirty="0">
-                <a:latin typeface="Courier New" panose="02070309020205020404" pitchFamily="49" charset="0"/>
-                <a:cs typeface="Courier New" panose="02070309020205020404" pitchFamily="49" charset="0"/>
-              </a:rPr>
-              <a:t>    $items[] = $</a:t>
-            </a:r>
-            <a:r>
-              <a:rPr lang="en-US" altLang="ja-JP" sz="1200" dirty="0" err="1">
-                <a:latin typeface="Courier New" panose="02070309020205020404" pitchFamily="49" charset="0"/>
-                <a:cs typeface="Courier New" panose="02070309020205020404" pitchFamily="49" charset="0"/>
-              </a:rPr>
-              <a:t>logoutMenuItem</a:t>
-            </a:r>
-            <a:r>
-              <a:rPr lang="en-US" altLang="ja-JP" sz="1200" dirty="0">
-                <a:latin typeface="Courier New" panose="02070309020205020404" pitchFamily="49" charset="0"/>
-                <a:cs typeface="Courier New" panose="02070309020205020404" pitchFamily="49" charset="0"/>
-              </a:rPr>
-              <a:t>;</a:t>
-            </a:r>
-          </a:p>
-          <a:p>
-            <a:r>
-              <a:rPr lang="en-US" altLang="ja-JP" sz="1200" dirty="0">
+              <a:rPr lang="en-US" altLang="ja-JP" sz="1000" dirty="0">
                 <a:latin typeface="Courier New" panose="02070309020205020404" pitchFamily="49" charset="0"/>
                 <a:cs typeface="Courier New" panose="02070309020205020404" pitchFamily="49" charset="0"/>
               </a:rPr>
@@ -9715,221 +9715,19 @@
             </a:r>
           </a:p>
           <a:p>
-            <a:endParaRPr kumimoji="1" lang="en-US" altLang="ja-JP" sz="1200" dirty="0">
+            <a:endParaRPr kumimoji="1" lang="ja-JP" altLang="en-US" sz="1000" dirty="0">
               <a:latin typeface="Courier New" panose="02070309020205020404" pitchFamily="49" charset="0"/>
               <a:cs typeface="Courier New" panose="02070309020205020404" pitchFamily="49" charset="0"/>
             </a:endParaRPr>
           </a:p>
-          <a:p>
-            <a:r>
-              <a:rPr kumimoji="1" lang="en-US" altLang="ja-JP" sz="1200" b="1" dirty="0">
-                <a:latin typeface="Courier New" panose="02070309020205020404" pitchFamily="49" charset="0"/>
-                <a:cs typeface="Courier New" panose="02070309020205020404" pitchFamily="49" charset="0"/>
-              </a:rPr>
-              <a:t>To control displaying of buttons on Post view page</a:t>
-            </a:r>
-          </a:p>
-          <a:p>
-            <a:r>
-              <a:rPr lang="en-US" altLang="ja-JP" sz="1200" dirty="0">
-                <a:latin typeface="Courier New" panose="02070309020205020404" pitchFamily="49" charset="0"/>
-                <a:cs typeface="Courier New" panose="02070309020205020404" pitchFamily="49" charset="0"/>
-              </a:rPr>
-              <a:t>&lt;?php if (</a:t>
-            </a:r>
-            <a:r>
-              <a:rPr lang="en-US" altLang="ja-JP" sz="1200" b="1" dirty="0" err="1">
-                <a:solidFill>
-                  <a:srgbClr val="FF0000"/>
-                </a:solidFill>
-                <a:latin typeface="Courier New" panose="02070309020205020404" pitchFamily="49" charset="0"/>
-                <a:cs typeface="Courier New" panose="02070309020205020404" pitchFamily="49" charset="0"/>
-              </a:rPr>
-              <a:t>Yii</a:t>
-            </a:r>
-            <a:r>
-              <a:rPr lang="en-US" altLang="ja-JP" sz="1200" b="1" dirty="0">
-                <a:solidFill>
-                  <a:srgbClr val="FF0000"/>
-                </a:solidFill>
-                <a:latin typeface="Courier New" panose="02070309020205020404" pitchFamily="49" charset="0"/>
-                <a:cs typeface="Courier New" panose="02070309020205020404" pitchFamily="49" charset="0"/>
-              </a:rPr>
-              <a:t>::$app-&gt;user-&gt;can('</a:t>
-            </a:r>
-            <a:r>
-              <a:rPr lang="en-US" altLang="ja-JP" sz="1200" b="1" dirty="0" err="1">
-                <a:solidFill>
-                  <a:srgbClr val="FF0000"/>
-                </a:solidFill>
-                <a:latin typeface="Courier New" panose="02070309020205020404" pitchFamily="49" charset="0"/>
-                <a:cs typeface="Courier New" panose="02070309020205020404" pitchFamily="49" charset="0"/>
-              </a:rPr>
-              <a:t>updatePost</a:t>
-            </a:r>
-            <a:r>
-              <a:rPr lang="en-US" altLang="ja-JP" sz="1200" b="1" dirty="0">
-                <a:solidFill>
-                  <a:srgbClr val="FF0000"/>
-                </a:solidFill>
-                <a:latin typeface="Courier New" panose="02070309020205020404" pitchFamily="49" charset="0"/>
-                <a:cs typeface="Courier New" panose="02070309020205020404" pitchFamily="49" charset="0"/>
-              </a:rPr>
-              <a:t>')) </a:t>
-            </a:r>
-            <a:r>
-              <a:rPr lang="en-US" altLang="ja-JP" sz="1200" dirty="0">
-                <a:latin typeface="Courier New" panose="02070309020205020404" pitchFamily="49" charset="0"/>
-                <a:cs typeface="Courier New" panose="02070309020205020404" pitchFamily="49" charset="0"/>
-              </a:rPr>
-              <a:t>{ ?&gt;</a:t>
-            </a:r>
-          </a:p>
-          <a:p>
-            <a:r>
-              <a:rPr lang="en-US" altLang="ja-JP" sz="1200" dirty="0">
-                <a:latin typeface="Courier New" panose="02070309020205020404" pitchFamily="49" charset="0"/>
-                <a:cs typeface="Courier New" panose="02070309020205020404" pitchFamily="49" charset="0"/>
-              </a:rPr>
-              <a:t>    &lt;?= Html::a('Update', ['update', 'id' =&gt; $model-&gt;id], ['class' =&gt; '</a:t>
-            </a:r>
-            <a:r>
-              <a:rPr lang="en-US" altLang="ja-JP" sz="1200" dirty="0" err="1">
-                <a:latin typeface="Courier New" panose="02070309020205020404" pitchFamily="49" charset="0"/>
-                <a:cs typeface="Courier New" panose="02070309020205020404" pitchFamily="49" charset="0"/>
-              </a:rPr>
-              <a:t>btn</a:t>
-            </a:r>
-            <a:r>
-              <a:rPr lang="en-US" altLang="ja-JP" sz="1200" dirty="0">
-                <a:latin typeface="Courier New" panose="02070309020205020404" pitchFamily="49" charset="0"/>
-                <a:cs typeface="Courier New" panose="02070309020205020404" pitchFamily="49" charset="0"/>
-              </a:rPr>
-              <a:t> </a:t>
-            </a:r>
-            <a:r>
-              <a:rPr lang="en-US" altLang="ja-JP" sz="1200" dirty="0" err="1">
-                <a:latin typeface="Courier New" panose="02070309020205020404" pitchFamily="49" charset="0"/>
-                <a:cs typeface="Courier New" panose="02070309020205020404" pitchFamily="49" charset="0"/>
-              </a:rPr>
-              <a:t>btn</a:t>
-            </a:r>
-            <a:r>
-              <a:rPr lang="en-US" altLang="ja-JP" sz="1200" dirty="0">
-                <a:latin typeface="Courier New" panose="02070309020205020404" pitchFamily="49" charset="0"/>
-                <a:cs typeface="Courier New" panose="02070309020205020404" pitchFamily="49" charset="0"/>
-              </a:rPr>
-              <a:t>-primary']) ?&gt;</a:t>
-            </a:r>
-          </a:p>
-          <a:p>
-            <a:r>
-              <a:rPr lang="en-US" altLang="ja-JP" sz="1200" dirty="0">
-                <a:latin typeface="Courier New" panose="02070309020205020404" pitchFamily="49" charset="0"/>
-                <a:cs typeface="Courier New" panose="02070309020205020404" pitchFamily="49" charset="0"/>
-              </a:rPr>
-              <a:t>    &lt;?= Html::a('Delete', ['delete', 'id' =&gt; $model-&gt;id], [</a:t>
-            </a:r>
-          </a:p>
-          <a:p>
-            <a:r>
-              <a:rPr lang="en-US" altLang="ja-JP" sz="1200" dirty="0">
-                <a:latin typeface="Courier New" panose="02070309020205020404" pitchFamily="49" charset="0"/>
-                <a:cs typeface="Courier New" panose="02070309020205020404" pitchFamily="49" charset="0"/>
-              </a:rPr>
-              <a:t>        'class' =&gt; '</a:t>
-            </a:r>
-            <a:r>
-              <a:rPr lang="en-US" altLang="ja-JP" sz="1200" dirty="0" err="1">
-                <a:latin typeface="Courier New" panose="02070309020205020404" pitchFamily="49" charset="0"/>
-                <a:cs typeface="Courier New" panose="02070309020205020404" pitchFamily="49" charset="0"/>
-              </a:rPr>
-              <a:t>btn</a:t>
-            </a:r>
-            <a:r>
-              <a:rPr lang="en-US" altLang="ja-JP" sz="1200" dirty="0">
-                <a:latin typeface="Courier New" panose="02070309020205020404" pitchFamily="49" charset="0"/>
-                <a:cs typeface="Courier New" panose="02070309020205020404" pitchFamily="49" charset="0"/>
-              </a:rPr>
-              <a:t> </a:t>
-            </a:r>
-            <a:r>
-              <a:rPr lang="en-US" altLang="ja-JP" sz="1200" dirty="0" err="1">
-                <a:latin typeface="Courier New" panose="02070309020205020404" pitchFamily="49" charset="0"/>
-                <a:cs typeface="Courier New" panose="02070309020205020404" pitchFamily="49" charset="0"/>
-              </a:rPr>
-              <a:t>btn</a:t>
-            </a:r>
-            <a:r>
-              <a:rPr lang="en-US" altLang="ja-JP" sz="1200" dirty="0">
-                <a:latin typeface="Courier New" panose="02070309020205020404" pitchFamily="49" charset="0"/>
-                <a:cs typeface="Courier New" panose="02070309020205020404" pitchFamily="49" charset="0"/>
-              </a:rPr>
-              <a:t>-danger',</a:t>
-            </a:r>
-          </a:p>
-          <a:p>
-            <a:r>
-              <a:rPr lang="en-US" altLang="ja-JP" sz="1200" dirty="0">
-                <a:latin typeface="Courier New" panose="02070309020205020404" pitchFamily="49" charset="0"/>
-                <a:cs typeface="Courier New" panose="02070309020205020404" pitchFamily="49" charset="0"/>
-              </a:rPr>
-              <a:t>        'data' =&gt; [</a:t>
-            </a:r>
-          </a:p>
-          <a:p>
-            <a:r>
-              <a:rPr lang="en-US" altLang="ja-JP" sz="1200" dirty="0">
-                <a:latin typeface="Courier New" panose="02070309020205020404" pitchFamily="49" charset="0"/>
-                <a:cs typeface="Courier New" panose="02070309020205020404" pitchFamily="49" charset="0"/>
-              </a:rPr>
-              <a:t>            'confirm' =&gt; 'Are you sure you want to delete this item?',</a:t>
-            </a:r>
-          </a:p>
-          <a:p>
-            <a:r>
-              <a:rPr lang="en-US" altLang="ja-JP" sz="1200" dirty="0">
-                <a:latin typeface="Courier New" panose="02070309020205020404" pitchFamily="49" charset="0"/>
-                <a:cs typeface="Courier New" panose="02070309020205020404" pitchFamily="49" charset="0"/>
-              </a:rPr>
-              <a:t>            'method' =&gt; 'post',</a:t>
-            </a:r>
-          </a:p>
-          <a:p>
-            <a:r>
-              <a:rPr lang="en-US" altLang="ja-JP" sz="1200" dirty="0">
-                <a:latin typeface="Courier New" panose="02070309020205020404" pitchFamily="49" charset="0"/>
-                <a:cs typeface="Courier New" panose="02070309020205020404" pitchFamily="49" charset="0"/>
-              </a:rPr>
-              <a:t>        ],</a:t>
-            </a:r>
-          </a:p>
-          <a:p>
-            <a:r>
-              <a:rPr lang="en-US" altLang="ja-JP" sz="1200" dirty="0">
-                <a:latin typeface="Courier New" panose="02070309020205020404" pitchFamily="49" charset="0"/>
-                <a:cs typeface="Courier New" panose="02070309020205020404" pitchFamily="49" charset="0"/>
-              </a:rPr>
-              <a:t>    ]) ?&gt;</a:t>
-            </a:r>
-          </a:p>
-          <a:p>
-            <a:r>
-              <a:rPr lang="en-US" altLang="ja-JP" sz="1200" dirty="0">
-                <a:latin typeface="Courier New" panose="02070309020205020404" pitchFamily="49" charset="0"/>
-                <a:cs typeface="Courier New" panose="02070309020205020404" pitchFamily="49" charset="0"/>
-              </a:rPr>
-              <a:t>&lt;?php } ?&gt;</a:t>
-            </a:r>
-          </a:p>
-        </p:txBody>
-      </p:sp>
-      <p:sp>
-        <p:nvSpPr>
-          <p:cNvPr id="3" name="スライド番号プレースホルダー 2">
+        </p:txBody>
+      </p:sp>
+      <p:sp>
+        <p:nvSpPr>
+          <p:cNvPr id="5" name="スライド番号プレースホルダー 4">
             <a:extLst>
               <a:ext uri="{FF2B5EF4-FFF2-40B4-BE49-F238E27FC236}">
-                <a16:creationId xmlns:a16="http://schemas.microsoft.com/office/drawing/2014/main" id="{15E8DE9D-F2BC-45AD-A222-6F66DA19F34E}"/>
+                <a16:creationId xmlns:a16="http://schemas.microsoft.com/office/drawing/2014/main" id="{5EB489E8-CDDC-4D69-A4EB-3ACA16D1D606}"/>
               </a:ext>
             </a:extLst>
           </p:cNvPr>
@@ -9955,10 +9753,10 @@
       </p:sp>
       <p:sp>
         <p:nvSpPr>
-          <p:cNvPr id="5" name="テキスト ボックス 4">
+          <p:cNvPr id="3" name="テキスト ボックス 2">
             <a:extLst>
               <a:ext uri="{FF2B5EF4-FFF2-40B4-BE49-F238E27FC236}">
-                <a16:creationId xmlns:a16="http://schemas.microsoft.com/office/drawing/2014/main" id="{91DFAF3D-A40B-4A9E-90BA-2CD6FF4C5DA6}"/>
+                <a16:creationId xmlns:a16="http://schemas.microsoft.com/office/drawing/2014/main" id="{EB47B340-BE6A-4004-A9F8-A61FE3C08E0E}"/>
               </a:ext>
             </a:extLst>
           </p:cNvPr>
@@ -9967,8 +9765,8 @@
         </p:nvSpPr>
         <p:spPr>
           <a:xfrm>
-            <a:off x="8318377" y="1506022"/>
-            <a:ext cx="1766656" cy="369332"/>
+            <a:off x="7901126" y="5903650"/>
+            <a:ext cx="1455938" cy="369332"/>
           </a:xfrm>
           <a:prstGeom prst="rect">
             <a:avLst/>
@@ -9993,46 +9791,178 @@
       </p:sp>
       <p:sp>
         <p:nvSpPr>
-          <p:cNvPr id="6" name="テキスト ボックス 5">
+          <p:cNvPr id="7" name="吹き出し: 四角形 6">
             <a:extLst>
               <a:ext uri="{FF2B5EF4-FFF2-40B4-BE49-F238E27FC236}">
-                <a16:creationId xmlns:a16="http://schemas.microsoft.com/office/drawing/2014/main" id="{D2C721D5-B564-4DD6-98BE-4FB6EF42A782}"/>
+                <a16:creationId xmlns:a16="http://schemas.microsoft.com/office/drawing/2014/main" id="{A6326200-1A9E-42B0-9E40-97C5A5563F01}"/>
               </a:ext>
             </a:extLst>
           </p:cNvPr>
-          <p:cNvSpPr txBox="1"/>
+          <p:cNvSpPr/>
           <p:nvPr/>
         </p:nvSpPr>
         <p:spPr>
           <a:xfrm>
-            <a:off x="8318377" y="3864751"/>
-            <a:ext cx="1464815" cy="369332"/>
+            <a:off x="5862961" y="4115530"/>
+            <a:ext cx="2872668" cy="750226"/>
           </a:xfrm>
-          <a:prstGeom prst="rect">
-            <a:avLst/>
+          <a:prstGeom prst="wedgeRectCallout">
+            <a:avLst>
+              <a:gd name="adj1" fmla="val -87674"/>
+              <a:gd name="adj2" fmla="val 10793"/>
+            </a:avLst>
           </a:prstGeom>
-          <a:noFill/>
+          <a:solidFill>
+            <a:srgbClr val="FFFF00"/>
+          </a:solidFill>
+          <a:ln>
+            <a:solidFill>
+              <a:srgbClr val="FF0000"/>
+            </a:solidFill>
+          </a:ln>
         </p:spPr>
-        <p:txBody>
-          <a:bodyPr wrap="square" rtlCol="0">
-            <a:spAutoFit/>
-          </a:bodyPr>
-          <a:lstStyle/>
-          <a:p>
+        <p:style>
+          <a:lnRef idx="2">
+            <a:schemeClr val="accent1">
+              <a:shade val="50000"/>
+            </a:schemeClr>
+          </a:lnRef>
+          <a:fillRef idx="1">
+            <a:schemeClr val="accent1"/>
+          </a:fillRef>
+          <a:effectRef idx="0">
+            <a:schemeClr val="accent1"/>
+          </a:effectRef>
+          <a:fontRef idx="minor">
+            <a:schemeClr val="lt1"/>
+          </a:fontRef>
+        </p:style>
+        <p:txBody>
+          <a:bodyPr rtlCol="0" anchor="ctr"/>
+          <a:lstStyle/>
+          <a:p>
+            <a:pPr algn="ctr"/>
             <a:r>
               <a:rPr kumimoji="1" lang="en-US" altLang="ja-JP" dirty="0">
-                <a:hlinkClick r:id="rId3"/>
-              </a:rPr>
-              <a:t>Source Code</a:t>
-            </a:r>
-            <a:endParaRPr kumimoji="1" lang="ja-JP" altLang="en-US" dirty="0"/>
+                <a:solidFill>
+                  <a:srgbClr val="FF0000"/>
+                </a:solidFill>
+              </a:rPr>
+              <a:t>‘roles’ is </a:t>
+            </a:r>
+            <a:r>
+              <a:rPr kumimoji="1" lang="en-US" altLang="ja-JP" dirty="0" err="1">
+                <a:solidFill>
+                  <a:srgbClr val="FF0000"/>
+                </a:solidFill>
+              </a:rPr>
+              <a:t>ACF</a:t>
+            </a:r>
+            <a:r>
+              <a:rPr kumimoji="1" lang="en-US" altLang="ja-JP" dirty="0">
+                <a:solidFill>
+                  <a:srgbClr val="FF0000"/>
+                </a:solidFill>
+              </a:rPr>
+              <a:t> keyword, not relate to </a:t>
+            </a:r>
+            <a:r>
+              <a:rPr kumimoji="1" lang="en-US" altLang="ja-JP" dirty="0" err="1">
+                <a:solidFill>
+                  <a:srgbClr val="FF0000"/>
+                </a:solidFill>
+              </a:rPr>
+              <a:t>RBAC</a:t>
+            </a:r>
+            <a:r>
+              <a:rPr kumimoji="1" lang="en-US" altLang="ja-JP" dirty="0">
+                <a:solidFill>
+                  <a:srgbClr val="FF0000"/>
+                </a:solidFill>
+              </a:rPr>
+              <a:t> role concept</a:t>
+            </a:r>
+            <a:endParaRPr kumimoji="1" lang="ja-JP" altLang="en-US" dirty="0">
+              <a:solidFill>
+                <a:srgbClr val="FF0000"/>
+              </a:solidFill>
+            </a:endParaRPr>
+          </a:p>
+        </p:txBody>
+      </p:sp>
+      <p:sp>
+        <p:nvSpPr>
+          <p:cNvPr id="8" name="吹き出し: 四角形 7">
+            <a:extLst>
+              <a:ext uri="{FF2B5EF4-FFF2-40B4-BE49-F238E27FC236}">
+                <a16:creationId xmlns:a16="http://schemas.microsoft.com/office/drawing/2014/main" id="{1F3A54DB-0C3F-403D-B571-7CC7420AE465}"/>
+              </a:ext>
+            </a:extLst>
+          </p:cNvPr>
+          <p:cNvSpPr/>
+          <p:nvPr/>
+        </p:nvSpPr>
+        <p:spPr>
+          <a:xfrm>
+            <a:off x="8735629" y="4942831"/>
+            <a:ext cx="2872668" cy="750226"/>
+          </a:xfrm>
+          <a:prstGeom prst="wedgeRectCallout">
+            <a:avLst>
+              <a:gd name="adj1" fmla="val -185639"/>
+              <a:gd name="adj2" fmla="val 1326"/>
+            </a:avLst>
+          </a:prstGeom>
+          <a:solidFill>
+            <a:srgbClr val="FFFF00"/>
+          </a:solidFill>
+          <a:ln>
+            <a:solidFill>
+              <a:srgbClr val="FF0000"/>
+            </a:solidFill>
+          </a:ln>
+        </p:spPr>
+        <p:style>
+          <a:lnRef idx="2">
+            <a:schemeClr val="accent1">
+              <a:shade val="50000"/>
+            </a:schemeClr>
+          </a:lnRef>
+          <a:fillRef idx="1">
+            <a:schemeClr val="accent1"/>
+          </a:fillRef>
+          <a:effectRef idx="0">
+            <a:schemeClr val="accent1"/>
+          </a:effectRef>
+          <a:fontRef idx="minor">
+            <a:schemeClr val="lt1"/>
+          </a:fontRef>
+        </p:style>
+        <p:txBody>
+          <a:bodyPr rtlCol="0" anchor="ctr"/>
+          <a:lstStyle/>
+          <a:p>
+            <a:pPr algn="ctr"/>
+            <a:r>
+              <a:rPr kumimoji="1" lang="en-US" altLang="ja-JP" dirty="0">
+                <a:solidFill>
+                  <a:srgbClr val="FF0000"/>
+                </a:solidFill>
+              </a:rPr>
+              <a:t>This will be checked for both admin and author roles</a:t>
+            </a:r>
+            <a:endParaRPr kumimoji="1" lang="ja-JP" altLang="en-US" dirty="0">
+              <a:solidFill>
+                <a:srgbClr val="FF0000"/>
+              </a:solidFill>
+            </a:endParaRPr>
           </a:p>
         </p:txBody>
       </p:sp>
     </p:spTree>
     <p:extLst>
       <p:ext uri="{BB962C8B-B14F-4D97-AF65-F5344CB8AC3E}">
-        <p14:creationId xmlns:p14="http://schemas.microsoft.com/office/powerpoint/2010/main" val="3352262058"/>
+        <p14:creationId xmlns:p14="http://schemas.microsoft.com/office/powerpoint/2010/main" val="4135592093"/>
       </p:ext>
     </p:extLst>
   </p:cSld>
@@ -10064,7 +9994,7 @@
           <p:cNvPr id="2" name="タイトル 1">
             <a:extLst>
               <a:ext uri="{FF2B5EF4-FFF2-40B4-BE49-F238E27FC236}">
-                <a16:creationId xmlns:a16="http://schemas.microsoft.com/office/drawing/2014/main" id="{D0481A33-89BF-45FD-81CF-F52AE0224E57}"/>
+                <a16:creationId xmlns:a16="http://schemas.microsoft.com/office/drawing/2014/main" id="{DD719081-9074-42BD-B20B-A3E511A672A7}"/>
               </a:ext>
             </a:extLst>
           </p:cNvPr>
@@ -10081,8 +10011,20 @@
           <a:lstStyle/>
           <a:p>
             <a:r>
-              <a:rPr lang="en-US" altLang="ja-JP" dirty="0"/>
-              <a:t>Behavior based on access permission</a:t>
+              <a:rPr kumimoji="1" lang="en-US" altLang="ja-JP" dirty="0"/>
+              <a:t>Demo of </a:t>
+            </a:r>
+            <a:r>
+              <a:rPr kumimoji="1" lang="en-US" altLang="ja-JP" dirty="0" err="1"/>
+              <a:t>RBAC</a:t>
+            </a:r>
+            <a:r>
+              <a:rPr kumimoji="1" lang="en-US" altLang="ja-JP" dirty="0"/>
+              <a:t> used with </a:t>
+            </a:r>
+            <a:r>
+              <a:rPr kumimoji="1" lang="en-US" altLang="ja-JP" dirty="0" err="1"/>
+              <a:t>ACF</a:t>
             </a:r>
             <a:endParaRPr kumimoji="1" lang="ja-JP" altLang="en-US" dirty="0"/>
           </a:p>
@@ -10093,7 +10035,7 @@
           <p:cNvPr id="3" name="コンテンツ プレースホルダー 2">
             <a:extLst>
               <a:ext uri="{FF2B5EF4-FFF2-40B4-BE49-F238E27FC236}">
-                <a16:creationId xmlns:a16="http://schemas.microsoft.com/office/drawing/2014/main" id="{24F20AEA-2853-4BC7-BC13-3EFC97E20D31}"/>
+                <a16:creationId xmlns:a16="http://schemas.microsoft.com/office/drawing/2014/main" id="{B20697CD-FB8F-43EB-B034-5C20A6D316BF}"/>
               </a:ext>
             </a:extLst>
           </p:cNvPr>
@@ -10109,28 +10051,7 @@
           <a:bodyPr/>
           <a:lstStyle/>
           <a:p>
-            <a:r>
-              <a:rPr lang="en-US" altLang="ja-JP" b="1" dirty="0">
-                <a:latin typeface="Courier New" panose="02070309020205020404" pitchFamily="49" charset="0"/>
-                <a:cs typeface="Courier New" panose="02070309020205020404" pitchFamily="49" charset="0"/>
-              </a:rPr>
-              <a:t>Use </a:t>
-            </a:r>
-            <a:r>
-              <a:rPr lang="en-US" altLang="ja-JP" b="1" dirty="0" err="1">
-                <a:latin typeface="Courier New" panose="02070309020205020404" pitchFamily="49" charset="0"/>
-                <a:cs typeface="Courier New" panose="02070309020205020404" pitchFamily="49" charset="0"/>
-              </a:rPr>
-              <a:t>Yii</a:t>
-            </a:r>
-            <a:r>
-              <a:rPr lang="en-US" altLang="ja-JP" b="1" dirty="0">
-                <a:latin typeface="Courier New" panose="02070309020205020404" pitchFamily="49" charset="0"/>
-                <a:cs typeface="Courier New" panose="02070309020205020404" pitchFamily="49" charset="0"/>
-              </a:rPr>
-              <a:t>::$app-&gt;user-&gt;can() on business logic code</a:t>
-            </a:r>
-            <a:endParaRPr kumimoji="1" lang="ja-JP" altLang="en-US" dirty="0"/>
+            <a:endParaRPr kumimoji="1" lang="ja-JP" altLang="en-US"/>
           </a:p>
         </p:txBody>
       </p:sp>
@@ -10139,7 +10060,7 @@
           <p:cNvPr id="4" name="スライド番号プレースホルダー 3">
             <a:extLst>
               <a:ext uri="{FF2B5EF4-FFF2-40B4-BE49-F238E27FC236}">
-                <a16:creationId xmlns:a16="http://schemas.microsoft.com/office/drawing/2014/main" id="{F34A3196-3A71-4C81-B57D-C32DB8F6FBDE}"/>
+                <a16:creationId xmlns:a16="http://schemas.microsoft.com/office/drawing/2014/main" id="{5CED823B-DFC8-439D-9CF7-CE0A0057BB69}"/>
               </a:ext>
             </a:extLst>
           </p:cNvPr>
@@ -10166,7 +10087,7 @@
     </p:spTree>
     <p:extLst>
       <p:ext uri="{BB962C8B-B14F-4D97-AF65-F5344CB8AC3E}">
-        <p14:creationId xmlns:p14="http://schemas.microsoft.com/office/powerpoint/2010/main" val="955102109"/>
+        <p14:creationId xmlns:p14="http://schemas.microsoft.com/office/powerpoint/2010/main" val="1909953993"/>
       </p:ext>
     </p:extLst>
   </p:cSld>
@@ -10195,6 +10116,996 @@
       </p:grpSpPr>
       <p:sp>
         <p:nvSpPr>
+          <p:cNvPr id="2" name="タイトル 1">
+            <a:extLst>
+              <a:ext uri="{FF2B5EF4-FFF2-40B4-BE49-F238E27FC236}">
+                <a16:creationId xmlns:a16="http://schemas.microsoft.com/office/drawing/2014/main" id="{4B0A1C97-E14C-4B2E-9472-BC9F92C9DA0F}"/>
+              </a:ext>
+            </a:extLst>
+          </p:cNvPr>
+          <p:cNvSpPr>
+            <a:spLocks noGrp="1"/>
+          </p:cNvSpPr>
+          <p:nvPr>
+            <p:ph type="title"/>
+          </p:nvPr>
+        </p:nvSpPr>
+        <p:spPr/>
+        <p:txBody>
+          <a:bodyPr/>
+          <a:lstStyle/>
+          <a:p>
+            <a:r>
+              <a:rPr lang="en-US" altLang="ja-JP" dirty="0"/>
+              <a:t>Access control applied on UI</a:t>
+            </a:r>
+          </a:p>
+        </p:txBody>
+      </p:sp>
+      <p:sp>
+        <p:nvSpPr>
+          <p:cNvPr id="4" name="テキスト ボックス 3">
+            <a:extLst>
+              <a:ext uri="{FF2B5EF4-FFF2-40B4-BE49-F238E27FC236}">
+                <a16:creationId xmlns:a16="http://schemas.microsoft.com/office/drawing/2014/main" id="{CCE6C103-BEDA-4E8D-9377-DBA84EE64931}"/>
+              </a:ext>
+            </a:extLst>
+          </p:cNvPr>
+          <p:cNvSpPr txBox="1"/>
+          <p:nvPr/>
+        </p:nvSpPr>
+        <p:spPr>
+          <a:xfrm>
+            <a:off x="838199" y="1690688"/>
+            <a:ext cx="10515599" cy="4339650"/>
+          </a:xfrm>
+          <a:prstGeom prst="rect">
+            <a:avLst/>
+          </a:prstGeom>
+          <a:noFill/>
+        </p:spPr>
+        <p:txBody>
+          <a:bodyPr wrap="square" rtlCol="0">
+            <a:spAutoFit/>
+          </a:bodyPr>
+          <a:lstStyle/>
+          <a:p>
+            <a:r>
+              <a:rPr lang="en-US" altLang="ja-JP" sz="1200" b="1" dirty="0">
+                <a:latin typeface="Courier New" panose="02070309020205020404" pitchFamily="49" charset="0"/>
+                <a:cs typeface="Courier New" panose="02070309020205020404" pitchFamily="49" charset="0"/>
+              </a:rPr>
+              <a:t>For menu bar</a:t>
+            </a:r>
+          </a:p>
+          <a:p>
+            <a:r>
+              <a:rPr lang="en-US" altLang="ja-JP" sz="1200" dirty="0">
+                <a:latin typeface="Courier New" panose="02070309020205020404" pitchFamily="49" charset="0"/>
+                <a:cs typeface="Courier New" panose="02070309020205020404" pitchFamily="49" charset="0"/>
+              </a:rPr>
+              <a:t>$items = [];</a:t>
+            </a:r>
+          </a:p>
+          <a:p>
+            <a:r>
+              <a:rPr lang="en-US" altLang="ja-JP" sz="1200" dirty="0">
+                <a:latin typeface="Courier New" panose="02070309020205020404" pitchFamily="49" charset="0"/>
+                <a:cs typeface="Courier New" panose="02070309020205020404" pitchFamily="49" charset="0"/>
+              </a:rPr>
+              <a:t>if (</a:t>
+            </a:r>
+            <a:r>
+              <a:rPr lang="en-US" altLang="ja-JP" sz="1200" dirty="0" err="1">
+                <a:latin typeface="Courier New" panose="02070309020205020404" pitchFamily="49" charset="0"/>
+                <a:cs typeface="Courier New" panose="02070309020205020404" pitchFamily="49" charset="0"/>
+              </a:rPr>
+              <a:t>Yii</a:t>
+            </a:r>
+            <a:r>
+              <a:rPr lang="en-US" altLang="ja-JP" sz="1200" dirty="0">
+                <a:latin typeface="Courier New" panose="02070309020205020404" pitchFamily="49" charset="0"/>
+                <a:cs typeface="Courier New" panose="02070309020205020404" pitchFamily="49" charset="0"/>
+              </a:rPr>
+              <a:t>::$app-&gt;user-&gt;</a:t>
+            </a:r>
+            <a:r>
+              <a:rPr lang="en-US" altLang="ja-JP" sz="1200" dirty="0" err="1">
+                <a:latin typeface="Courier New" panose="02070309020205020404" pitchFamily="49" charset="0"/>
+                <a:cs typeface="Courier New" panose="02070309020205020404" pitchFamily="49" charset="0"/>
+              </a:rPr>
+              <a:t>isGuest</a:t>
+            </a:r>
+            <a:r>
+              <a:rPr lang="en-US" altLang="ja-JP" sz="1200" dirty="0">
+                <a:latin typeface="Courier New" panose="02070309020205020404" pitchFamily="49" charset="0"/>
+                <a:cs typeface="Courier New" panose="02070309020205020404" pitchFamily="49" charset="0"/>
+              </a:rPr>
+              <a:t>) {</a:t>
+            </a:r>
+          </a:p>
+          <a:p>
+            <a:r>
+              <a:rPr lang="en-US" altLang="ja-JP" sz="1200" dirty="0">
+                <a:latin typeface="Courier New" panose="02070309020205020404" pitchFamily="49" charset="0"/>
+                <a:cs typeface="Courier New" panose="02070309020205020404" pitchFamily="49" charset="0"/>
+              </a:rPr>
+              <a:t>    $items[] = ['label' =&gt; 'Login', '</a:t>
+            </a:r>
+            <a:r>
+              <a:rPr lang="en-US" altLang="ja-JP" sz="1200" dirty="0" err="1">
+                <a:latin typeface="Courier New" panose="02070309020205020404" pitchFamily="49" charset="0"/>
+                <a:cs typeface="Courier New" panose="02070309020205020404" pitchFamily="49" charset="0"/>
+              </a:rPr>
+              <a:t>url</a:t>
+            </a:r>
+            <a:r>
+              <a:rPr lang="en-US" altLang="ja-JP" sz="1200" dirty="0">
+                <a:latin typeface="Courier New" panose="02070309020205020404" pitchFamily="49" charset="0"/>
+                <a:cs typeface="Courier New" panose="02070309020205020404" pitchFamily="49" charset="0"/>
+              </a:rPr>
+              <a:t>' =&gt; ['/site/login']];</a:t>
+            </a:r>
+          </a:p>
+          <a:p>
+            <a:r>
+              <a:rPr lang="en-US" altLang="ja-JP" sz="1200" dirty="0">
+                <a:latin typeface="Courier New" panose="02070309020205020404" pitchFamily="49" charset="0"/>
+                <a:cs typeface="Courier New" panose="02070309020205020404" pitchFamily="49" charset="0"/>
+              </a:rPr>
+              <a:t>} else {</a:t>
+            </a:r>
+          </a:p>
+          <a:p>
+            <a:r>
+              <a:rPr lang="en-US" altLang="ja-JP" sz="1200" dirty="0">
+                <a:latin typeface="Courier New" panose="02070309020205020404" pitchFamily="49" charset="0"/>
+                <a:cs typeface="Courier New" panose="02070309020205020404" pitchFamily="49" charset="0"/>
+              </a:rPr>
+              <a:t>    $items[] = ['label' =&gt; 'Post', '</a:t>
+            </a:r>
+            <a:r>
+              <a:rPr lang="en-US" altLang="ja-JP" sz="1200" dirty="0" err="1">
+                <a:latin typeface="Courier New" panose="02070309020205020404" pitchFamily="49" charset="0"/>
+                <a:cs typeface="Courier New" panose="02070309020205020404" pitchFamily="49" charset="0"/>
+              </a:rPr>
+              <a:t>url</a:t>
+            </a:r>
+            <a:r>
+              <a:rPr lang="en-US" altLang="ja-JP" sz="1200" dirty="0">
+                <a:latin typeface="Courier New" panose="02070309020205020404" pitchFamily="49" charset="0"/>
+                <a:cs typeface="Courier New" panose="02070309020205020404" pitchFamily="49" charset="0"/>
+              </a:rPr>
+              <a:t>' =&gt; ['/post/index']];</a:t>
+            </a:r>
+          </a:p>
+          <a:p>
+            <a:r>
+              <a:rPr lang="en-US" altLang="ja-JP" sz="1200" dirty="0">
+                <a:latin typeface="Courier New" panose="02070309020205020404" pitchFamily="49" charset="0"/>
+                <a:cs typeface="Courier New" panose="02070309020205020404" pitchFamily="49" charset="0"/>
+              </a:rPr>
+              <a:t>    if (</a:t>
+            </a:r>
+            <a:r>
+              <a:rPr lang="en-US" altLang="ja-JP" sz="1200" b="1" dirty="0" err="1">
+                <a:solidFill>
+                  <a:srgbClr val="FF0000"/>
+                </a:solidFill>
+                <a:latin typeface="Courier New" panose="02070309020205020404" pitchFamily="49" charset="0"/>
+                <a:cs typeface="Courier New" panose="02070309020205020404" pitchFamily="49" charset="0"/>
+              </a:rPr>
+              <a:t>Yii</a:t>
+            </a:r>
+            <a:r>
+              <a:rPr lang="en-US" altLang="ja-JP" sz="1200" b="1" dirty="0">
+                <a:solidFill>
+                  <a:srgbClr val="FF0000"/>
+                </a:solidFill>
+                <a:latin typeface="Courier New" panose="02070309020205020404" pitchFamily="49" charset="0"/>
+                <a:cs typeface="Courier New" panose="02070309020205020404" pitchFamily="49" charset="0"/>
+              </a:rPr>
+              <a:t>::$app-&gt;user-&gt;can('</a:t>
+            </a:r>
+            <a:r>
+              <a:rPr lang="en-US" altLang="ja-JP" sz="1200" b="1" dirty="0" err="1">
+                <a:solidFill>
+                  <a:srgbClr val="FF0000"/>
+                </a:solidFill>
+                <a:latin typeface="Courier New" panose="02070309020205020404" pitchFamily="49" charset="0"/>
+                <a:cs typeface="Courier New" panose="02070309020205020404" pitchFamily="49" charset="0"/>
+              </a:rPr>
+              <a:t>manageUser</a:t>
+            </a:r>
+            <a:r>
+              <a:rPr lang="en-US" altLang="ja-JP" sz="1200" b="1" dirty="0">
+                <a:solidFill>
+                  <a:srgbClr val="FF0000"/>
+                </a:solidFill>
+                <a:latin typeface="Courier New" panose="02070309020205020404" pitchFamily="49" charset="0"/>
+                <a:cs typeface="Courier New" panose="02070309020205020404" pitchFamily="49" charset="0"/>
+              </a:rPr>
+              <a:t>')) </a:t>
+            </a:r>
+            <a:r>
+              <a:rPr lang="en-US" altLang="ja-JP" sz="1200" dirty="0">
+                <a:latin typeface="Courier New" panose="02070309020205020404" pitchFamily="49" charset="0"/>
+                <a:cs typeface="Courier New" panose="02070309020205020404" pitchFamily="49" charset="0"/>
+              </a:rPr>
+              <a:t>{</a:t>
+            </a:r>
+          </a:p>
+          <a:p>
+            <a:r>
+              <a:rPr lang="en-US" altLang="ja-JP" sz="1200" dirty="0">
+                <a:latin typeface="Courier New" panose="02070309020205020404" pitchFamily="49" charset="0"/>
+                <a:cs typeface="Courier New" panose="02070309020205020404" pitchFamily="49" charset="0"/>
+              </a:rPr>
+              <a:t>        $items[] = ['label' =&gt; 'User', '</a:t>
+            </a:r>
+            <a:r>
+              <a:rPr lang="en-US" altLang="ja-JP" sz="1200" dirty="0" err="1">
+                <a:latin typeface="Courier New" panose="02070309020205020404" pitchFamily="49" charset="0"/>
+                <a:cs typeface="Courier New" panose="02070309020205020404" pitchFamily="49" charset="0"/>
+              </a:rPr>
+              <a:t>url</a:t>
+            </a:r>
+            <a:r>
+              <a:rPr lang="en-US" altLang="ja-JP" sz="1200" dirty="0">
+                <a:latin typeface="Courier New" panose="02070309020205020404" pitchFamily="49" charset="0"/>
+                <a:cs typeface="Courier New" panose="02070309020205020404" pitchFamily="49" charset="0"/>
+              </a:rPr>
+              <a:t>' =&gt; ['/user/index']];</a:t>
+            </a:r>
+          </a:p>
+          <a:p>
+            <a:r>
+              <a:rPr lang="en-US" altLang="ja-JP" sz="1200" dirty="0">
+                <a:latin typeface="Courier New" panose="02070309020205020404" pitchFamily="49" charset="0"/>
+                <a:cs typeface="Courier New" panose="02070309020205020404" pitchFamily="49" charset="0"/>
+              </a:rPr>
+              <a:t>    }</a:t>
+            </a:r>
+          </a:p>
+          <a:p>
+            <a:r>
+              <a:rPr lang="en-US" altLang="ja-JP" sz="1200" dirty="0">
+                <a:latin typeface="Courier New" panose="02070309020205020404" pitchFamily="49" charset="0"/>
+                <a:cs typeface="Courier New" panose="02070309020205020404" pitchFamily="49" charset="0"/>
+              </a:rPr>
+              <a:t>    $items[] = $</a:t>
+            </a:r>
+            <a:r>
+              <a:rPr lang="en-US" altLang="ja-JP" sz="1200" dirty="0" err="1">
+                <a:latin typeface="Courier New" panose="02070309020205020404" pitchFamily="49" charset="0"/>
+                <a:cs typeface="Courier New" panose="02070309020205020404" pitchFamily="49" charset="0"/>
+              </a:rPr>
+              <a:t>logoutMenuItem</a:t>
+            </a:r>
+            <a:r>
+              <a:rPr lang="en-US" altLang="ja-JP" sz="1200" dirty="0">
+                <a:latin typeface="Courier New" panose="02070309020205020404" pitchFamily="49" charset="0"/>
+                <a:cs typeface="Courier New" panose="02070309020205020404" pitchFamily="49" charset="0"/>
+              </a:rPr>
+              <a:t>;</a:t>
+            </a:r>
+          </a:p>
+          <a:p>
+            <a:r>
+              <a:rPr lang="en-US" altLang="ja-JP" sz="1200" dirty="0">
+                <a:latin typeface="Courier New" panose="02070309020205020404" pitchFamily="49" charset="0"/>
+                <a:cs typeface="Courier New" panose="02070309020205020404" pitchFamily="49" charset="0"/>
+              </a:rPr>
+              <a:t>}</a:t>
+            </a:r>
+          </a:p>
+          <a:p>
+            <a:endParaRPr kumimoji="1" lang="en-US" altLang="ja-JP" sz="1200" dirty="0">
+              <a:latin typeface="Courier New" panose="02070309020205020404" pitchFamily="49" charset="0"/>
+              <a:cs typeface="Courier New" panose="02070309020205020404" pitchFamily="49" charset="0"/>
+            </a:endParaRPr>
+          </a:p>
+          <a:p>
+            <a:r>
+              <a:rPr kumimoji="1" lang="en-US" altLang="ja-JP" sz="1200" b="1" dirty="0">
+                <a:latin typeface="Courier New" panose="02070309020205020404" pitchFamily="49" charset="0"/>
+                <a:cs typeface="Courier New" panose="02070309020205020404" pitchFamily="49" charset="0"/>
+              </a:rPr>
+              <a:t>To control displaying of buttons on Post view page</a:t>
+            </a:r>
+          </a:p>
+          <a:p>
+            <a:r>
+              <a:rPr lang="en-US" altLang="ja-JP" sz="1200" dirty="0">
+                <a:latin typeface="Courier New" panose="02070309020205020404" pitchFamily="49" charset="0"/>
+                <a:cs typeface="Courier New" panose="02070309020205020404" pitchFamily="49" charset="0"/>
+              </a:rPr>
+              <a:t>&lt;?php if (</a:t>
+            </a:r>
+            <a:r>
+              <a:rPr lang="en-US" altLang="ja-JP" sz="1200" b="1" dirty="0" err="1">
+                <a:solidFill>
+                  <a:srgbClr val="FF0000"/>
+                </a:solidFill>
+                <a:latin typeface="Courier New" panose="02070309020205020404" pitchFamily="49" charset="0"/>
+                <a:cs typeface="Courier New" panose="02070309020205020404" pitchFamily="49" charset="0"/>
+              </a:rPr>
+              <a:t>Yii</a:t>
+            </a:r>
+            <a:r>
+              <a:rPr lang="en-US" altLang="ja-JP" sz="1200" b="1" dirty="0">
+                <a:solidFill>
+                  <a:srgbClr val="FF0000"/>
+                </a:solidFill>
+                <a:latin typeface="Courier New" panose="02070309020205020404" pitchFamily="49" charset="0"/>
+                <a:cs typeface="Courier New" panose="02070309020205020404" pitchFamily="49" charset="0"/>
+              </a:rPr>
+              <a:t>::$app-&gt;user-&gt;can('</a:t>
+            </a:r>
+            <a:r>
+              <a:rPr lang="en-US" altLang="ja-JP" sz="1200" b="1" dirty="0" err="1">
+                <a:solidFill>
+                  <a:srgbClr val="FF0000"/>
+                </a:solidFill>
+                <a:latin typeface="Courier New" panose="02070309020205020404" pitchFamily="49" charset="0"/>
+                <a:cs typeface="Courier New" panose="02070309020205020404" pitchFamily="49" charset="0"/>
+              </a:rPr>
+              <a:t>updatePost</a:t>
+            </a:r>
+            <a:r>
+              <a:rPr lang="en-US" altLang="ja-JP" sz="1200" b="1" dirty="0">
+                <a:solidFill>
+                  <a:srgbClr val="FF0000"/>
+                </a:solidFill>
+                <a:latin typeface="Courier New" panose="02070309020205020404" pitchFamily="49" charset="0"/>
+                <a:cs typeface="Courier New" panose="02070309020205020404" pitchFamily="49" charset="0"/>
+              </a:rPr>
+              <a:t>')) </a:t>
+            </a:r>
+            <a:r>
+              <a:rPr lang="en-US" altLang="ja-JP" sz="1200" dirty="0">
+                <a:latin typeface="Courier New" panose="02070309020205020404" pitchFamily="49" charset="0"/>
+                <a:cs typeface="Courier New" panose="02070309020205020404" pitchFamily="49" charset="0"/>
+              </a:rPr>
+              <a:t>{ ?&gt;</a:t>
+            </a:r>
+          </a:p>
+          <a:p>
+            <a:r>
+              <a:rPr lang="en-US" altLang="ja-JP" sz="1200" dirty="0">
+                <a:latin typeface="Courier New" panose="02070309020205020404" pitchFamily="49" charset="0"/>
+                <a:cs typeface="Courier New" panose="02070309020205020404" pitchFamily="49" charset="0"/>
+              </a:rPr>
+              <a:t>    &lt;?= Html::a('Update', ['update', 'id' =&gt; $model-&gt;id], ['class' =&gt; '</a:t>
+            </a:r>
+            <a:r>
+              <a:rPr lang="en-US" altLang="ja-JP" sz="1200" dirty="0" err="1">
+                <a:latin typeface="Courier New" panose="02070309020205020404" pitchFamily="49" charset="0"/>
+                <a:cs typeface="Courier New" panose="02070309020205020404" pitchFamily="49" charset="0"/>
+              </a:rPr>
+              <a:t>btn</a:t>
+            </a:r>
+            <a:r>
+              <a:rPr lang="en-US" altLang="ja-JP" sz="1200" dirty="0">
+                <a:latin typeface="Courier New" panose="02070309020205020404" pitchFamily="49" charset="0"/>
+                <a:cs typeface="Courier New" panose="02070309020205020404" pitchFamily="49" charset="0"/>
+              </a:rPr>
+              <a:t> </a:t>
+            </a:r>
+            <a:r>
+              <a:rPr lang="en-US" altLang="ja-JP" sz="1200" dirty="0" err="1">
+                <a:latin typeface="Courier New" panose="02070309020205020404" pitchFamily="49" charset="0"/>
+                <a:cs typeface="Courier New" panose="02070309020205020404" pitchFamily="49" charset="0"/>
+              </a:rPr>
+              <a:t>btn</a:t>
+            </a:r>
+            <a:r>
+              <a:rPr lang="en-US" altLang="ja-JP" sz="1200" dirty="0">
+                <a:latin typeface="Courier New" panose="02070309020205020404" pitchFamily="49" charset="0"/>
+                <a:cs typeface="Courier New" panose="02070309020205020404" pitchFamily="49" charset="0"/>
+              </a:rPr>
+              <a:t>-primary']) ?&gt;</a:t>
+            </a:r>
+          </a:p>
+          <a:p>
+            <a:r>
+              <a:rPr lang="en-US" altLang="ja-JP" sz="1200" dirty="0">
+                <a:latin typeface="Courier New" panose="02070309020205020404" pitchFamily="49" charset="0"/>
+                <a:cs typeface="Courier New" panose="02070309020205020404" pitchFamily="49" charset="0"/>
+              </a:rPr>
+              <a:t>    &lt;?= Html::a('Delete', ['delete', 'id' =&gt; $model-&gt;id], [</a:t>
+            </a:r>
+          </a:p>
+          <a:p>
+            <a:r>
+              <a:rPr lang="en-US" altLang="ja-JP" sz="1200" dirty="0">
+                <a:latin typeface="Courier New" panose="02070309020205020404" pitchFamily="49" charset="0"/>
+                <a:cs typeface="Courier New" panose="02070309020205020404" pitchFamily="49" charset="0"/>
+              </a:rPr>
+              <a:t>        'class' =&gt; '</a:t>
+            </a:r>
+            <a:r>
+              <a:rPr lang="en-US" altLang="ja-JP" sz="1200" dirty="0" err="1">
+                <a:latin typeface="Courier New" panose="02070309020205020404" pitchFamily="49" charset="0"/>
+                <a:cs typeface="Courier New" panose="02070309020205020404" pitchFamily="49" charset="0"/>
+              </a:rPr>
+              <a:t>btn</a:t>
+            </a:r>
+            <a:r>
+              <a:rPr lang="en-US" altLang="ja-JP" sz="1200" dirty="0">
+                <a:latin typeface="Courier New" panose="02070309020205020404" pitchFamily="49" charset="0"/>
+                <a:cs typeface="Courier New" panose="02070309020205020404" pitchFamily="49" charset="0"/>
+              </a:rPr>
+              <a:t> </a:t>
+            </a:r>
+            <a:r>
+              <a:rPr lang="en-US" altLang="ja-JP" sz="1200" dirty="0" err="1">
+                <a:latin typeface="Courier New" panose="02070309020205020404" pitchFamily="49" charset="0"/>
+                <a:cs typeface="Courier New" panose="02070309020205020404" pitchFamily="49" charset="0"/>
+              </a:rPr>
+              <a:t>btn</a:t>
+            </a:r>
+            <a:r>
+              <a:rPr lang="en-US" altLang="ja-JP" sz="1200" dirty="0">
+                <a:latin typeface="Courier New" panose="02070309020205020404" pitchFamily="49" charset="0"/>
+                <a:cs typeface="Courier New" panose="02070309020205020404" pitchFamily="49" charset="0"/>
+              </a:rPr>
+              <a:t>-danger',</a:t>
+            </a:r>
+          </a:p>
+          <a:p>
+            <a:r>
+              <a:rPr lang="en-US" altLang="ja-JP" sz="1200" dirty="0">
+                <a:latin typeface="Courier New" panose="02070309020205020404" pitchFamily="49" charset="0"/>
+                <a:cs typeface="Courier New" panose="02070309020205020404" pitchFamily="49" charset="0"/>
+              </a:rPr>
+              <a:t>        'data' =&gt; [</a:t>
+            </a:r>
+          </a:p>
+          <a:p>
+            <a:r>
+              <a:rPr lang="en-US" altLang="ja-JP" sz="1200" dirty="0">
+                <a:latin typeface="Courier New" panose="02070309020205020404" pitchFamily="49" charset="0"/>
+                <a:cs typeface="Courier New" panose="02070309020205020404" pitchFamily="49" charset="0"/>
+              </a:rPr>
+              <a:t>            'confirm' =&gt; 'Are you sure you want to delete this item?',</a:t>
+            </a:r>
+          </a:p>
+          <a:p>
+            <a:r>
+              <a:rPr lang="en-US" altLang="ja-JP" sz="1200" dirty="0">
+                <a:latin typeface="Courier New" panose="02070309020205020404" pitchFamily="49" charset="0"/>
+                <a:cs typeface="Courier New" panose="02070309020205020404" pitchFamily="49" charset="0"/>
+              </a:rPr>
+              <a:t>            'method' =&gt; 'post',</a:t>
+            </a:r>
+          </a:p>
+          <a:p>
+            <a:r>
+              <a:rPr lang="en-US" altLang="ja-JP" sz="1200" dirty="0">
+                <a:latin typeface="Courier New" panose="02070309020205020404" pitchFamily="49" charset="0"/>
+                <a:cs typeface="Courier New" panose="02070309020205020404" pitchFamily="49" charset="0"/>
+              </a:rPr>
+              <a:t>        ],</a:t>
+            </a:r>
+          </a:p>
+          <a:p>
+            <a:r>
+              <a:rPr lang="en-US" altLang="ja-JP" sz="1200" dirty="0">
+                <a:latin typeface="Courier New" panose="02070309020205020404" pitchFamily="49" charset="0"/>
+                <a:cs typeface="Courier New" panose="02070309020205020404" pitchFamily="49" charset="0"/>
+              </a:rPr>
+              <a:t>    ]) ?&gt;</a:t>
+            </a:r>
+          </a:p>
+          <a:p>
+            <a:r>
+              <a:rPr lang="en-US" altLang="ja-JP" sz="1200" dirty="0">
+                <a:latin typeface="Courier New" panose="02070309020205020404" pitchFamily="49" charset="0"/>
+                <a:cs typeface="Courier New" panose="02070309020205020404" pitchFamily="49" charset="0"/>
+              </a:rPr>
+              <a:t>&lt;?php } ?&gt;</a:t>
+            </a:r>
+          </a:p>
+        </p:txBody>
+      </p:sp>
+      <p:sp>
+        <p:nvSpPr>
+          <p:cNvPr id="3" name="スライド番号プレースホルダー 2">
+            <a:extLst>
+              <a:ext uri="{FF2B5EF4-FFF2-40B4-BE49-F238E27FC236}">
+                <a16:creationId xmlns:a16="http://schemas.microsoft.com/office/drawing/2014/main" id="{15E8DE9D-F2BC-45AD-A222-6F66DA19F34E}"/>
+              </a:ext>
+            </a:extLst>
+          </p:cNvPr>
+          <p:cNvSpPr>
+            <a:spLocks noGrp="1"/>
+          </p:cNvSpPr>
+          <p:nvPr>
+            <p:ph type="sldNum" sz="quarter" idx="12"/>
+          </p:nvPr>
+        </p:nvSpPr>
+        <p:spPr/>
+        <p:txBody>
+          <a:bodyPr/>
+          <a:lstStyle/>
+          <a:p>
+            <a:fld id="{F8D8928E-AA9A-4D89-BC1F-A2C05AB4BD92}" type="slidenum">
+              <a:rPr kumimoji="1" lang="ja-JP" altLang="en-US" smtClean="0"/>
+              <a:t>22</a:t>
+            </a:fld>
+            <a:endParaRPr kumimoji="1" lang="ja-JP" altLang="en-US"/>
+          </a:p>
+        </p:txBody>
+      </p:sp>
+      <p:sp>
+        <p:nvSpPr>
+          <p:cNvPr id="5" name="テキスト ボックス 4">
+            <a:extLst>
+              <a:ext uri="{FF2B5EF4-FFF2-40B4-BE49-F238E27FC236}">
+                <a16:creationId xmlns:a16="http://schemas.microsoft.com/office/drawing/2014/main" id="{91DFAF3D-A40B-4A9E-90BA-2CD6FF4C5DA6}"/>
+              </a:ext>
+            </a:extLst>
+          </p:cNvPr>
+          <p:cNvSpPr txBox="1"/>
+          <p:nvPr/>
+        </p:nvSpPr>
+        <p:spPr>
+          <a:xfrm>
+            <a:off x="8318377" y="1506022"/>
+            <a:ext cx="1766656" cy="369332"/>
+          </a:xfrm>
+          <a:prstGeom prst="rect">
+            <a:avLst/>
+          </a:prstGeom>
+          <a:noFill/>
+        </p:spPr>
+        <p:txBody>
+          <a:bodyPr wrap="square" rtlCol="0">
+            <a:spAutoFit/>
+          </a:bodyPr>
+          <a:lstStyle/>
+          <a:p>
+            <a:r>
+              <a:rPr kumimoji="1" lang="en-US" altLang="ja-JP" dirty="0">
+                <a:hlinkClick r:id="rId2"/>
+              </a:rPr>
+              <a:t>Source Code</a:t>
+            </a:r>
+            <a:endParaRPr kumimoji="1" lang="ja-JP" altLang="en-US" dirty="0"/>
+          </a:p>
+        </p:txBody>
+      </p:sp>
+      <p:sp>
+        <p:nvSpPr>
+          <p:cNvPr id="6" name="テキスト ボックス 5">
+            <a:extLst>
+              <a:ext uri="{FF2B5EF4-FFF2-40B4-BE49-F238E27FC236}">
+                <a16:creationId xmlns:a16="http://schemas.microsoft.com/office/drawing/2014/main" id="{D2C721D5-B564-4DD6-98BE-4FB6EF42A782}"/>
+              </a:ext>
+            </a:extLst>
+          </p:cNvPr>
+          <p:cNvSpPr txBox="1"/>
+          <p:nvPr/>
+        </p:nvSpPr>
+        <p:spPr>
+          <a:xfrm>
+            <a:off x="8318377" y="3864751"/>
+            <a:ext cx="1464815" cy="369332"/>
+          </a:xfrm>
+          <a:prstGeom prst="rect">
+            <a:avLst/>
+          </a:prstGeom>
+          <a:noFill/>
+        </p:spPr>
+        <p:txBody>
+          <a:bodyPr wrap="square" rtlCol="0">
+            <a:spAutoFit/>
+          </a:bodyPr>
+          <a:lstStyle/>
+          <a:p>
+            <a:r>
+              <a:rPr kumimoji="1" lang="en-US" altLang="ja-JP" dirty="0">
+                <a:hlinkClick r:id="rId3"/>
+              </a:rPr>
+              <a:t>Source Code</a:t>
+            </a:r>
+            <a:endParaRPr kumimoji="1" lang="ja-JP" altLang="en-US" dirty="0"/>
+          </a:p>
+        </p:txBody>
+      </p:sp>
+    </p:spTree>
+    <p:extLst>
+      <p:ext uri="{BB962C8B-B14F-4D97-AF65-F5344CB8AC3E}">
+        <p14:creationId xmlns:p14="http://schemas.microsoft.com/office/powerpoint/2010/main" val="3352262058"/>
+      </p:ext>
+    </p:extLst>
+  </p:cSld>
+  <p:clrMapOvr>
+    <a:masterClrMapping/>
+  </p:clrMapOvr>
+</p:sld>
+</file>
+
+<file path=ppt/slides/slide23.xml><?xml version="1.0" encoding="utf-8"?>
+<p:sld xmlns:a="http://schemas.openxmlformats.org/drawingml/2006/main" xmlns:r="http://schemas.openxmlformats.org/officeDocument/2006/relationships" xmlns:p="http://schemas.openxmlformats.org/presentationml/2006/main">
+  <p:cSld>
+    <p:spTree>
+      <p:nvGrpSpPr>
+        <p:cNvPr id="1" name=""/>
+        <p:cNvGrpSpPr/>
+        <p:nvPr/>
+      </p:nvGrpSpPr>
+      <p:grpSpPr>
+        <a:xfrm>
+          <a:off x="0" y="0"/>
+          <a:ext cx="0" cy="0"/>
+          <a:chOff x="0" y="0"/>
+          <a:chExt cx="0" cy="0"/>
+        </a:xfrm>
+      </p:grpSpPr>
+      <p:sp>
+        <p:nvSpPr>
+          <p:cNvPr id="2" name="タイトル 1">
+            <a:extLst>
+              <a:ext uri="{FF2B5EF4-FFF2-40B4-BE49-F238E27FC236}">
+                <a16:creationId xmlns:a16="http://schemas.microsoft.com/office/drawing/2014/main" id="{0EAABD64-E1A6-4248-9D52-B26FA0AE123A}"/>
+              </a:ext>
+            </a:extLst>
+          </p:cNvPr>
+          <p:cNvSpPr>
+            <a:spLocks noGrp="1"/>
+          </p:cNvSpPr>
+          <p:nvPr>
+            <p:ph type="title"/>
+          </p:nvPr>
+        </p:nvSpPr>
+        <p:spPr/>
+        <p:txBody>
+          <a:bodyPr/>
+          <a:lstStyle/>
+          <a:p>
+            <a:r>
+              <a:rPr kumimoji="1" lang="en-US" altLang="ja-JP" dirty="0"/>
+              <a:t>Demo of menu</a:t>
+            </a:r>
+            <a:endParaRPr kumimoji="1" lang="ja-JP" altLang="en-US" dirty="0"/>
+          </a:p>
+        </p:txBody>
+      </p:sp>
+      <p:sp>
+        <p:nvSpPr>
+          <p:cNvPr id="3" name="コンテンツ プレースホルダー 2">
+            <a:extLst>
+              <a:ext uri="{FF2B5EF4-FFF2-40B4-BE49-F238E27FC236}">
+                <a16:creationId xmlns:a16="http://schemas.microsoft.com/office/drawing/2014/main" id="{C1DD51D2-429F-4457-836A-BECE2F9D0521}"/>
+              </a:ext>
+            </a:extLst>
+          </p:cNvPr>
+          <p:cNvSpPr>
+            <a:spLocks noGrp="1"/>
+          </p:cNvSpPr>
+          <p:nvPr>
+            <p:ph idx="1"/>
+          </p:nvPr>
+        </p:nvSpPr>
+        <p:spPr/>
+        <p:txBody>
+          <a:bodyPr/>
+          <a:lstStyle/>
+          <a:p>
+            <a:endParaRPr kumimoji="1" lang="ja-JP" altLang="en-US"/>
+          </a:p>
+        </p:txBody>
+      </p:sp>
+      <p:sp>
+        <p:nvSpPr>
+          <p:cNvPr id="4" name="スライド番号プレースホルダー 3">
+            <a:extLst>
+              <a:ext uri="{FF2B5EF4-FFF2-40B4-BE49-F238E27FC236}">
+                <a16:creationId xmlns:a16="http://schemas.microsoft.com/office/drawing/2014/main" id="{FE874701-763B-4AA7-A3E1-1E737D2FC9D2}"/>
+              </a:ext>
+            </a:extLst>
+          </p:cNvPr>
+          <p:cNvSpPr>
+            <a:spLocks noGrp="1"/>
+          </p:cNvSpPr>
+          <p:nvPr>
+            <p:ph type="sldNum" sz="quarter" idx="12"/>
+          </p:nvPr>
+        </p:nvSpPr>
+        <p:spPr/>
+        <p:txBody>
+          <a:bodyPr/>
+          <a:lstStyle/>
+          <a:p>
+            <a:fld id="{F8D8928E-AA9A-4D89-BC1F-A2C05AB4BD92}" type="slidenum">
+              <a:rPr kumimoji="1" lang="ja-JP" altLang="en-US" smtClean="0"/>
+              <a:t>23</a:t>
+            </a:fld>
+            <a:endParaRPr kumimoji="1" lang="ja-JP" altLang="en-US"/>
+          </a:p>
+        </p:txBody>
+      </p:sp>
+    </p:spTree>
+    <p:extLst>
+      <p:ext uri="{BB962C8B-B14F-4D97-AF65-F5344CB8AC3E}">
+        <p14:creationId xmlns:p14="http://schemas.microsoft.com/office/powerpoint/2010/main" val="3425550773"/>
+      </p:ext>
+    </p:extLst>
+  </p:cSld>
+  <p:clrMapOvr>
+    <a:masterClrMapping/>
+  </p:clrMapOvr>
+</p:sld>
+</file>
+
+<file path=ppt/slides/slide24.xml><?xml version="1.0" encoding="utf-8"?>
+<p:sld xmlns:a="http://schemas.openxmlformats.org/drawingml/2006/main" xmlns:r="http://schemas.openxmlformats.org/officeDocument/2006/relationships" xmlns:p="http://schemas.openxmlformats.org/presentationml/2006/main">
+  <p:cSld>
+    <p:spTree>
+      <p:nvGrpSpPr>
+        <p:cNvPr id="1" name=""/>
+        <p:cNvGrpSpPr/>
+        <p:nvPr/>
+      </p:nvGrpSpPr>
+      <p:grpSpPr>
+        <a:xfrm>
+          <a:off x="0" y="0"/>
+          <a:ext cx="0" cy="0"/>
+          <a:chOff x="0" y="0"/>
+          <a:chExt cx="0" cy="0"/>
+        </a:xfrm>
+      </p:grpSpPr>
+      <p:sp>
+        <p:nvSpPr>
+          <p:cNvPr id="2" name="タイトル 1">
+            <a:extLst>
+              <a:ext uri="{FF2B5EF4-FFF2-40B4-BE49-F238E27FC236}">
+                <a16:creationId xmlns:a16="http://schemas.microsoft.com/office/drawing/2014/main" id="{82021B7D-BC6C-4733-8478-5866FB894C61}"/>
+              </a:ext>
+            </a:extLst>
+          </p:cNvPr>
+          <p:cNvSpPr>
+            <a:spLocks noGrp="1"/>
+          </p:cNvSpPr>
+          <p:nvPr>
+            <p:ph type="title"/>
+          </p:nvPr>
+        </p:nvSpPr>
+        <p:spPr/>
+        <p:txBody>
+          <a:bodyPr/>
+          <a:lstStyle/>
+          <a:p>
+            <a:r>
+              <a:rPr kumimoji="1" lang="en-US" altLang="ja-JP" dirty="0"/>
+              <a:t>Demo of buttons</a:t>
+            </a:r>
+            <a:endParaRPr kumimoji="1" lang="ja-JP" altLang="en-US" dirty="0"/>
+          </a:p>
+        </p:txBody>
+      </p:sp>
+      <p:sp>
+        <p:nvSpPr>
+          <p:cNvPr id="3" name="コンテンツ プレースホルダー 2">
+            <a:extLst>
+              <a:ext uri="{FF2B5EF4-FFF2-40B4-BE49-F238E27FC236}">
+                <a16:creationId xmlns:a16="http://schemas.microsoft.com/office/drawing/2014/main" id="{EEC08F7A-2025-4E37-BD2F-B70E1C49E0AE}"/>
+              </a:ext>
+            </a:extLst>
+          </p:cNvPr>
+          <p:cNvSpPr>
+            <a:spLocks noGrp="1"/>
+          </p:cNvSpPr>
+          <p:nvPr>
+            <p:ph idx="1"/>
+          </p:nvPr>
+        </p:nvSpPr>
+        <p:spPr/>
+        <p:txBody>
+          <a:bodyPr/>
+          <a:lstStyle/>
+          <a:p>
+            <a:endParaRPr kumimoji="1" lang="ja-JP" altLang="en-US"/>
+          </a:p>
+        </p:txBody>
+      </p:sp>
+      <p:sp>
+        <p:nvSpPr>
+          <p:cNvPr id="4" name="スライド番号プレースホルダー 3">
+            <a:extLst>
+              <a:ext uri="{FF2B5EF4-FFF2-40B4-BE49-F238E27FC236}">
+                <a16:creationId xmlns:a16="http://schemas.microsoft.com/office/drawing/2014/main" id="{16D6FB86-6015-414E-86B8-9A7DCD3725C2}"/>
+              </a:ext>
+            </a:extLst>
+          </p:cNvPr>
+          <p:cNvSpPr>
+            <a:spLocks noGrp="1"/>
+          </p:cNvSpPr>
+          <p:nvPr>
+            <p:ph type="sldNum" sz="quarter" idx="12"/>
+          </p:nvPr>
+        </p:nvSpPr>
+        <p:spPr/>
+        <p:txBody>
+          <a:bodyPr/>
+          <a:lstStyle/>
+          <a:p>
+            <a:fld id="{F8D8928E-AA9A-4D89-BC1F-A2C05AB4BD92}" type="slidenum">
+              <a:rPr kumimoji="1" lang="ja-JP" altLang="en-US" smtClean="0"/>
+              <a:t>24</a:t>
+            </a:fld>
+            <a:endParaRPr kumimoji="1" lang="ja-JP" altLang="en-US"/>
+          </a:p>
+        </p:txBody>
+      </p:sp>
+    </p:spTree>
+    <p:extLst>
+      <p:ext uri="{BB962C8B-B14F-4D97-AF65-F5344CB8AC3E}">
+        <p14:creationId xmlns:p14="http://schemas.microsoft.com/office/powerpoint/2010/main" val="4003251270"/>
+      </p:ext>
+    </p:extLst>
+  </p:cSld>
+  <p:clrMapOvr>
+    <a:masterClrMapping/>
+  </p:clrMapOvr>
+</p:sld>
+</file>
+
+<file path=ppt/slides/slide25.xml><?xml version="1.0" encoding="utf-8"?>
+<p:sld xmlns:a="http://schemas.openxmlformats.org/drawingml/2006/main" xmlns:r="http://schemas.openxmlformats.org/officeDocument/2006/relationships" xmlns:p="http://schemas.openxmlformats.org/presentationml/2006/main">
+  <p:cSld>
+    <p:spTree>
+      <p:nvGrpSpPr>
+        <p:cNvPr id="1" name=""/>
+        <p:cNvGrpSpPr/>
+        <p:nvPr/>
+      </p:nvGrpSpPr>
+      <p:grpSpPr>
+        <a:xfrm>
+          <a:off x="0" y="0"/>
+          <a:ext cx="0" cy="0"/>
+          <a:chOff x="0" y="0"/>
+          <a:chExt cx="0" cy="0"/>
+        </a:xfrm>
+      </p:grpSpPr>
+      <p:sp>
+        <p:nvSpPr>
+          <p:cNvPr id="2" name="タイトル 1">
+            <a:extLst>
+              <a:ext uri="{FF2B5EF4-FFF2-40B4-BE49-F238E27FC236}">
+                <a16:creationId xmlns:a16="http://schemas.microsoft.com/office/drawing/2014/main" id="{D0481A33-89BF-45FD-81CF-F52AE0224E57}"/>
+              </a:ext>
+            </a:extLst>
+          </p:cNvPr>
+          <p:cNvSpPr>
+            <a:spLocks noGrp="1"/>
+          </p:cNvSpPr>
+          <p:nvPr>
+            <p:ph type="title"/>
+          </p:nvPr>
+        </p:nvSpPr>
+        <p:spPr/>
+        <p:txBody>
+          <a:bodyPr/>
+          <a:lstStyle/>
+          <a:p>
+            <a:r>
+              <a:rPr lang="en-US" altLang="ja-JP" dirty="0"/>
+              <a:t>Behavior based on access permission</a:t>
+            </a:r>
+            <a:endParaRPr kumimoji="1" lang="ja-JP" altLang="en-US" dirty="0"/>
+          </a:p>
+        </p:txBody>
+      </p:sp>
+      <p:sp>
+        <p:nvSpPr>
+          <p:cNvPr id="3" name="コンテンツ プレースホルダー 2">
+            <a:extLst>
+              <a:ext uri="{FF2B5EF4-FFF2-40B4-BE49-F238E27FC236}">
+                <a16:creationId xmlns:a16="http://schemas.microsoft.com/office/drawing/2014/main" id="{24F20AEA-2853-4BC7-BC13-3EFC97E20D31}"/>
+              </a:ext>
+            </a:extLst>
+          </p:cNvPr>
+          <p:cNvSpPr>
+            <a:spLocks noGrp="1"/>
+          </p:cNvSpPr>
+          <p:nvPr>
+            <p:ph idx="1"/>
+          </p:nvPr>
+        </p:nvSpPr>
+        <p:spPr/>
+        <p:txBody>
+          <a:bodyPr/>
+          <a:lstStyle/>
+          <a:p>
+            <a:r>
+              <a:rPr lang="en-US" altLang="ja-JP" b="1" dirty="0">
+                <a:latin typeface="Courier New" panose="02070309020205020404" pitchFamily="49" charset="0"/>
+                <a:cs typeface="Courier New" panose="02070309020205020404" pitchFamily="49" charset="0"/>
+              </a:rPr>
+              <a:t>Use </a:t>
+            </a:r>
+            <a:r>
+              <a:rPr lang="en-US" altLang="ja-JP" b="1" dirty="0" err="1">
+                <a:latin typeface="Courier New" panose="02070309020205020404" pitchFamily="49" charset="0"/>
+                <a:cs typeface="Courier New" panose="02070309020205020404" pitchFamily="49" charset="0"/>
+              </a:rPr>
+              <a:t>Yii</a:t>
+            </a:r>
+            <a:r>
+              <a:rPr lang="en-US" altLang="ja-JP" b="1" dirty="0">
+                <a:latin typeface="Courier New" panose="02070309020205020404" pitchFamily="49" charset="0"/>
+                <a:cs typeface="Courier New" panose="02070309020205020404" pitchFamily="49" charset="0"/>
+              </a:rPr>
+              <a:t>::$app-&gt;user-&gt;can() on business logic code</a:t>
+            </a:r>
+            <a:endParaRPr kumimoji="1" lang="ja-JP" altLang="en-US" dirty="0"/>
+          </a:p>
+        </p:txBody>
+      </p:sp>
+      <p:sp>
+        <p:nvSpPr>
+          <p:cNvPr id="4" name="スライド番号プレースホルダー 3">
+            <a:extLst>
+              <a:ext uri="{FF2B5EF4-FFF2-40B4-BE49-F238E27FC236}">
+                <a16:creationId xmlns:a16="http://schemas.microsoft.com/office/drawing/2014/main" id="{F34A3196-3A71-4C81-B57D-C32DB8F6FBDE}"/>
+              </a:ext>
+            </a:extLst>
+          </p:cNvPr>
+          <p:cNvSpPr>
+            <a:spLocks noGrp="1"/>
+          </p:cNvSpPr>
+          <p:nvPr>
+            <p:ph type="sldNum" sz="quarter" idx="12"/>
+          </p:nvPr>
+        </p:nvSpPr>
+        <p:spPr/>
+        <p:txBody>
+          <a:bodyPr/>
+          <a:lstStyle/>
+          <a:p>
+            <a:fld id="{F8D8928E-AA9A-4D89-BC1F-A2C05AB4BD92}" type="slidenum">
+              <a:rPr kumimoji="1" lang="ja-JP" altLang="en-US" smtClean="0"/>
+              <a:t>25</a:t>
+            </a:fld>
+            <a:endParaRPr kumimoji="1" lang="ja-JP" altLang="en-US"/>
+          </a:p>
+        </p:txBody>
+      </p:sp>
+    </p:spTree>
+    <p:extLst>
+      <p:ext uri="{BB962C8B-B14F-4D97-AF65-F5344CB8AC3E}">
+        <p14:creationId xmlns:p14="http://schemas.microsoft.com/office/powerpoint/2010/main" val="955102109"/>
+      </p:ext>
+    </p:extLst>
+  </p:cSld>
+  <p:clrMapOvr>
+    <a:masterClrMapping/>
+  </p:clrMapOvr>
+</p:sld>
+</file>
+
+<file path=ppt/slides/slide26.xml><?xml version="1.0" encoding="utf-8"?>
+<p:sld xmlns:a="http://schemas.openxmlformats.org/drawingml/2006/main" xmlns:r="http://schemas.openxmlformats.org/officeDocument/2006/relationships" xmlns:p="http://schemas.openxmlformats.org/presentationml/2006/main">
+  <p:cSld>
+    <p:spTree>
+      <p:nvGrpSpPr>
+        <p:cNvPr id="1" name=""/>
+        <p:cNvGrpSpPr/>
+        <p:nvPr/>
+      </p:nvGrpSpPr>
+      <p:grpSpPr>
+        <a:xfrm>
+          <a:off x="0" y="0"/>
+          <a:ext cx="0" cy="0"/>
+          <a:chOff x="0" y="0"/>
+          <a:chExt cx="0" cy="0"/>
+        </a:xfrm>
+      </p:grpSpPr>
+      <p:sp>
+        <p:nvSpPr>
           <p:cNvPr id="3" name="コンテンツ プレースホルダー 2">
             <a:extLst>
               <a:ext uri="{FF2B5EF4-FFF2-40B4-BE49-F238E27FC236}">
@@ -10248,7 +11159,7 @@
           <a:p>
             <a:fld id="{F8D8928E-AA9A-4D89-BC1F-A2C05AB4BD92}" type="slidenum">
               <a:rPr kumimoji="1" lang="ja-JP" altLang="en-US" smtClean="0"/>
-              <a:t>22</a:t>
+              <a:t>26</a:t>
             </a:fld>
             <a:endParaRPr kumimoji="1" lang="ja-JP" altLang="en-US"/>
           </a:p>

</xml_diff>

<commit_message>
Add demo screen into Yii2RbacTutorial.pptx
</commit_message>
<xml_diff>
--- a/docs/tutorial/Yii2RbacTutorial.pptx
+++ b/docs/tutorial/Yii2RbacTutorial.pptx
@@ -5,7 +5,7 @@
     <p:sldMasterId id="2147483648" r:id="rId1"/>
   </p:sldMasterIdLst>
   <p:notesMasterIdLst>
-    <p:notesMasterId r:id="rId28"/>
+    <p:notesMasterId r:id="rId29"/>
   </p:notesMasterIdLst>
   <p:sldIdLst>
     <p:sldId id="256" r:id="rId2"/>
@@ -31,9 +31,10 @@
     <p:sldId id="280" r:id="rId22"/>
     <p:sldId id="277" r:id="rId23"/>
     <p:sldId id="281" r:id="rId24"/>
-    <p:sldId id="282" r:id="rId25"/>
-    <p:sldId id="278" r:id="rId26"/>
-    <p:sldId id="279" r:id="rId27"/>
+    <p:sldId id="284" r:id="rId25"/>
+    <p:sldId id="282" r:id="rId26"/>
+    <p:sldId id="278" r:id="rId27"/>
+    <p:sldId id="279" r:id="rId28"/>
   </p:sldIdLst>
   <p:sldSz cx="12192000" cy="6858000"/>
   <p:notesSz cx="6858000" cy="9144000"/>
@@ -10032,31 +10033,6 @@
       </p:sp>
       <p:sp>
         <p:nvSpPr>
-          <p:cNvPr id="3" name="コンテンツ プレースホルダー 2">
-            <a:extLst>
-              <a:ext uri="{FF2B5EF4-FFF2-40B4-BE49-F238E27FC236}">
-                <a16:creationId xmlns:a16="http://schemas.microsoft.com/office/drawing/2014/main" id="{B20697CD-FB8F-43EB-B034-5C20A6D316BF}"/>
-              </a:ext>
-            </a:extLst>
-          </p:cNvPr>
-          <p:cNvSpPr>
-            <a:spLocks noGrp="1"/>
-          </p:cNvSpPr>
-          <p:nvPr>
-            <p:ph idx="1"/>
-          </p:nvPr>
-        </p:nvSpPr>
-        <p:spPr/>
-        <p:txBody>
-          <a:bodyPr/>
-          <a:lstStyle/>
-          <a:p>
-            <a:endParaRPr kumimoji="1" lang="ja-JP" altLang="en-US"/>
-          </a:p>
-        </p:txBody>
-      </p:sp>
-      <p:sp>
-        <p:nvSpPr>
           <p:cNvPr id="4" name="スライド番号プレースホルダー 3">
             <a:extLst>
               <a:ext uri="{FF2B5EF4-FFF2-40B4-BE49-F238E27FC236}">
@@ -10081,6 +10057,174 @@
               <a:t>21</a:t>
             </a:fld>
             <a:endParaRPr kumimoji="1" lang="ja-JP" altLang="en-US"/>
+          </a:p>
+        </p:txBody>
+      </p:sp>
+      <p:pic>
+        <p:nvPicPr>
+          <p:cNvPr id="5" name="図 4">
+            <a:extLst>
+              <a:ext uri="{FF2B5EF4-FFF2-40B4-BE49-F238E27FC236}">
+                <a16:creationId xmlns:a16="http://schemas.microsoft.com/office/drawing/2014/main" id="{3D4CF631-B314-4B6A-A70F-44C96F6E3E76}"/>
+              </a:ext>
+            </a:extLst>
+          </p:cNvPr>
+          <p:cNvPicPr>
+            <a:picLocks noChangeAspect="1"/>
+          </p:cNvPicPr>
+          <p:nvPr/>
+        </p:nvPicPr>
+        <p:blipFill>
+          <a:blip r:embed="rId2"/>
+          <a:stretch>
+            <a:fillRect/>
+          </a:stretch>
+        </p:blipFill>
+        <p:spPr>
+          <a:xfrm>
+            <a:off x="838199" y="1690687"/>
+            <a:ext cx="5271129" cy="3561077"/>
+          </a:xfrm>
+          <a:prstGeom prst="rect">
+            <a:avLst/>
+          </a:prstGeom>
+        </p:spPr>
+      </p:pic>
+      <p:pic>
+        <p:nvPicPr>
+          <p:cNvPr id="6" name="図 5">
+            <a:extLst>
+              <a:ext uri="{FF2B5EF4-FFF2-40B4-BE49-F238E27FC236}">
+                <a16:creationId xmlns:a16="http://schemas.microsoft.com/office/drawing/2014/main" id="{F5C8C2CC-A721-4113-AE1E-8C3B0265FDBB}"/>
+              </a:ext>
+            </a:extLst>
+          </p:cNvPr>
+          <p:cNvPicPr>
+            <a:picLocks noChangeAspect="1"/>
+          </p:cNvPicPr>
+          <p:nvPr/>
+        </p:nvPicPr>
+        <p:blipFill>
+          <a:blip r:embed="rId3"/>
+          <a:stretch>
+            <a:fillRect/>
+          </a:stretch>
+        </p:blipFill>
+        <p:spPr>
+          <a:xfrm>
+            <a:off x="6232570" y="1690689"/>
+            <a:ext cx="5280219" cy="3561078"/>
+          </a:xfrm>
+          <a:prstGeom prst="rect">
+            <a:avLst/>
+          </a:prstGeom>
+        </p:spPr>
+      </p:pic>
+      <p:sp>
+        <p:nvSpPr>
+          <p:cNvPr id="7" name="テキスト ボックス 6">
+            <a:extLst>
+              <a:ext uri="{FF2B5EF4-FFF2-40B4-BE49-F238E27FC236}">
+                <a16:creationId xmlns:a16="http://schemas.microsoft.com/office/drawing/2014/main" id="{F546D321-5FEE-4C91-AAB6-E447FF2DC8B1}"/>
+              </a:ext>
+            </a:extLst>
+          </p:cNvPr>
+          <p:cNvSpPr txBox="1"/>
+          <p:nvPr/>
+        </p:nvSpPr>
+        <p:spPr>
+          <a:xfrm>
+            <a:off x="6232570" y="5615185"/>
+            <a:ext cx="4189724" cy="369332"/>
+          </a:xfrm>
+          <a:prstGeom prst="rect">
+            <a:avLst/>
+          </a:prstGeom>
+          <a:solidFill>
+            <a:srgbClr val="FFFF00"/>
+          </a:solidFill>
+        </p:spPr>
+        <p:txBody>
+          <a:bodyPr wrap="square" rtlCol="0">
+            <a:spAutoFit/>
+          </a:bodyPr>
+          <a:lstStyle/>
+          <a:p>
+            <a:r>
+              <a:rPr kumimoji="1" lang="en-US" altLang="ja-JP" dirty="0" err="1">
+                <a:solidFill>
+                  <a:srgbClr val="FF0000"/>
+                </a:solidFill>
+              </a:rPr>
+              <a:t>user2</a:t>
+            </a:r>
+            <a:r>
+              <a:rPr kumimoji="1" lang="en-US" altLang="ja-JP" dirty="0">
+                <a:solidFill>
+                  <a:srgbClr val="FF0000"/>
+                </a:solidFill>
+              </a:rPr>
+              <a:t> cannot edit/delete other user’s post.</a:t>
+            </a:r>
+            <a:endParaRPr kumimoji="1" lang="ja-JP" altLang="en-US" dirty="0">
+              <a:solidFill>
+                <a:srgbClr val="FF0000"/>
+              </a:solidFill>
+            </a:endParaRPr>
+          </a:p>
+        </p:txBody>
+      </p:sp>
+      <p:sp>
+        <p:nvSpPr>
+          <p:cNvPr id="8" name="テキスト ボックス 7">
+            <a:extLst>
+              <a:ext uri="{FF2B5EF4-FFF2-40B4-BE49-F238E27FC236}">
+                <a16:creationId xmlns:a16="http://schemas.microsoft.com/office/drawing/2014/main" id="{47FA128E-1F63-452D-B524-C83A225334B7}"/>
+              </a:ext>
+            </a:extLst>
+          </p:cNvPr>
+          <p:cNvSpPr txBox="1"/>
+          <p:nvPr/>
+        </p:nvSpPr>
+        <p:spPr>
+          <a:xfrm>
+            <a:off x="838199" y="5615185"/>
+            <a:ext cx="4189724" cy="369332"/>
+          </a:xfrm>
+          <a:prstGeom prst="rect">
+            <a:avLst/>
+          </a:prstGeom>
+          <a:solidFill>
+            <a:srgbClr val="FFFF00"/>
+          </a:solidFill>
+        </p:spPr>
+        <p:txBody>
+          <a:bodyPr wrap="square" rtlCol="0">
+            <a:spAutoFit/>
+          </a:bodyPr>
+          <a:lstStyle/>
+          <a:p>
+            <a:r>
+              <a:rPr kumimoji="1" lang="en-US" altLang="ja-JP" dirty="0" err="1">
+                <a:solidFill>
+                  <a:srgbClr val="FF0000"/>
+                </a:solidFill>
+              </a:rPr>
+              <a:t>user1</a:t>
+            </a:r>
+            <a:r>
+              <a:rPr kumimoji="1" lang="en-US" altLang="ja-JP" dirty="0">
+                <a:solidFill>
+                  <a:srgbClr val="FF0000"/>
+                </a:solidFill>
+              </a:rPr>
+              <a:t> can edit/delete any user’s post.</a:t>
+            </a:r>
+            <a:endParaRPr kumimoji="1" lang="ja-JP" altLang="en-US" dirty="0">
+              <a:solidFill>
+                <a:srgbClr val="FF0000"/>
+              </a:solidFill>
+            </a:endParaRPr>
           </a:p>
         </p:txBody>
       </p:sp>
@@ -10137,7 +10281,7 @@
           <a:p>
             <a:r>
               <a:rPr lang="en-US" altLang="ja-JP" dirty="0"/>
-              <a:t>Access control applied on UI</a:t>
+              <a:t>Access control applied on UI (1)</a:t>
             </a:r>
           </a:p>
         </p:txBody>
@@ -10157,7 +10301,7 @@
         <p:spPr>
           <a:xfrm>
             <a:off x="838199" y="1690688"/>
-            <a:ext cx="10515599" cy="4339650"/>
+            <a:ext cx="10515599" cy="2308324"/>
           </a:xfrm>
           <a:prstGeom prst="rect">
             <a:avLst/>
@@ -10400,212 +10544,10 @@
             </a:r>
           </a:p>
           <a:p>
-            <a:endParaRPr kumimoji="1" lang="en-US" altLang="ja-JP" sz="1200" dirty="0">
+            <a:endParaRPr lang="en-US" altLang="ja-JP" sz="1200" dirty="0">
               <a:latin typeface="Courier New" panose="02070309020205020404" pitchFamily="49" charset="0"/>
               <a:cs typeface="Courier New" panose="02070309020205020404" pitchFamily="49" charset="0"/>
             </a:endParaRPr>
-          </a:p>
-          <a:p>
-            <a:r>
-              <a:rPr kumimoji="1" lang="en-US" altLang="ja-JP" sz="1200" b="1" dirty="0">
-                <a:latin typeface="Courier New" panose="02070309020205020404" pitchFamily="49" charset="0"/>
-                <a:cs typeface="Courier New" panose="02070309020205020404" pitchFamily="49" charset="0"/>
-              </a:rPr>
-              <a:t>To control displaying of buttons on Post view page</a:t>
-            </a:r>
-          </a:p>
-          <a:p>
-            <a:r>
-              <a:rPr lang="en-US" altLang="ja-JP" sz="1200" dirty="0">
-                <a:latin typeface="Courier New" panose="02070309020205020404" pitchFamily="49" charset="0"/>
-                <a:cs typeface="Courier New" panose="02070309020205020404" pitchFamily="49" charset="0"/>
-              </a:rPr>
-              <a:t>&lt;?php if (</a:t>
-            </a:r>
-            <a:r>
-              <a:rPr lang="en-US" altLang="ja-JP" sz="1200" b="1" dirty="0" err="1">
-                <a:solidFill>
-                  <a:srgbClr val="FF0000"/>
-                </a:solidFill>
-                <a:latin typeface="Courier New" panose="02070309020205020404" pitchFamily="49" charset="0"/>
-                <a:cs typeface="Courier New" panose="02070309020205020404" pitchFamily="49" charset="0"/>
-              </a:rPr>
-              <a:t>Yii</a:t>
-            </a:r>
-            <a:r>
-              <a:rPr lang="en-US" altLang="ja-JP" sz="1200" b="1" dirty="0">
-                <a:solidFill>
-                  <a:srgbClr val="FF0000"/>
-                </a:solidFill>
-                <a:latin typeface="Courier New" panose="02070309020205020404" pitchFamily="49" charset="0"/>
-                <a:cs typeface="Courier New" panose="02070309020205020404" pitchFamily="49" charset="0"/>
-              </a:rPr>
-              <a:t>::$app-&gt;user-&gt;can('</a:t>
-            </a:r>
-            <a:r>
-              <a:rPr lang="en-US" altLang="ja-JP" sz="1200" b="1" dirty="0" err="1">
-                <a:solidFill>
-                  <a:srgbClr val="FF0000"/>
-                </a:solidFill>
-                <a:latin typeface="Courier New" panose="02070309020205020404" pitchFamily="49" charset="0"/>
-                <a:cs typeface="Courier New" panose="02070309020205020404" pitchFamily="49" charset="0"/>
-              </a:rPr>
-              <a:t>updatePost</a:t>
-            </a:r>
-            <a:r>
-              <a:rPr lang="en-US" altLang="ja-JP" sz="1200" b="1" dirty="0">
-                <a:solidFill>
-                  <a:srgbClr val="FF0000"/>
-                </a:solidFill>
-                <a:latin typeface="Courier New" panose="02070309020205020404" pitchFamily="49" charset="0"/>
-                <a:cs typeface="Courier New" panose="02070309020205020404" pitchFamily="49" charset="0"/>
-              </a:rPr>
-              <a:t>')) </a:t>
-            </a:r>
-            <a:r>
-              <a:rPr lang="en-US" altLang="ja-JP" sz="1200" dirty="0">
-                <a:latin typeface="Courier New" panose="02070309020205020404" pitchFamily="49" charset="0"/>
-                <a:cs typeface="Courier New" panose="02070309020205020404" pitchFamily="49" charset="0"/>
-              </a:rPr>
-              <a:t>{ ?&gt;</a:t>
-            </a:r>
-          </a:p>
-          <a:p>
-            <a:r>
-              <a:rPr lang="en-US" altLang="ja-JP" sz="1200" dirty="0">
-                <a:latin typeface="Courier New" panose="02070309020205020404" pitchFamily="49" charset="0"/>
-                <a:cs typeface="Courier New" panose="02070309020205020404" pitchFamily="49" charset="0"/>
-              </a:rPr>
-              <a:t>    &lt;?= Html::a('Update', ['update', 'id' =&gt; $model-&gt;id], ['class' =&gt; '</a:t>
-            </a:r>
-            <a:r>
-              <a:rPr lang="en-US" altLang="ja-JP" sz="1200" dirty="0" err="1">
-                <a:latin typeface="Courier New" panose="02070309020205020404" pitchFamily="49" charset="0"/>
-                <a:cs typeface="Courier New" panose="02070309020205020404" pitchFamily="49" charset="0"/>
-              </a:rPr>
-              <a:t>btn</a:t>
-            </a:r>
-            <a:r>
-              <a:rPr lang="en-US" altLang="ja-JP" sz="1200" dirty="0">
-                <a:latin typeface="Courier New" panose="02070309020205020404" pitchFamily="49" charset="0"/>
-                <a:cs typeface="Courier New" panose="02070309020205020404" pitchFamily="49" charset="0"/>
-              </a:rPr>
-              <a:t> </a:t>
-            </a:r>
-            <a:r>
-              <a:rPr lang="en-US" altLang="ja-JP" sz="1200" dirty="0" err="1">
-                <a:latin typeface="Courier New" panose="02070309020205020404" pitchFamily="49" charset="0"/>
-                <a:cs typeface="Courier New" panose="02070309020205020404" pitchFamily="49" charset="0"/>
-              </a:rPr>
-              <a:t>btn</a:t>
-            </a:r>
-            <a:r>
-              <a:rPr lang="en-US" altLang="ja-JP" sz="1200" dirty="0">
-                <a:latin typeface="Courier New" panose="02070309020205020404" pitchFamily="49" charset="0"/>
-                <a:cs typeface="Courier New" panose="02070309020205020404" pitchFamily="49" charset="0"/>
-              </a:rPr>
-              <a:t>-primary']) ?&gt;</a:t>
-            </a:r>
-          </a:p>
-          <a:p>
-            <a:r>
-              <a:rPr lang="en-US" altLang="ja-JP" sz="1200" dirty="0">
-                <a:latin typeface="Courier New" panose="02070309020205020404" pitchFamily="49" charset="0"/>
-                <a:cs typeface="Courier New" panose="02070309020205020404" pitchFamily="49" charset="0"/>
-              </a:rPr>
-              <a:t>    &lt;?= Html::a('Delete', ['delete', 'id' =&gt; $model-&gt;id], [</a:t>
-            </a:r>
-          </a:p>
-          <a:p>
-            <a:r>
-              <a:rPr lang="en-US" altLang="ja-JP" sz="1200" dirty="0">
-                <a:latin typeface="Courier New" panose="02070309020205020404" pitchFamily="49" charset="0"/>
-                <a:cs typeface="Courier New" panose="02070309020205020404" pitchFamily="49" charset="0"/>
-              </a:rPr>
-              <a:t>        'class' =&gt; '</a:t>
-            </a:r>
-            <a:r>
-              <a:rPr lang="en-US" altLang="ja-JP" sz="1200" dirty="0" err="1">
-                <a:latin typeface="Courier New" panose="02070309020205020404" pitchFamily="49" charset="0"/>
-                <a:cs typeface="Courier New" panose="02070309020205020404" pitchFamily="49" charset="0"/>
-              </a:rPr>
-              <a:t>btn</a:t>
-            </a:r>
-            <a:r>
-              <a:rPr lang="en-US" altLang="ja-JP" sz="1200" dirty="0">
-                <a:latin typeface="Courier New" panose="02070309020205020404" pitchFamily="49" charset="0"/>
-                <a:cs typeface="Courier New" panose="02070309020205020404" pitchFamily="49" charset="0"/>
-              </a:rPr>
-              <a:t> </a:t>
-            </a:r>
-            <a:r>
-              <a:rPr lang="en-US" altLang="ja-JP" sz="1200" dirty="0" err="1">
-                <a:latin typeface="Courier New" panose="02070309020205020404" pitchFamily="49" charset="0"/>
-                <a:cs typeface="Courier New" panose="02070309020205020404" pitchFamily="49" charset="0"/>
-              </a:rPr>
-              <a:t>btn</a:t>
-            </a:r>
-            <a:r>
-              <a:rPr lang="en-US" altLang="ja-JP" sz="1200" dirty="0">
-                <a:latin typeface="Courier New" panose="02070309020205020404" pitchFamily="49" charset="0"/>
-                <a:cs typeface="Courier New" panose="02070309020205020404" pitchFamily="49" charset="0"/>
-              </a:rPr>
-              <a:t>-danger',</a:t>
-            </a:r>
-          </a:p>
-          <a:p>
-            <a:r>
-              <a:rPr lang="en-US" altLang="ja-JP" sz="1200" dirty="0">
-                <a:latin typeface="Courier New" panose="02070309020205020404" pitchFamily="49" charset="0"/>
-                <a:cs typeface="Courier New" panose="02070309020205020404" pitchFamily="49" charset="0"/>
-              </a:rPr>
-              <a:t>        'data' =&gt; [</a:t>
-            </a:r>
-          </a:p>
-          <a:p>
-            <a:r>
-              <a:rPr lang="en-US" altLang="ja-JP" sz="1200" dirty="0">
-                <a:latin typeface="Courier New" panose="02070309020205020404" pitchFamily="49" charset="0"/>
-                <a:cs typeface="Courier New" panose="02070309020205020404" pitchFamily="49" charset="0"/>
-              </a:rPr>
-              <a:t>            'confirm' =&gt; 'Are you sure you want to delete this item?',</a:t>
-            </a:r>
-          </a:p>
-          <a:p>
-            <a:r>
-              <a:rPr lang="en-US" altLang="ja-JP" sz="1200" dirty="0">
-                <a:latin typeface="Courier New" panose="02070309020205020404" pitchFamily="49" charset="0"/>
-                <a:cs typeface="Courier New" panose="02070309020205020404" pitchFamily="49" charset="0"/>
-              </a:rPr>
-              <a:t>            'method' =&gt; 'post',</a:t>
-            </a:r>
-          </a:p>
-          <a:p>
-            <a:r>
-              <a:rPr lang="en-US" altLang="ja-JP" sz="1200" dirty="0">
-                <a:latin typeface="Courier New" panose="02070309020205020404" pitchFamily="49" charset="0"/>
-                <a:cs typeface="Courier New" panose="02070309020205020404" pitchFamily="49" charset="0"/>
-              </a:rPr>
-              <a:t>        ],</a:t>
-            </a:r>
-          </a:p>
-          <a:p>
-            <a:r>
-              <a:rPr lang="en-US" altLang="ja-JP" sz="1200" dirty="0">
-                <a:latin typeface="Courier New" panose="02070309020205020404" pitchFamily="49" charset="0"/>
-                <a:cs typeface="Courier New" panose="02070309020205020404" pitchFamily="49" charset="0"/>
-              </a:rPr>
-              <a:t>    ]) ?&gt;</a:t>
-            </a:r>
-          </a:p>
-          <a:p>
-            <a:r>
-              <a:rPr lang="en-US" altLang="ja-JP" sz="1200" dirty="0">
-                <a:latin typeface="Courier New" panose="02070309020205020404" pitchFamily="49" charset="0"/>
-                <a:cs typeface="Courier New" panose="02070309020205020404" pitchFamily="49" charset="0"/>
-              </a:rPr>
-              <a:t>&lt;?php } ?&gt;</a:t>
-            </a:r>
           </a:p>
         </p:txBody>
       </p:sp>
@@ -10669,44 +10611,6 @@
             <a:r>
               <a:rPr kumimoji="1" lang="en-US" altLang="ja-JP" dirty="0">
                 <a:hlinkClick r:id="rId2"/>
-              </a:rPr>
-              <a:t>Source Code</a:t>
-            </a:r>
-            <a:endParaRPr kumimoji="1" lang="ja-JP" altLang="en-US" dirty="0"/>
-          </a:p>
-        </p:txBody>
-      </p:sp>
-      <p:sp>
-        <p:nvSpPr>
-          <p:cNvPr id="6" name="テキスト ボックス 5">
-            <a:extLst>
-              <a:ext uri="{FF2B5EF4-FFF2-40B4-BE49-F238E27FC236}">
-                <a16:creationId xmlns:a16="http://schemas.microsoft.com/office/drawing/2014/main" id="{D2C721D5-B564-4DD6-98BE-4FB6EF42A782}"/>
-              </a:ext>
-            </a:extLst>
-          </p:cNvPr>
-          <p:cNvSpPr txBox="1"/>
-          <p:nvPr/>
-        </p:nvSpPr>
-        <p:spPr>
-          <a:xfrm>
-            <a:off x="8318377" y="3864751"/>
-            <a:ext cx="1464815" cy="369332"/>
-          </a:xfrm>
-          <a:prstGeom prst="rect">
-            <a:avLst/>
-          </a:prstGeom>
-          <a:noFill/>
-        </p:spPr>
-        <p:txBody>
-          <a:bodyPr wrap="square" rtlCol="0">
-            <a:spAutoFit/>
-          </a:bodyPr>
-          <a:lstStyle/>
-          <a:p>
-            <a:r>
-              <a:rPr kumimoji="1" lang="en-US" altLang="ja-JP" dirty="0">
-                <a:hlinkClick r:id="rId3"/>
               </a:rPr>
               <a:t>Source Code</a:t>
             </a:r>
@@ -10744,6 +10648,36 @@
           <a:chExt cx="0" cy="0"/>
         </a:xfrm>
       </p:grpSpPr>
+      <p:pic>
+        <p:nvPicPr>
+          <p:cNvPr id="8" name="図 7">
+            <a:extLst>
+              <a:ext uri="{FF2B5EF4-FFF2-40B4-BE49-F238E27FC236}">
+                <a16:creationId xmlns:a16="http://schemas.microsoft.com/office/drawing/2014/main" id="{2B460039-62D1-400B-BE04-C3DC70B4399A}"/>
+              </a:ext>
+            </a:extLst>
+          </p:cNvPr>
+          <p:cNvPicPr>
+            <a:picLocks noChangeAspect="1"/>
+          </p:cNvPicPr>
+          <p:nvPr/>
+        </p:nvPicPr>
+        <p:blipFill>
+          <a:blip r:embed="rId2"/>
+          <a:stretch>
+            <a:fillRect/>
+          </a:stretch>
+        </p:blipFill>
+        <p:spPr>
+          <a:xfrm>
+            <a:off x="838199" y="1690688"/>
+            <a:ext cx="5065989" cy="3422488"/>
+          </a:xfrm>
+          <a:prstGeom prst="rect">
+            <a:avLst/>
+          </a:prstGeom>
+        </p:spPr>
+      </p:pic>
       <p:sp>
         <p:nvSpPr>
           <p:cNvPr id="2" name="タイトル 1">
@@ -10775,31 +10709,6 @@
       </p:sp>
       <p:sp>
         <p:nvSpPr>
-          <p:cNvPr id="3" name="コンテンツ プレースホルダー 2">
-            <a:extLst>
-              <a:ext uri="{FF2B5EF4-FFF2-40B4-BE49-F238E27FC236}">
-                <a16:creationId xmlns:a16="http://schemas.microsoft.com/office/drawing/2014/main" id="{C1DD51D2-429F-4457-836A-BECE2F9D0521}"/>
-              </a:ext>
-            </a:extLst>
-          </p:cNvPr>
-          <p:cNvSpPr>
-            <a:spLocks noGrp="1"/>
-          </p:cNvSpPr>
-          <p:nvPr>
-            <p:ph idx="1"/>
-          </p:nvPr>
-        </p:nvSpPr>
-        <p:spPr/>
-        <p:txBody>
-          <a:bodyPr/>
-          <a:lstStyle/>
-          <a:p>
-            <a:endParaRPr kumimoji="1" lang="ja-JP" altLang="en-US"/>
-          </a:p>
-        </p:txBody>
-      </p:sp>
-      <p:sp>
-        <p:nvSpPr>
           <p:cNvPr id="4" name="スライド番号プレースホルダー 3">
             <a:extLst>
               <a:ext uri="{FF2B5EF4-FFF2-40B4-BE49-F238E27FC236}">
@@ -10824,6 +10733,196 @@
               <a:t>23</a:t>
             </a:fld>
             <a:endParaRPr kumimoji="1" lang="ja-JP" altLang="en-US"/>
+          </a:p>
+        </p:txBody>
+      </p:sp>
+      <p:sp>
+        <p:nvSpPr>
+          <p:cNvPr id="7" name="正方形/長方形 6">
+            <a:extLst>
+              <a:ext uri="{FF2B5EF4-FFF2-40B4-BE49-F238E27FC236}">
+                <a16:creationId xmlns:a16="http://schemas.microsoft.com/office/drawing/2014/main" id="{A08B1524-62F3-42CD-AC40-CADCC6B80763}"/>
+              </a:ext>
+            </a:extLst>
+          </p:cNvPr>
+          <p:cNvSpPr/>
+          <p:nvPr/>
+        </p:nvSpPr>
+        <p:spPr>
+          <a:xfrm>
+            <a:off x="4412563" y="2388908"/>
+            <a:ext cx="458015" cy="270316"/>
+          </a:xfrm>
+          <a:prstGeom prst="rect">
+            <a:avLst/>
+          </a:prstGeom>
+          <a:noFill/>
+          <a:ln w="38100">
+            <a:solidFill>
+              <a:srgbClr val="FF0000"/>
+            </a:solidFill>
+          </a:ln>
+        </p:spPr>
+        <p:style>
+          <a:lnRef idx="2">
+            <a:schemeClr val="accent1">
+              <a:shade val="50000"/>
+            </a:schemeClr>
+          </a:lnRef>
+          <a:fillRef idx="1">
+            <a:schemeClr val="accent1"/>
+          </a:fillRef>
+          <a:effectRef idx="0">
+            <a:schemeClr val="accent1"/>
+          </a:effectRef>
+          <a:fontRef idx="minor">
+            <a:schemeClr val="lt1"/>
+          </a:fontRef>
+        </p:style>
+        <p:txBody>
+          <a:bodyPr rtlCol="0" anchor="ctr"/>
+          <a:lstStyle/>
+          <a:p>
+            <a:pPr algn="ctr"/>
+            <a:endParaRPr kumimoji="1" lang="ja-JP" altLang="en-US"/>
+          </a:p>
+        </p:txBody>
+      </p:sp>
+      <p:pic>
+        <p:nvPicPr>
+          <p:cNvPr id="9" name="図 8">
+            <a:extLst>
+              <a:ext uri="{FF2B5EF4-FFF2-40B4-BE49-F238E27FC236}">
+                <a16:creationId xmlns:a16="http://schemas.microsoft.com/office/drawing/2014/main" id="{D1096306-F8CF-4AD0-9422-A87E7F05C2D2}"/>
+              </a:ext>
+            </a:extLst>
+          </p:cNvPr>
+          <p:cNvPicPr>
+            <a:picLocks noChangeAspect="1"/>
+          </p:cNvPicPr>
+          <p:nvPr/>
+        </p:nvPicPr>
+        <p:blipFill>
+          <a:blip r:embed="rId3"/>
+          <a:stretch>
+            <a:fillRect/>
+          </a:stretch>
+        </p:blipFill>
+        <p:spPr>
+          <a:xfrm>
+            <a:off x="6287812" y="1696396"/>
+            <a:ext cx="5065989" cy="3416598"/>
+          </a:xfrm>
+          <a:prstGeom prst="rect">
+            <a:avLst/>
+          </a:prstGeom>
+        </p:spPr>
+      </p:pic>
+      <p:sp>
+        <p:nvSpPr>
+          <p:cNvPr id="10" name="テキスト ボックス 9">
+            <a:extLst>
+              <a:ext uri="{FF2B5EF4-FFF2-40B4-BE49-F238E27FC236}">
+                <a16:creationId xmlns:a16="http://schemas.microsoft.com/office/drawing/2014/main" id="{946791BA-47C9-45FB-AF59-70C18B12338B}"/>
+              </a:ext>
+            </a:extLst>
+          </p:cNvPr>
+          <p:cNvSpPr txBox="1"/>
+          <p:nvPr/>
+        </p:nvSpPr>
+        <p:spPr>
+          <a:xfrm>
+            <a:off x="6232570" y="5615185"/>
+            <a:ext cx="5121230" cy="369332"/>
+          </a:xfrm>
+          <a:prstGeom prst="rect">
+            <a:avLst/>
+          </a:prstGeom>
+          <a:solidFill>
+            <a:srgbClr val="FFFF00"/>
+          </a:solidFill>
+        </p:spPr>
+        <p:txBody>
+          <a:bodyPr wrap="square" rtlCol="0">
+            <a:spAutoFit/>
+          </a:bodyPr>
+          <a:lstStyle/>
+          <a:p>
+            <a:r>
+              <a:rPr kumimoji="1" lang="en-US" altLang="ja-JP" dirty="0" err="1">
+                <a:solidFill>
+                  <a:srgbClr val="FF0000"/>
+                </a:solidFill>
+              </a:rPr>
+              <a:t>user2</a:t>
+            </a:r>
+            <a:r>
+              <a:rPr kumimoji="1" lang="en-US" altLang="ja-JP" dirty="0">
+                <a:solidFill>
+                  <a:srgbClr val="FF0000"/>
+                </a:solidFill>
+              </a:rPr>
+              <a:t> can’t access to user management from menu</a:t>
+            </a:r>
+            <a:endParaRPr kumimoji="1" lang="ja-JP" altLang="en-US" dirty="0">
+              <a:solidFill>
+                <a:srgbClr val="FF0000"/>
+              </a:solidFill>
+            </a:endParaRPr>
+          </a:p>
+        </p:txBody>
+      </p:sp>
+      <p:sp>
+        <p:nvSpPr>
+          <p:cNvPr id="11" name="テキスト ボックス 10">
+            <a:extLst>
+              <a:ext uri="{FF2B5EF4-FFF2-40B4-BE49-F238E27FC236}">
+                <a16:creationId xmlns:a16="http://schemas.microsoft.com/office/drawing/2014/main" id="{922B4519-09E0-4C87-ABE0-9BEF5C869EAB}"/>
+              </a:ext>
+            </a:extLst>
+          </p:cNvPr>
+          <p:cNvSpPr txBox="1"/>
+          <p:nvPr/>
+        </p:nvSpPr>
+        <p:spPr>
+          <a:xfrm>
+            <a:off x="838198" y="5615185"/>
+            <a:ext cx="5065989" cy="369332"/>
+          </a:xfrm>
+          <a:prstGeom prst="rect">
+            <a:avLst/>
+          </a:prstGeom>
+          <a:solidFill>
+            <a:srgbClr val="FFFF00"/>
+          </a:solidFill>
+        </p:spPr>
+        <p:txBody>
+          <a:bodyPr wrap="square" rtlCol="0">
+            <a:spAutoFit/>
+          </a:bodyPr>
+          <a:lstStyle/>
+          <a:p>
+            <a:r>
+              <a:rPr kumimoji="1" lang="en-US" altLang="ja-JP" dirty="0" err="1">
+                <a:solidFill>
+                  <a:srgbClr val="FF0000"/>
+                </a:solidFill>
+              </a:rPr>
+              <a:t>user1</a:t>
+            </a:r>
+            <a:r>
+              <a:rPr kumimoji="1" lang="en-US" altLang="ja-JP" dirty="0">
+                <a:solidFill>
+                  <a:srgbClr val="FF0000"/>
+                </a:solidFill>
+              </a:rPr>
+              <a:t> can access to user management from menu</a:t>
+            </a:r>
+            <a:endParaRPr kumimoji="1" lang="ja-JP" altLang="en-US" dirty="0">
+              <a:solidFill>
+                <a:srgbClr val="FF0000"/>
+              </a:solidFill>
+            </a:endParaRPr>
           </a:p>
         </p:txBody>
       </p:sp>
@@ -10862,7 +10961,7 @@
           <p:cNvPr id="2" name="タイトル 1">
             <a:extLst>
               <a:ext uri="{FF2B5EF4-FFF2-40B4-BE49-F238E27FC236}">
-                <a16:creationId xmlns:a16="http://schemas.microsoft.com/office/drawing/2014/main" id="{82021B7D-BC6C-4733-8478-5866FB894C61}"/>
+                <a16:creationId xmlns:a16="http://schemas.microsoft.com/office/drawing/2014/main" id="{4B0A1C97-E14C-4B2E-9472-BC9F92C9DA0F}"/>
               </a:ext>
             </a:extLst>
           </p:cNvPr>
@@ -10879,44 +10978,249 @@
           <a:lstStyle/>
           <a:p>
             <a:r>
-              <a:rPr kumimoji="1" lang="en-US" altLang="ja-JP" dirty="0"/>
-              <a:t>Demo of buttons</a:t>
-            </a:r>
-            <a:endParaRPr kumimoji="1" lang="ja-JP" altLang="en-US" dirty="0"/>
-          </a:p>
-        </p:txBody>
-      </p:sp>
-      <p:sp>
-        <p:nvSpPr>
-          <p:cNvPr id="3" name="コンテンツ プレースホルダー 2">
+              <a:rPr lang="en-US" altLang="ja-JP" dirty="0"/>
+              <a:t>Access control applied on UI (2)</a:t>
+            </a:r>
+          </a:p>
+        </p:txBody>
+      </p:sp>
+      <p:sp>
+        <p:nvSpPr>
+          <p:cNvPr id="4" name="テキスト ボックス 3">
             <a:extLst>
               <a:ext uri="{FF2B5EF4-FFF2-40B4-BE49-F238E27FC236}">
-                <a16:creationId xmlns:a16="http://schemas.microsoft.com/office/drawing/2014/main" id="{EEC08F7A-2025-4E37-BD2F-B70E1C49E0AE}"/>
+                <a16:creationId xmlns:a16="http://schemas.microsoft.com/office/drawing/2014/main" id="{CCE6C103-BEDA-4E8D-9377-DBA84EE64931}"/>
               </a:ext>
             </a:extLst>
           </p:cNvPr>
-          <p:cNvSpPr>
-            <a:spLocks noGrp="1"/>
-          </p:cNvSpPr>
-          <p:nvPr>
-            <p:ph idx="1"/>
-          </p:nvPr>
-        </p:nvSpPr>
-        <p:spPr/>
-        <p:txBody>
-          <a:bodyPr/>
-          <a:lstStyle/>
-          <a:p>
-            <a:endParaRPr kumimoji="1" lang="ja-JP" altLang="en-US"/>
-          </a:p>
-        </p:txBody>
-      </p:sp>
-      <p:sp>
-        <p:nvSpPr>
-          <p:cNvPr id="4" name="スライド番号プレースホルダー 3">
+          <p:cNvSpPr txBox="1"/>
+          <p:nvPr/>
+        </p:nvSpPr>
+        <p:spPr>
+          <a:xfrm>
+            <a:off x="838199" y="1690688"/>
+            <a:ext cx="10515599" cy="2123658"/>
+          </a:xfrm>
+          <a:prstGeom prst="rect">
+            <a:avLst/>
+          </a:prstGeom>
+          <a:noFill/>
+        </p:spPr>
+        <p:txBody>
+          <a:bodyPr wrap="square" rtlCol="0">
+            <a:spAutoFit/>
+          </a:bodyPr>
+          <a:lstStyle/>
+          <a:p>
+            <a:r>
+              <a:rPr kumimoji="1" lang="en-US" altLang="ja-JP" sz="1200" b="1" dirty="0">
+                <a:latin typeface="Courier New" panose="02070309020205020404" pitchFamily="49" charset="0"/>
+                <a:cs typeface="Courier New" panose="02070309020205020404" pitchFamily="49" charset="0"/>
+              </a:rPr>
+              <a:t>To control displaying of buttons on Post view page</a:t>
+            </a:r>
+          </a:p>
+          <a:p>
+            <a:r>
+              <a:rPr lang="en-US" altLang="ja-JP" sz="1200" dirty="0">
+                <a:latin typeface="Courier New" panose="02070309020205020404" pitchFamily="49" charset="0"/>
+                <a:cs typeface="Courier New" panose="02070309020205020404" pitchFamily="49" charset="0"/>
+              </a:rPr>
+              <a:t>&lt;?php if (</a:t>
+            </a:r>
+            <a:r>
+              <a:rPr lang="en-US" altLang="ja-JP" sz="1200" b="1" dirty="0" err="1">
+                <a:solidFill>
+                  <a:srgbClr val="FF0000"/>
+                </a:solidFill>
+                <a:latin typeface="Courier New" panose="02070309020205020404" pitchFamily="49" charset="0"/>
+                <a:cs typeface="Courier New" panose="02070309020205020404" pitchFamily="49" charset="0"/>
+              </a:rPr>
+              <a:t>Yii</a:t>
+            </a:r>
+            <a:r>
+              <a:rPr lang="en-US" altLang="ja-JP" sz="1200" b="1" dirty="0">
+                <a:solidFill>
+                  <a:srgbClr val="FF0000"/>
+                </a:solidFill>
+                <a:latin typeface="Courier New" panose="02070309020205020404" pitchFamily="49" charset="0"/>
+                <a:cs typeface="Courier New" panose="02070309020205020404" pitchFamily="49" charset="0"/>
+              </a:rPr>
+              <a:t>::$app-&gt;user-&gt;can('</a:t>
+            </a:r>
+            <a:r>
+              <a:rPr lang="en-US" altLang="ja-JP" sz="1200" b="1" dirty="0" err="1">
+                <a:solidFill>
+                  <a:srgbClr val="FF0000"/>
+                </a:solidFill>
+                <a:latin typeface="Courier New" panose="02070309020205020404" pitchFamily="49" charset="0"/>
+                <a:cs typeface="Courier New" panose="02070309020205020404" pitchFamily="49" charset="0"/>
+              </a:rPr>
+              <a:t>updatePost</a:t>
+            </a:r>
+            <a:r>
+              <a:rPr lang="en-US" altLang="ja-JP" sz="1200" b="1" dirty="0">
+                <a:solidFill>
+                  <a:srgbClr val="FF0000"/>
+                </a:solidFill>
+                <a:latin typeface="Courier New" panose="02070309020205020404" pitchFamily="49" charset="0"/>
+                <a:cs typeface="Courier New" panose="02070309020205020404" pitchFamily="49" charset="0"/>
+              </a:rPr>
+              <a:t>')) </a:t>
+            </a:r>
+            <a:r>
+              <a:rPr lang="en-US" altLang="ja-JP" sz="1200" dirty="0">
+                <a:latin typeface="Courier New" panose="02070309020205020404" pitchFamily="49" charset="0"/>
+                <a:cs typeface="Courier New" panose="02070309020205020404" pitchFamily="49" charset="0"/>
+              </a:rPr>
+              <a:t>{ ?&gt;</a:t>
+            </a:r>
+          </a:p>
+          <a:p>
+            <a:r>
+              <a:rPr lang="en-US" altLang="ja-JP" sz="1200" dirty="0">
+                <a:latin typeface="Courier New" panose="02070309020205020404" pitchFamily="49" charset="0"/>
+                <a:cs typeface="Courier New" panose="02070309020205020404" pitchFamily="49" charset="0"/>
+              </a:rPr>
+              <a:t>    &lt;?= Html::a('Update', ['update', 'id' =&gt; $model-&gt;id], ['class' =&gt; '</a:t>
+            </a:r>
+            <a:r>
+              <a:rPr lang="en-US" altLang="ja-JP" sz="1200" dirty="0" err="1">
+                <a:latin typeface="Courier New" panose="02070309020205020404" pitchFamily="49" charset="0"/>
+                <a:cs typeface="Courier New" panose="02070309020205020404" pitchFamily="49" charset="0"/>
+              </a:rPr>
+              <a:t>btn</a:t>
+            </a:r>
+            <a:r>
+              <a:rPr lang="en-US" altLang="ja-JP" sz="1200" dirty="0">
+                <a:latin typeface="Courier New" panose="02070309020205020404" pitchFamily="49" charset="0"/>
+                <a:cs typeface="Courier New" panose="02070309020205020404" pitchFamily="49" charset="0"/>
+              </a:rPr>
+              <a:t> </a:t>
+            </a:r>
+            <a:r>
+              <a:rPr lang="en-US" altLang="ja-JP" sz="1200" dirty="0" err="1">
+                <a:latin typeface="Courier New" panose="02070309020205020404" pitchFamily="49" charset="0"/>
+                <a:cs typeface="Courier New" panose="02070309020205020404" pitchFamily="49" charset="0"/>
+              </a:rPr>
+              <a:t>btn</a:t>
+            </a:r>
+            <a:r>
+              <a:rPr lang="en-US" altLang="ja-JP" sz="1200" dirty="0">
+                <a:latin typeface="Courier New" panose="02070309020205020404" pitchFamily="49" charset="0"/>
+                <a:cs typeface="Courier New" panose="02070309020205020404" pitchFamily="49" charset="0"/>
+              </a:rPr>
+              <a:t>-primary']) ?&gt;</a:t>
+            </a:r>
+          </a:p>
+          <a:p>
+            <a:r>
+              <a:rPr lang="en-US" altLang="ja-JP" sz="1200" dirty="0">
+                <a:latin typeface="Courier New" panose="02070309020205020404" pitchFamily="49" charset="0"/>
+                <a:cs typeface="Courier New" panose="02070309020205020404" pitchFamily="49" charset="0"/>
+              </a:rPr>
+              <a:t>    &lt;?= Html::a('Delete', ['delete', 'id' =&gt; $model-&gt;id], [</a:t>
+            </a:r>
+          </a:p>
+          <a:p>
+            <a:r>
+              <a:rPr lang="en-US" altLang="ja-JP" sz="1200" dirty="0">
+                <a:latin typeface="Courier New" panose="02070309020205020404" pitchFamily="49" charset="0"/>
+                <a:cs typeface="Courier New" panose="02070309020205020404" pitchFamily="49" charset="0"/>
+              </a:rPr>
+              <a:t>        'class' =&gt; '</a:t>
+            </a:r>
+            <a:r>
+              <a:rPr lang="en-US" altLang="ja-JP" sz="1200" dirty="0" err="1">
+                <a:latin typeface="Courier New" panose="02070309020205020404" pitchFamily="49" charset="0"/>
+                <a:cs typeface="Courier New" panose="02070309020205020404" pitchFamily="49" charset="0"/>
+              </a:rPr>
+              <a:t>btn</a:t>
+            </a:r>
+            <a:r>
+              <a:rPr lang="en-US" altLang="ja-JP" sz="1200" dirty="0">
+                <a:latin typeface="Courier New" panose="02070309020205020404" pitchFamily="49" charset="0"/>
+                <a:cs typeface="Courier New" panose="02070309020205020404" pitchFamily="49" charset="0"/>
+              </a:rPr>
+              <a:t> </a:t>
+            </a:r>
+            <a:r>
+              <a:rPr lang="en-US" altLang="ja-JP" sz="1200" dirty="0" err="1">
+                <a:latin typeface="Courier New" panose="02070309020205020404" pitchFamily="49" charset="0"/>
+                <a:cs typeface="Courier New" panose="02070309020205020404" pitchFamily="49" charset="0"/>
+              </a:rPr>
+              <a:t>btn</a:t>
+            </a:r>
+            <a:r>
+              <a:rPr lang="en-US" altLang="ja-JP" sz="1200" dirty="0">
+                <a:latin typeface="Courier New" panose="02070309020205020404" pitchFamily="49" charset="0"/>
+                <a:cs typeface="Courier New" panose="02070309020205020404" pitchFamily="49" charset="0"/>
+              </a:rPr>
+              <a:t>-danger',</a:t>
+            </a:r>
+          </a:p>
+          <a:p>
+            <a:r>
+              <a:rPr lang="en-US" altLang="ja-JP" sz="1200" dirty="0">
+                <a:latin typeface="Courier New" panose="02070309020205020404" pitchFamily="49" charset="0"/>
+                <a:cs typeface="Courier New" panose="02070309020205020404" pitchFamily="49" charset="0"/>
+              </a:rPr>
+              <a:t>        'data' =&gt; [</a:t>
+            </a:r>
+          </a:p>
+          <a:p>
+            <a:r>
+              <a:rPr lang="en-US" altLang="ja-JP" sz="1200" dirty="0">
+                <a:latin typeface="Courier New" panose="02070309020205020404" pitchFamily="49" charset="0"/>
+                <a:cs typeface="Courier New" panose="02070309020205020404" pitchFamily="49" charset="0"/>
+              </a:rPr>
+              <a:t>            'confirm' =&gt; 'Are you sure you want to delete this item?',</a:t>
+            </a:r>
+          </a:p>
+          <a:p>
+            <a:r>
+              <a:rPr lang="en-US" altLang="ja-JP" sz="1200" dirty="0">
+                <a:latin typeface="Courier New" panose="02070309020205020404" pitchFamily="49" charset="0"/>
+                <a:cs typeface="Courier New" panose="02070309020205020404" pitchFamily="49" charset="0"/>
+              </a:rPr>
+              <a:t>            'method' =&gt; 'post',</a:t>
+            </a:r>
+          </a:p>
+          <a:p>
+            <a:r>
+              <a:rPr lang="en-US" altLang="ja-JP" sz="1200" dirty="0">
+                <a:latin typeface="Courier New" panose="02070309020205020404" pitchFamily="49" charset="0"/>
+                <a:cs typeface="Courier New" panose="02070309020205020404" pitchFamily="49" charset="0"/>
+              </a:rPr>
+              <a:t>        ],</a:t>
+            </a:r>
+          </a:p>
+          <a:p>
+            <a:r>
+              <a:rPr lang="en-US" altLang="ja-JP" sz="1200" dirty="0">
+                <a:latin typeface="Courier New" panose="02070309020205020404" pitchFamily="49" charset="0"/>
+                <a:cs typeface="Courier New" panose="02070309020205020404" pitchFamily="49" charset="0"/>
+              </a:rPr>
+              <a:t>    ]) ?&gt;</a:t>
+            </a:r>
+          </a:p>
+          <a:p>
+            <a:r>
+              <a:rPr lang="en-US" altLang="ja-JP" sz="1200" dirty="0">
+                <a:latin typeface="Courier New" panose="02070309020205020404" pitchFamily="49" charset="0"/>
+                <a:cs typeface="Courier New" panose="02070309020205020404" pitchFamily="49" charset="0"/>
+              </a:rPr>
+              <a:t>&lt;?php } ?&gt;</a:t>
+            </a:r>
+          </a:p>
+        </p:txBody>
+      </p:sp>
+      <p:sp>
+        <p:nvSpPr>
+          <p:cNvPr id="3" name="スライド番号プレースホルダー 2">
             <a:extLst>
               <a:ext uri="{FF2B5EF4-FFF2-40B4-BE49-F238E27FC236}">
-                <a16:creationId xmlns:a16="http://schemas.microsoft.com/office/drawing/2014/main" id="{16D6FB86-6015-414E-86B8-9A7DCD3725C2}"/>
+                <a16:creationId xmlns:a16="http://schemas.microsoft.com/office/drawing/2014/main" id="{15E8DE9D-F2BC-45AD-A222-6F66DA19F34E}"/>
               </a:ext>
             </a:extLst>
           </p:cNvPr>
@@ -10940,10 +11244,48 @@
           </a:p>
         </p:txBody>
       </p:sp>
+      <p:sp>
+        <p:nvSpPr>
+          <p:cNvPr id="6" name="テキスト ボックス 5">
+            <a:extLst>
+              <a:ext uri="{FF2B5EF4-FFF2-40B4-BE49-F238E27FC236}">
+                <a16:creationId xmlns:a16="http://schemas.microsoft.com/office/drawing/2014/main" id="{D2C721D5-B564-4DD6-98BE-4FB6EF42A782}"/>
+              </a:ext>
+            </a:extLst>
+          </p:cNvPr>
+          <p:cNvSpPr txBox="1"/>
+          <p:nvPr/>
+        </p:nvSpPr>
+        <p:spPr>
+          <a:xfrm>
+            <a:off x="8318377" y="1661003"/>
+            <a:ext cx="1464815" cy="369332"/>
+          </a:xfrm>
+          <a:prstGeom prst="rect">
+            <a:avLst/>
+          </a:prstGeom>
+          <a:noFill/>
+        </p:spPr>
+        <p:txBody>
+          <a:bodyPr wrap="square" rtlCol="0">
+            <a:spAutoFit/>
+          </a:bodyPr>
+          <a:lstStyle/>
+          <a:p>
+            <a:r>
+              <a:rPr kumimoji="1" lang="en-US" altLang="ja-JP" dirty="0">
+                <a:hlinkClick r:id="rId2"/>
+              </a:rPr>
+              <a:t>Source Code</a:t>
+            </a:r>
+            <a:endParaRPr kumimoji="1" lang="ja-JP" altLang="en-US" dirty="0"/>
+          </a:p>
+        </p:txBody>
+      </p:sp>
     </p:spTree>
     <p:extLst>
       <p:ext uri="{BB962C8B-B14F-4D97-AF65-F5344CB8AC3E}">
-        <p14:creationId xmlns:p14="http://schemas.microsoft.com/office/powerpoint/2010/main" val="4003251270"/>
+        <p14:creationId xmlns:p14="http://schemas.microsoft.com/office/powerpoint/2010/main" val="3368011594"/>
       </p:ext>
     </p:extLst>
   </p:cSld>
@@ -10975,7 +11317,7 @@
           <p:cNvPr id="2" name="タイトル 1">
             <a:extLst>
               <a:ext uri="{FF2B5EF4-FFF2-40B4-BE49-F238E27FC236}">
-                <a16:creationId xmlns:a16="http://schemas.microsoft.com/office/drawing/2014/main" id="{D0481A33-89BF-45FD-81CF-F52AE0224E57}"/>
+                <a16:creationId xmlns:a16="http://schemas.microsoft.com/office/drawing/2014/main" id="{82021B7D-BC6C-4733-8478-5866FB894C61}"/>
               </a:ext>
             </a:extLst>
           </p:cNvPr>
@@ -10992,54 +11334,8 @@
           <a:lstStyle/>
           <a:p>
             <a:r>
-              <a:rPr lang="en-US" altLang="ja-JP" dirty="0"/>
-              <a:t>Behavior based on access permission</a:t>
-            </a:r>
-            <a:endParaRPr kumimoji="1" lang="ja-JP" altLang="en-US" dirty="0"/>
-          </a:p>
-        </p:txBody>
-      </p:sp>
-      <p:sp>
-        <p:nvSpPr>
-          <p:cNvPr id="3" name="コンテンツ プレースホルダー 2">
-            <a:extLst>
-              <a:ext uri="{FF2B5EF4-FFF2-40B4-BE49-F238E27FC236}">
-                <a16:creationId xmlns:a16="http://schemas.microsoft.com/office/drawing/2014/main" id="{24F20AEA-2853-4BC7-BC13-3EFC97E20D31}"/>
-              </a:ext>
-            </a:extLst>
-          </p:cNvPr>
-          <p:cNvSpPr>
-            <a:spLocks noGrp="1"/>
-          </p:cNvSpPr>
-          <p:nvPr>
-            <p:ph idx="1"/>
-          </p:nvPr>
-        </p:nvSpPr>
-        <p:spPr/>
-        <p:txBody>
-          <a:bodyPr/>
-          <a:lstStyle/>
-          <a:p>
-            <a:r>
-              <a:rPr lang="en-US" altLang="ja-JP" b="1" dirty="0">
-                <a:latin typeface="Courier New" panose="02070309020205020404" pitchFamily="49" charset="0"/>
-                <a:cs typeface="Courier New" panose="02070309020205020404" pitchFamily="49" charset="0"/>
-              </a:rPr>
-              <a:t>Use </a:t>
-            </a:r>
-            <a:r>
-              <a:rPr lang="en-US" altLang="ja-JP" b="1" dirty="0" err="1">
-                <a:latin typeface="Courier New" panose="02070309020205020404" pitchFamily="49" charset="0"/>
-                <a:cs typeface="Courier New" panose="02070309020205020404" pitchFamily="49" charset="0"/>
-              </a:rPr>
-              <a:t>Yii</a:t>
-            </a:r>
-            <a:r>
-              <a:rPr lang="en-US" altLang="ja-JP" b="1" dirty="0">
-                <a:latin typeface="Courier New" panose="02070309020205020404" pitchFamily="49" charset="0"/>
-                <a:cs typeface="Courier New" panose="02070309020205020404" pitchFamily="49" charset="0"/>
-              </a:rPr>
-              <a:t>::$app-&gt;user-&gt;can() on business logic code</a:t>
+              <a:rPr kumimoji="1" lang="en-US" altLang="ja-JP" dirty="0"/>
+              <a:t>Demo of buttons</a:t>
             </a:r>
             <a:endParaRPr kumimoji="1" lang="ja-JP" altLang="en-US" dirty="0"/>
           </a:p>
@@ -11050,7 +11346,7 @@
           <p:cNvPr id="4" name="スライド番号プレースホルダー 3">
             <a:extLst>
               <a:ext uri="{FF2B5EF4-FFF2-40B4-BE49-F238E27FC236}">
-                <a16:creationId xmlns:a16="http://schemas.microsoft.com/office/drawing/2014/main" id="{F34A3196-3A71-4C81-B57D-C32DB8F6FBDE}"/>
+                <a16:creationId xmlns:a16="http://schemas.microsoft.com/office/drawing/2014/main" id="{16D6FB86-6015-414E-86B8-9A7DCD3725C2}"/>
               </a:ext>
             </a:extLst>
           </p:cNvPr>
@@ -11074,10 +11370,178 @@
           </a:p>
         </p:txBody>
       </p:sp>
+      <p:pic>
+        <p:nvPicPr>
+          <p:cNvPr id="6" name="図 5">
+            <a:extLst>
+              <a:ext uri="{FF2B5EF4-FFF2-40B4-BE49-F238E27FC236}">
+                <a16:creationId xmlns:a16="http://schemas.microsoft.com/office/drawing/2014/main" id="{D25D9841-BCEB-49B1-A987-BDE4F6408903}"/>
+              </a:ext>
+            </a:extLst>
+          </p:cNvPr>
+          <p:cNvPicPr>
+            <a:picLocks noChangeAspect="1"/>
+          </p:cNvPicPr>
+          <p:nvPr/>
+        </p:nvPicPr>
+        <p:blipFill>
+          <a:blip r:embed="rId2"/>
+          <a:stretch>
+            <a:fillRect/>
+          </a:stretch>
+        </p:blipFill>
+        <p:spPr>
+          <a:xfrm>
+            <a:off x="838200" y="1690688"/>
+            <a:ext cx="5133520" cy="3468111"/>
+          </a:xfrm>
+          <a:prstGeom prst="rect">
+            <a:avLst/>
+          </a:prstGeom>
+        </p:spPr>
+      </p:pic>
+      <p:pic>
+        <p:nvPicPr>
+          <p:cNvPr id="7" name="図 6">
+            <a:extLst>
+              <a:ext uri="{FF2B5EF4-FFF2-40B4-BE49-F238E27FC236}">
+                <a16:creationId xmlns:a16="http://schemas.microsoft.com/office/drawing/2014/main" id="{C7ACA65A-0ADC-4C64-9E01-4C1876CE504D}"/>
+              </a:ext>
+            </a:extLst>
+          </p:cNvPr>
+          <p:cNvPicPr>
+            <a:picLocks noChangeAspect="1"/>
+          </p:cNvPicPr>
+          <p:nvPr/>
+        </p:nvPicPr>
+        <p:blipFill>
+          <a:blip r:embed="rId3"/>
+          <a:stretch>
+            <a:fillRect/>
+          </a:stretch>
+        </p:blipFill>
+        <p:spPr>
+          <a:xfrm>
+            <a:off x="6220280" y="1690688"/>
+            <a:ext cx="5133520" cy="3462142"/>
+          </a:xfrm>
+          <a:prstGeom prst="rect">
+            <a:avLst/>
+          </a:prstGeom>
+        </p:spPr>
+      </p:pic>
+      <p:sp>
+        <p:nvSpPr>
+          <p:cNvPr id="8" name="テキスト ボックス 7">
+            <a:extLst>
+              <a:ext uri="{FF2B5EF4-FFF2-40B4-BE49-F238E27FC236}">
+                <a16:creationId xmlns:a16="http://schemas.microsoft.com/office/drawing/2014/main" id="{2DCB98E9-CB8B-4612-A024-02CBDF61CBD7}"/>
+              </a:ext>
+            </a:extLst>
+          </p:cNvPr>
+          <p:cNvSpPr txBox="1"/>
+          <p:nvPr/>
+        </p:nvSpPr>
+        <p:spPr>
+          <a:xfrm>
+            <a:off x="6232570" y="5615185"/>
+            <a:ext cx="5121230" cy="369332"/>
+          </a:xfrm>
+          <a:prstGeom prst="rect">
+            <a:avLst/>
+          </a:prstGeom>
+          <a:solidFill>
+            <a:srgbClr val="FFFF00"/>
+          </a:solidFill>
+        </p:spPr>
+        <p:txBody>
+          <a:bodyPr wrap="square" rtlCol="0">
+            <a:spAutoFit/>
+          </a:bodyPr>
+          <a:lstStyle/>
+          <a:p>
+            <a:r>
+              <a:rPr kumimoji="1" lang="en-US" altLang="ja-JP" dirty="0" err="1">
+                <a:solidFill>
+                  <a:srgbClr val="FF0000"/>
+                </a:solidFill>
+              </a:rPr>
+              <a:t>user2</a:t>
+            </a:r>
+            <a:r>
+              <a:rPr kumimoji="1" lang="en-US" altLang="ja-JP" dirty="0">
+                <a:solidFill>
+                  <a:srgbClr val="FF0000"/>
+                </a:solidFill>
+              </a:rPr>
+              <a:t> can not edit/delete other user’s post.</a:t>
+            </a:r>
+            <a:endParaRPr kumimoji="1" lang="ja-JP" altLang="en-US" dirty="0">
+              <a:solidFill>
+                <a:srgbClr val="FF0000"/>
+              </a:solidFill>
+            </a:endParaRPr>
+          </a:p>
+        </p:txBody>
+      </p:sp>
+      <p:sp>
+        <p:nvSpPr>
+          <p:cNvPr id="9" name="テキスト ボックス 8">
+            <a:extLst>
+              <a:ext uri="{FF2B5EF4-FFF2-40B4-BE49-F238E27FC236}">
+                <a16:creationId xmlns:a16="http://schemas.microsoft.com/office/drawing/2014/main" id="{012CCA41-CC46-4ED1-8FD5-14B56D693A3A}"/>
+              </a:ext>
+            </a:extLst>
+          </p:cNvPr>
+          <p:cNvSpPr txBox="1"/>
+          <p:nvPr/>
+        </p:nvSpPr>
+        <p:spPr>
+          <a:xfrm>
+            <a:off x="838199" y="5615185"/>
+            <a:ext cx="5133520" cy="369332"/>
+          </a:xfrm>
+          <a:prstGeom prst="rect">
+            <a:avLst/>
+          </a:prstGeom>
+          <a:solidFill>
+            <a:srgbClr val="FFFF00"/>
+          </a:solidFill>
+        </p:spPr>
+        <p:txBody>
+          <a:bodyPr wrap="square" rtlCol="0">
+            <a:spAutoFit/>
+          </a:bodyPr>
+          <a:lstStyle/>
+          <a:p>
+            <a:r>
+              <a:rPr kumimoji="1" lang="en-US" altLang="ja-JP" dirty="0" err="1">
+                <a:solidFill>
+                  <a:srgbClr val="FF0000"/>
+                </a:solidFill>
+              </a:rPr>
+              <a:t>user1</a:t>
+            </a:r>
+            <a:r>
+              <a:rPr kumimoji="1" lang="en-US" altLang="ja-JP" dirty="0">
+                <a:solidFill>
+                  <a:srgbClr val="FF0000"/>
+                </a:solidFill>
+              </a:rPr>
+              <a:t> has button to edit/delete any user’s post.</a:t>
+            </a:r>
+            <a:endParaRPr kumimoji="1" lang="ja-JP" altLang="en-US" dirty="0">
+              <a:solidFill>
+                <a:srgbClr val="FF0000"/>
+              </a:solidFill>
+            </a:endParaRPr>
+          </a:p>
+        </p:txBody>
+      </p:sp>
     </p:spTree>
     <p:extLst>
       <p:ext uri="{BB962C8B-B14F-4D97-AF65-F5344CB8AC3E}">
-        <p14:creationId xmlns:p14="http://schemas.microsoft.com/office/powerpoint/2010/main" val="955102109"/>
+        <p14:creationId xmlns:p14="http://schemas.microsoft.com/office/powerpoint/2010/main" val="4003251270"/>
       </p:ext>
     </p:extLst>
   </p:cSld>
@@ -11106,6 +11570,140 @@
       </p:grpSpPr>
       <p:sp>
         <p:nvSpPr>
+          <p:cNvPr id="2" name="タイトル 1">
+            <a:extLst>
+              <a:ext uri="{FF2B5EF4-FFF2-40B4-BE49-F238E27FC236}">
+                <a16:creationId xmlns:a16="http://schemas.microsoft.com/office/drawing/2014/main" id="{D0481A33-89BF-45FD-81CF-F52AE0224E57}"/>
+              </a:ext>
+            </a:extLst>
+          </p:cNvPr>
+          <p:cNvSpPr>
+            <a:spLocks noGrp="1"/>
+          </p:cNvSpPr>
+          <p:nvPr>
+            <p:ph type="title"/>
+          </p:nvPr>
+        </p:nvSpPr>
+        <p:spPr/>
+        <p:txBody>
+          <a:bodyPr/>
+          <a:lstStyle/>
+          <a:p>
+            <a:r>
+              <a:rPr lang="en-US" altLang="ja-JP" dirty="0"/>
+              <a:t>Behavior based on access permission</a:t>
+            </a:r>
+            <a:endParaRPr kumimoji="1" lang="ja-JP" altLang="en-US" dirty="0"/>
+          </a:p>
+        </p:txBody>
+      </p:sp>
+      <p:sp>
+        <p:nvSpPr>
+          <p:cNvPr id="3" name="コンテンツ プレースホルダー 2">
+            <a:extLst>
+              <a:ext uri="{FF2B5EF4-FFF2-40B4-BE49-F238E27FC236}">
+                <a16:creationId xmlns:a16="http://schemas.microsoft.com/office/drawing/2014/main" id="{24F20AEA-2853-4BC7-BC13-3EFC97E20D31}"/>
+              </a:ext>
+            </a:extLst>
+          </p:cNvPr>
+          <p:cNvSpPr>
+            <a:spLocks noGrp="1"/>
+          </p:cNvSpPr>
+          <p:nvPr>
+            <p:ph idx="1"/>
+          </p:nvPr>
+        </p:nvSpPr>
+        <p:spPr/>
+        <p:txBody>
+          <a:bodyPr/>
+          <a:lstStyle/>
+          <a:p>
+            <a:r>
+              <a:rPr lang="en-US" altLang="ja-JP" b="1" dirty="0">
+                <a:latin typeface="Courier New" panose="02070309020205020404" pitchFamily="49" charset="0"/>
+                <a:cs typeface="Courier New" panose="02070309020205020404" pitchFamily="49" charset="0"/>
+              </a:rPr>
+              <a:t>Use </a:t>
+            </a:r>
+            <a:r>
+              <a:rPr lang="en-US" altLang="ja-JP" b="1" dirty="0" err="1">
+                <a:latin typeface="Courier New" panose="02070309020205020404" pitchFamily="49" charset="0"/>
+                <a:cs typeface="Courier New" panose="02070309020205020404" pitchFamily="49" charset="0"/>
+              </a:rPr>
+              <a:t>Yii</a:t>
+            </a:r>
+            <a:r>
+              <a:rPr lang="en-US" altLang="ja-JP" b="1" dirty="0">
+                <a:latin typeface="Courier New" panose="02070309020205020404" pitchFamily="49" charset="0"/>
+                <a:cs typeface="Courier New" panose="02070309020205020404" pitchFamily="49" charset="0"/>
+              </a:rPr>
+              <a:t>::$app-&gt;user-&gt;can() on business logic code</a:t>
+            </a:r>
+            <a:endParaRPr kumimoji="1" lang="ja-JP" altLang="en-US" dirty="0"/>
+          </a:p>
+        </p:txBody>
+      </p:sp>
+      <p:sp>
+        <p:nvSpPr>
+          <p:cNvPr id="4" name="スライド番号プレースホルダー 3">
+            <a:extLst>
+              <a:ext uri="{FF2B5EF4-FFF2-40B4-BE49-F238E27FC236}">
+                <a16:creationId xmlns:a16="http://schemas.microsoft.com/office/drawing/2014/main" id="{F34A3196-3A71-4C81-B57D-C32DB8F6FBDE}"/>
+              </a:ext>
+            </a:extLst>
+          </p:cNvPr>
+          <p:cNvSpPr>
+            <a:spLocks noGrp="1"/>
+          </p:cNvSpPr>
+          <p:nvPr>
+            <p:ph type="sldNum" sz="quarter" idx="12"/>
+          </p:nvPr>
+        </p:nvSpPr>
+        <p:spPr/>
+        <p:txBody>
+          <a:bodyPr/>
+          <a:lstStyle/>
+          <a:p>
+            <a:fld id="{F8D8928E-AA9A-4D89-BC1F-A2C05AB4BD92}" type="slidenum">
+              <a:rPr kumimoji="1" lang="ja-JP" altLang="en-US" smtClean="0"/>
+              <a:t>26</a:t>
+            </a:fld>
+            <a:endParaRPr kumimoji="1" lang="ja-JP" altLang="en-US"/>
+          </a:p>
+        </p:txBody>
+      </p:sp>
+    </p:spTree>
+    <p:extLst>
+      <p:ext uri="{BB962C8B-B14F-4D97-AF65-F5344CB8AC3E}">
+        <p14:creationId xmlns:p14="http://schemas.microsoft.com/office/powerpoint/2010/main" val="955102109"/>
+      </p:ext>
+    </p:extLst>
+  </p:cSld>
+  <p:clrMapOvr>
+    <a:masterClrMapping/>
+  </p:clrMapOvr>
+</p:sld>
+</file>
+
+<file path=ppt/slides/slide27.xml><?xml version="1.0" encoding="utf-8"?>
+<p:sld xmlns:a="http://schemas.openxmlformats.org/drawingml/2006/main" xmlns:r="http://schemas.openxmlformats.org/officeDocument/2006/relationships" xmlns:p="http://schemas.openxmlformats.org/presentationml/2006/main">
+  <p:cSld>
+    <p:spTree>
+      <p:nvGrpSpPr>
+        <p:cNvPr id="1" name=""/>
+        <p:cNvGrpSpPr/>
+        <p:nvPr/>
+      </p:nvGrpSpPr>
+      <p:grpSpPr>
+        <a:xfrm>
+          <a:off x="0" y="0"/>
+          <a:ext cx="0" cy="0"/>
+          <a:chOff x="0" y="0"/>
+          <a:chExt cx="0" cy="0"/>
+        </a:xfrm>
+      </p:grpSpPr>
+      <p:sp>
+        <p:nvSpPr>
           <p:cNvPr id="3" name="コンテンツ プレースホルダー 2">
             <a:extLst>
               <a:ext uri="{FF2B5EF4-FFF2-40B4-BE49-F238E27FC236}">
@@ -11159,7 +11757,7 @@
           <a:p>
             <a:fld id="{F8D8928E-AA9A-4D89-BC1F-A2C05AB4BD92}" type="slidenum">
               <a:rPr kumimoji="1" lang="ja-JP" altLang="en-US" smtClean="0"/>
-              <a:t>26</a:t>
+              <a:t>27</a:t>
             </a:fld>
             <a:endParaRPr kumimoji="1" lang="ja-JP" altLang="en-US"/>
           </a:p>

</xml_diff>

<commit_message>
Update Yii2RbacTutorial.pptx, adding merit of RBAC.
</commit_message>
<xml_diff>
--- a/docs/tutorial/Yii2RbacTutorial.pptx
+++ b/docs/tutorial/Yii2RbacTutorial.pptx
@@ -4053,7 +4053,7 @@
                 <a:latin typeface="Courier New" panose="02070309020205020404" pitchFamily="49" charset="0"/>
                 <a:cs typeface="Courier New" panose="02070309020205020404" pitchFamily="49" charset="0"/>
               </a:rPr>
-              <a:t>If ($post-&gt;</a:t>
+              <a:t>if ($post-&gt;</a:t>
             </a:r>
             <a:r>
               <a:rPr kumimoji="1" lang="en-US" altLang="ja-JP" sz="1200" dirty="0" err="1">
@@ -4162,7 +4162,7 @@
         <p:spPr>
           <a:xfrm>
             <a:off x="838199" y="4442316"/>
-            <a:ext cx="10515599" cy="1569660"/>
+            <a:ext cx="10515599" cy="1754326"/>
           </a:xfrm>
           <a:prstGeom prst="rect">
             <a:avLst/>
@@ -4195,7 +4195,7 @@
                 <a:latin typeface="Courier New" panose="02070309020205020404" pitchFamily="49" charset="0"/>
                 <a:cs typeface="Courier New" panose="02070309020205020404" pitchFamily="49" charset="0"/>
               </a:rPr>
-              <a:t>If (</a:t>
+              <a:t>if (</a:t>
             </a:r>
             <a:r>
               <a:rPr kumimoji="1" lang="en-US" altLang="ja-JP" sz="1200" dirty="0" err="1">
@@ -4295,10 +4295,15 @@
               </a:rPr>
               <a:t>, we even move privilege checking out of the business logic code.</a:t>
             </a:r>
-            <a:endParaRPr kumimoji="1" lang="en-US" altLang="ja-JP" sz="1200" dirty="0">
-              <a:latin typeface="Courier New" panose="02070309020205020404" pitchFamily="49" charset="0"/>
-              <a:cs typeface="Courier New" panose="02070309020205020404" pitchFamily="49" charset="0"/>
-            </a:endParaRPr>
+          </a:p>
+          <a:p>
+            <a:r>
+              <a:rPr kumimoji="1" lang="en-US" altLang="ja-JP" sz="1200" b="1" dirty="0">
+                <a:latin typeface="Courier New" panose="02070309020205020404" pitchFamily="49" charset="0"/>
+                <a:cs typeface="Courier New" panose="02070309020205020404" pitchFamily="49" charset="0"/>
+              </a:rPr>
+              <a:t>+ It’s easier to maintain (adding more privileges, role…)</a:t>
+            </a:r>
           </a:p>
         </p:txBody>
       </p:sp>

</xml_diff>

<commit_message>
Update Yii2RbacTutorial.pptx (RBAC data design).
</commit_message>
<xml_diff>
--- a/docs/tutorial/Yii2RbacTutorial.pptx
+++ b/docs/tutorial/Yii2RbacTutorial.pptx
@@ -4251,21 +4251,29 @@
             </a:endParaRPr>
           </a:p>
           <a:p>
+            <a:pPr marL="228600" indent="-228600">
+              <a:buFont typeface="+mj-lt"/>
+              <a:buAutoNum type="arabicPeriod"/>
+            </a:pPr>
             <a:r>
               <a:rPr kumimoji="1" lang="en-US" altLang="ja-JP" sz="1200" b="1" dirty="0">
                 <a:latin typeface="Courier New" panose="02070309020205020404" pitchFamily="49" charset="0"/>
                 <a:cs typeface="Courier New" panose="02070309020205020404" pitchFamily="49" charset="0"/>
               </a:rPr>
-              <a:t>+ We concentrate into writing business code (do update post), leave privilege checking to the framework.</a:t>
-            </a:r>
-          </a:p>
-          <a:p>
+              <a:t>We concentrate into writing business code (do update post), leave privilege checking to the framework.</a:t>
+            </a:r>
+          </a:p>
+          <a:p>
+            <a:pPr marL="228600" indent="-228600">
+              <a:buFont typeface="+mj-lt"/>
+              <a:buAutoNum type="arabicPeriod"/>
+            </a:pPr>
             <a:r>
               <a:rPr kumimoji="1" lang="en-US" altLang="ja-JP" sz="1200" b="1" dirty="0">
                 <a:latin typeface="Courier New" panose="02070309020205020404" pitchFamily="49" charset="0"/>
                 <a:cs typeface="Courier New" panose="02070309020205020404" pitchFamily="49" charset="0"/>
               </a:rPr>
-              <a:t>+ By using </a:t>
+              <a:t>By using </a:t>
             </a:r>
             <a:r>
               <a:rPr kumimoji="1" lang="en-US" altLang="ja-JP" sz="1200" b="1" dirty="0" err="1">
@@ -4297,12 +4305,16 @@
             </a:r>
           </a:p>
           <a:p>
+            <a:pPr marL="228600" indent="-228600">
+              <a:buFont typeface="+mj-lt"/>
+              <a:buAutoNum type="arabicPeriod"/>
+            </a:pPr>
             <a:r>
               <a:rPr kumimoji="1" lang="en-US" altLang="ja-JP" sz="1200" b="1" dirty="0">
                 <a:latin typeface="Courier New" panose="02070309020205020404" pitchFamily="49" charset="0"/>
                 <a:cs typeface="Courier New" panose="02070309020205020404" pitchFamily="49" charset="0"/>
               </a:rPr>
-              <a:t>+ It’s easier to maintain (adding more privileges, role…)</a:t>
+              <a:t>It’s easier to maintain (adding more privileges, role…).</a:t>
             </a:r>
           </a:p>
         </p:txBody>
@@ -5925,12 +5937,12 @@
         <p:spPr>
           <a:xfrm>
             <a:off x="838200" y="1502229"/>
-            <a:ext cx="5924650" cy="4674734"/>
+            <a:ext cx="5924650" cy="1731552"/>
           </a:xfrm>
         </p:spPr>
         <p:txBody>
           <a:bodyPr>
-            <a:normAutofit/>
+            <a:normAutofit lnSpcReduction="10000"/>
           </a:bodyPr>
           <a:lstStyle/>
           <a:p>
@@ -5940,7 +5952,7 @@
             </a:r>
             <a:r>
               <a:rPr lang="en-US" altLang="ja-JP" sz="1400" dirty="0"/>
-              <a:t> data doesn’t need relate to system function (it may be common mistake of access control design to create access permission same as user function)</a:t>
+              <a:t> data doesn’t relate to system function (it may be common mistake of access control design to create access permission same as user function)</a:t>
             </a:r>
           </a:p>
           <a:p>
@@ -5973,6 +5985,20 @@
             <a:r>
               <a:rPr kumimoji="1" lang="en-US" altLang="ja-JP" sz="1400" dirty="0"/>
               <a:t>) to determine if a user is an admin or not.</a:t>
+            </a:r>
+          </a:p>
+          <a:p>
+            <a:r>
+              <a:rPr kumimoji="1" lang="en-US" altLang="ja-JP" sz="1400" dirty="0"/>
+              <a:t>“admin” and “author” is default roles, which is applied </a:t>
+            </a:r>
+            <a:r>
+              <a:rPr kumimoji="1" lang="en-US" altLang="ja-JP" sz="1400"/>
+              <a:t>to </a:t>
+            </a:r>
+            <a:r>
+              <a:rPr lang="en-US" altLang="ja-JP" sz="1400"/>
+              <a:t>every user.</a:t>
             </a:r>
             <a:endParaRPr kumimoji="1" lang="ja-JP" altLang="en-US" sz="1400" dirty="0"/>
           </a:p>
@@ -12802,12 +12828,41 @@
           </a:p>
         </p:txBody>
       </p:sp>
+      <p:sp>
+        <p:nvSpPr>
+          <p:cNvPr id="8" name="スライド番号プレースホルダー 7">
+            <a:extLst>
+              <a:ext uri="{FF2B5EF4-FFF2-40B4-BE49-F238E27FC236}">
+                <a16:creationId xmlns:a16="http://schemas.microsoft.com/office/drawing/2014/main" id="{8E073D16-2C9A-4C73-AB91-E773FA74DD5B}"/>
+              </a:ext>
+            </a:extLst>
+          </p:cNvPr>
+          <p:cNvSpPr>
+            <a:spLocks noGrp="1"/>
+          </p:cNvSpPr>
+          <p:nvPr>
+            <p:ph type="sldNum" sz="quarter" idx="12"/>
+          </p:nvPr>
+        </p:nvSpPr>
+        <p:spPr/>
+        <p:txBody>
+          <a:bodyPr/>
+          <a:lstStyle/>
+          <a:p>
+            <a:fld id="{F8D8928E-AA9A-4D89-BC1F-A2C05AB4BD92}" type="slidenum">
+              <a:rPr kumimoji="1" lang="ja-JP" altLang="en-US" smtClean="0"/>
+              <a:t>7</a:t>
+            </a:fld>
+            <a:endParaRPr kumimoji="1" lang="ja-JP" altLang="en-US"/>
+          </a:p>
+        </p:txBody>
+      </p:sp>
       <p:pic>
         <p:nvPicPr>
-          <p:cNvPr id="7" name="図 6" descr="文字と写真のスクリーンショット&#10;&#10;自動的に生成された説明">
+          <p:cNvPr id="4" name="図 3" descr="文字と写真のスクリーンショット&#10;&#10;自動的に生成された説明">
             <a:extLst>
               <a:ext uri="{FF2B5EF4-FFF2-40B4-BE49-F238E27FC236}">
-                <a16:creationId xmlns:a16="http://schemas.microsoft.com/office/drawing/2014/main" id="{D6D461CE-56BA-452E-8234-982C58167E52}"/>
+                <a16:creationId xmlns:a16="http://schemas.microsoft.com/office/drawing/2014/main" id="{61F05589-35AE-4647-9725-7DB74BD58138}"/>
               </a:ext>
             </a:extLst>
           </p:cNvPr>
@@ -12838,35 +12893,6 @@
           </a:prstGeom>
         </p:spPr>
       </p:pic>
-      <p:sp>
-        <p:nvSpPr>
-          <p:cNvPr id="8" name="スライド番号プレースホルダー 7">
-            <a:extLst>
-              <a:ext uri="{FF2B5EF4-FFF2-40B4-BE49-F238E27FC236}">
-                <a16:creationId xmlns:a16="http://schemas.microsoft.com/office/drawing/2014/main" id="{8E073D16-2C9A-4C73-AB91-E773FA74DD5B}"/>
-              </a:ext>
-            </a:extLst>
-          </p:cNvPr>
-          <p:cNvSpPr>
-            <a:spLocks noGrp="1"/>
-          </p:cNvSpPr>
-          <p:nvPr>
-            <p:ph type="sldNum" sz="quarter" idx="12"/>
-          </p:nvPr>
-        </p:nvSpPr>
-        <p:spPr/>
-        <p:txBody>
-          <a:bodyPr/>
-          <a:lstStyle/>
-          <a:p>
-            <a:fld id="{F8D8928E-AA9A-4D89-BC1F-A2C05AB4BD92}" type="slidenum">
-              <a:rPr kumimoji="1" lang="ja-JP" altLang="en-US" smtClean="0"/>
-              <a:t>7</a:t>
-            </a:fld>
-            <a:endParaRPr kumimoji="1" lang="ja-JP" altLang="en-US"/>
-          </a:p>
-        </p:txBody>
-      </p:sp>
     </p:spTree>
     <p:extLst>
       <p:ext uri="{BB962C8B-B14F-4D97-AF65-F5344CB8AC3E}">

</xml_diff>